<commit_message>
Add normal texture for wave detail
</commit_message>
<xml_diff>
--- a/OceanSimulation/Docs/Large Scale Realistic Ocean Rendering and Simulation.pptx
+++ b/OceanSimulation/Docs/Large Scale Realistic Ocean Rendering and Simulation.pptx
@@ -212,7 +212,7 @@
           <a:p>
             <a:fld id="{4B3F774C-70F7-4ED4-813C-739E51CF8487}" type="datetimeFigureOut">
               <a:rPr lang="en-US" smtClean="0"/>
-              <a:t>2/9/2021</a:t>
+              <a:t>2/23/2021</a:t>
             </a:fld>
             <a:endParaRPr lang="en-US" dirty="0"/>
           </a:p>
@@ -981,7 +981,7 @@
           <a:p>
             <a:fld id="{F9F2E34D-57B0-41D5-A7AF-DF10D1068115}" type="datetime1">
               <a:rPr lang="en-US" smtClean="0"/>
-              <a:t>2/9/2021</a:t>
+              <a:t>2/23/2021</a:t>
             </a:fld>
             <a:endParaRPr lang="en-US" dirty="0"/>
           </a:p>
@@ -1273,7 +1273,7 @@
           <a:p>
             <a:fld id="{DF6E8327-77F4-4A2B-9238-101C8E3404E4}" type="datetime1">
               <a:rPr lang="en-US" smtClean="0"/>
-              <a:t>2/9/2021</a:t>
+              <a:t>2/23/2021</a:t>
             </a:fld>
             <a:endParaRPr lang="en-US" dirty="0"/>
           </a:p>
@@ -1517,7 +1517,7 @@
           <a:p>
             <a:fld id="{5287327A-3B7B-4F18-AD00-4892CF91FF9D}" type="datetime1">
               <a:rPr lang="en-US" smtClean="0"/>
-              <a:t>2/9/2021</a:t>
+              <a:t>2/23/2021</a:t>
             </a:fld>
             <a:endParaRPr lang="en-US" dirty="0"/>
           </a:p>
@@ -2053,7 +2053,7 @@
           <a:p>
             <a:fld id="{84398241-E647-4007-AB01-BB30869910EB}" type="datetime1">
               <a:rPr lang="en-US" smtClean="0"/>
-              <a:t>2/9/2021</a:t>
+              <a:t>2/23/2021</a:t>
             </a:fld>
             <a:endParaRPr lang="en-US" dirty="0"/>
           </a:p>
@@ -2297,7 +2297,7 @@
           <a:p>
             <a:fld id="{A09F5554-C941-4C3B-A197-75ED448862A0}" type="datetime1">
               <a:rPr lang="en-US" smtClean="0"/>
-              <a:t>2/9/2021</a:t>
+              <a:t>2/23/2021</a:t>
             </a:fld>
             <a:endParaRPr lang="en-US" dirty="0"/>
           </a:p>
@@ -2825,7 +2825,7 @@
           <a:p>
             <a:fld id="{DC6B44A0-C3F8-4023-9352-7CF7C034B2C8}" type="datetime1">
               <a:rPr lang="en-US" smtClean="0"/>
-              <a:t>2/9/2021</a:t>
+              <a:t>2/23/2021</a:t>
             </a:fld>
             <a:endParaRPr lang="en-US" dirty="0"/>
           </a:p>
@@ -3118,7 +3118,7 @@
           <a:p>
             <a:fld id="{79C3DC5B-471F-47EA-B884-FE923235A560}" type="datetime1">
               <a:rPr lang="en-US" smtClean="0"/>
-              <a:t>2/9/2021</a:t>
+              <a:t>2/23/2021</a:t>
             </a:fld>
             <a:endParaRPr lang="en-US" dirty="0"/>
           </a:p>
@@ -3288,7 +3288,7 @@
           <a:p>
             <a:fld id="{03F8C408-3247-4796-93FF-B91D6887AEC0}" type="datetime1">
               <a:rPr lang="en-US" smtClean="0"/>
-              <a:t>2/9/2021</a:t>
+              <a:t>2/23/2021</a:t>
             </a:fld>
             <a:endParaRPr lang="en-US" dirty="0"/>
           </a:p>
@@ -3464,7 +3464,7 @@
           <a:p>
             <a:fld id="{BBA1D282-CC74-49F4-B876-75084EFB56F1}" type="datetime1">
               <a:rPr lang="en-US" smtClean="0"/>
-              <a:t>2/9/2021</a:t>
+              <a:t>2/23/2021</a:t>
             </a:fld>
             <a:endParaRPr lang="en-US" dirty="0"/>
           </a:p>
@@ -3630,7 +3630,7 @@
           <a:p>
             <a:fld id="{BF56EAF9-2583-4989-8D87-13F548ED6E0C}" type="datetime1">
               <a:rPr lang="en-US" smtClean="0"/>
-              <a:t>2/9/2021</a:t>
+              <a:t>2/23/2021</a:t>
             </a:fld>
             <a:endParaRPr lang="en-US" dirty="0"/>
           </a:p>
@@ -3877,7 +3877,7 @@
           <a:p>
             <a:fld id="{B70E3CFB-BB1B-4B2A-ADF6-B1A4609854C4}" type="datetime1">
               <a:rPr lang="en-US" smtClean="0"/>
-              <a:t>2/9/2021</a:t>
+              <a:t>2/23/2021</a:t>
             </a:fld>
             <a:endParaRPr lang="en-US" dirty="0"/>
           </a:p>
@@ -4170,7 +4170,7 @@
           <a:p>
             <a:fld id="{2B3AEAA8-1A97-412E-935C-2E918F139579}" type="datetime1">
               <a:rPr lang="en-US" smtClean="0"/>
-              <a:t>2/9/2021</a:t>
+              <a:t>2/23/2021</a:t>
             </a:fld>
             <a:endParaRPr lang="en-US" dirty="0"/>
           </a:p>
@@ -4608,7 +4608,7 @@
           <a:p>
             <a:fld id="{638B0DF1-CA1F-4E36-8C65-C52A9896A8FB}" type="datetime1">
               <a:rPr lang="en-US" smtClean="0"/>
-              <a:t>2/9/2021</a:t>
+              <a:t>2/23/2021</a:t>
             </a:fld>
             <a:endParaRPr lang="en-US" dirty="0"/>
           </a:p>
@@ -4722,7 +4722,7 @@
           <a:p>
             <a:fld id="{DB6173FD-197A-4AD6-8D60-38B6A76F0734}" type="datetime1">
               <a:rPr lang="en-US" smtClean="0"/>
-              <a:t>2/9/2021</a:t>
+              <a:t>2/23/2021</a:t>
             </a:fld>
             <a:endParaRPr lang="en-US" dirty="0"/>
           </a:p>
@@ -4813,7 +4813,7 @@
           <a:p>
             <a:fld id="{6BDC3949-07FA-4C7A-A990-D6D1043EED71}" type="datetime1">
               <a:rPr lang="en-US" smtClean="0"/>
-              <a:t>2/9/2021</a:t>
+              <a:t>2/23/2021</a:t>
             </a:fld>
             <a:endParaRPr lang="en-US" dirty="0"/>
           </a:p>
@@ -5092,7 +5092,7 @@
           <a:p>
             <a:fld id="{2E9E2DE8-6D13-4218-A974-D45AA7B6E4FF}" type="datetime1">
               <a:rPr lang="en-US" smtClean="0"/>
-              <a:t>2/9/2021</a:t>
+              <a:t>2/23/2021</a:t>
             </a:fld>
             <a:endParaRPr lang="en-US" dirty="0"/>
           </a:p>
@@ -5379,7 +5379,7 @@
           <a:p>
             <a:fld id="{9CDAB7D7-4BDA-4ABC-B31D-66201C69A314}" type="datetime1">
               <a:rPr lang="en-US" smtClean="0"/>
-              <a:t>2/9/2021</a:t>
+              <a:t>2/23/2021</a:t>
             </a:fld>
             <a:endParaRPr lang="en-US" dirty="0"/>
           </a:p>
@@ -5905,7 +5905,7 @@
           <a:p>
             <a:fld id="{4E3F0A0B-291C-4112-A023-023C51AB2E85}" type="datetime1">
               <a:rPr lang="en-US" smtClean="0"/>
-              <a:t>2/9/2021</a:t>
+              <a:t>2/23/2021</a:t>
             </a:fld>
             <a:endParaRPr lang="en-US" dirty="0"/>
           </a:p>
@@ -6446,10 +6446,10 @@
           <p:cNvPr id="21" name="Rectangle 20">
             <a:extLst>
               <a:ext uri="{FF2B5EF4-FFF2-40B4-BE49-F238E27FC236}">
-                <a16:creationId xmlns:a16="http://schemas.microsoft.com/office/drawing/2014/main" xmlns="" id="{E5A92FE9-DB05-4D0D-AF5A-BE8664B9FFB4}"/>
+                <a16:creationId xmlns="" xmlns:a16="http://schemas.microsoft.com/office/drawing/2014/main" id="{E5A92FE9-DB05-4D0D-AF5A-BE8664B9FFB4}"/>
               </a:ext>
               <a:ext uri="{C183D7F6-B498-43B3-948B-1728B52AA6E4}">
-                <adec:decorative xmlns:adec="http://schemas.microsoft.com/office/drawing/2017/decorative" xmlns="" val="1"/>
+                <adec:decorative xmlns="" xmlns:adec="http://schemas.microsoft.com/office/drawing/2017/decorative" val="1"/>
               </a:ext>
             </a:extLst>
           </p:cNvPr>
@@ -6459,7 +6459,7 @@
           <p:nvPr>
             <p:extLst>
               <p:ext uri="{386F3935-93C4-4BCD-93E2-E3B085C9AB24}">
-                <p16:designElem xmlns:p16="http://schemas.microsoft.com/office/powerpoint/2015/main" xmlns="" val="1"/>
+                <p16:designElem xmlns="" xmlns:p16="http://schemas.microsoft.com/office/powerpoint/2015/main" val="1"/>
               </p:ext>
             </p:extLst>
           </p:nvPr>
@@ -6506,10 +6506,10 @@
           <p:cNvPr id="23" name="Group 22">
             <a:extLst>
               <a:ext uri="{FF2B5EF4-FFF2-40B4-BE49-F238E27FC236}">
-                <a16:creationId xmlns:a16="http://schemas.microsoft.com/office/drawing/2014/main" xmlns="" id="{53D9B26A-5143-49A7-BA98-D871D5BD719A}"/>
+                <a16:creationId xmlns="" xmlns:a16="http://schemas.microsoft.com/office/drawing/2014/main" id="{53D9B26A-5143-49A7-BA98-D871D5BD719A}"/>
               </a:ext>
               <a:ext uri="{C183D7F6-B498-43B3-948B-1728B52AA6E4}">
-                <adec:decorative xmlns:adec="http://schemas.microsoft.com/office/drawing/2017/decorative" xmlns="" val="1"/>
+                <adec:decorative xmlns="" xmlns:adec="http://schemas.microsoft.com/office/drawing/2017/decorative" val="1"/>
               </a:ext>
             </a:extLst>
           </p:cNvPr>
@@ -6519,7 +6519,7 @@
           <p:nvPr>
             <p:extLst>
               <p:ext uri="{386F3935-93C4-4BCD-93E2-E3B085C9AB24}">
-                <p16:designElem xmlns:p16="http://schemas.microsoft.com/office/powerpoint/2015/main" xmlns="" val="1"/>
+                <p16:designElem xmlns="" xmlns:p16="http://schemas.microsoft.com/office/powerpoint/2015/main" val="1"/>
               </p:ext>
             </p:extLst>
           </p:nvPr>
@@ -6537,10 +6537,10 @@
             <p:cNvPr id="24" name="Freeform 6">
               <a:extLst>
                 <a:ext uri="{FF2B5EF4-FFF2-40B4-BE49-F238E27FC236}">
-                  <a16:creationId xmlns:a16="http://schemas.microsoft.com/office/drawing/2014/main" xmlns="" id="{68B85E55-A2A1-4682-B891-F201358A92D5}"/>
+                  <a16:creationId xmlns="" xmlns:a16="http://schemas.microsoft.com/office/drawing/2014/main" id="{68B85E55-A2A1-4682-B891-F201358A92D5}"/>
                 </a:ext>
                 <a:ext uri="{C183D7F6-B498-43B3-948B-1728B52AA6E4}">
-                  <adec:decorative xmlns:adec="http://schemas.microsoft.com/office/drawing/2017/decorative" xmlns="" val="1"/>
+                  <adec:decorative xmlns="" xmlns:adec="http://schemas.microsoft.com/office/drawing/2017/decorative" val="1"/>
                 </a:ext>
               </a:extLst>
             </p:cNvPr>
@@ -6548,7 +6548,7 @@
             <p:nvPr>
               <p:extLst>
                 <p:ext uri="{386F3935-93C4-4BCD-93E2-E3B085C9AB24}">
-                  <p16:designElem xmlns:p16="http://schemas.microsoft.com/office/powerpoint/2015/main" xmlns="" val="1"/>
+                  <p16:designElem xmlns="" xmlns:p16="http://schemas.microsoft.com/office/powerpoint/2015/main" val="1"/>
                 </p:ext>
               </p:extLst>
             </p:nvPr>
@@ -6598,10 +6598,10 @@
             <p:cNvPr id="25" name="Freeform 7">
               <a:extLst>
                 <a:ext uri="{FF2B5EF4-FFF2-40B4-BE49-F238E27FC236}">
-                  <a16:creationId xmlns:a16="http://schemas.microsoft.com/office/drawing/2014/main" xmlns="" id="{45EF6EDB-9B5D-49E9-96FA-1AE08BF95E57}"/>
+                  <a16:creationId xmlns="" xmlns:a16="http://schemas.microsoft.com/office/drawing/2014/main" id="{45EF6EDB-9B5D-49E9-96FA-1AE08BF95E57}"/>
                 </a:ext>
                 <a:ext uri="{C183D7F6-B498-43B3-948B-1728B52AA6E4}">
-                  <adec:decorative xmlns:adec="http://schemas.microsoft.com/office/drawing/2017/decorative" xmlns="" val="1"/>
+                  <adec:decorative xmlns="" xmlns:adec="http://schemas.microsoft.com/office/drawing/2017/decorative" val="1"/>
                 </a:ext>
               </a:extLst>
             </p:cNvPr>
@@ -6609,7 +6609,7 @@
             <p:nvPr>
               <p:extLst>
                 <p:ext uri="{386F3935-93C4-4BCD-93E2-E3B085C9AB24}">
-                  <p16:designElem xmlns:p16="http://schemas.microsoft.com/office/powerpoint/2015/main" xmlns="" val="1"/>
+                  <p16:designElem xmlns="" xmlns:p16="http://schemas.microsoft.com/office/powerpoint/2015/main" val="1"/>
                 </p:ext>
               </p:extLst>
             </p:nvPr>
@@ -6662,10 +6662,10 @@
             <p:cNvPr id="26" name="Freeform 12">
               <a:extLst>
                 <a:ext uri="{FF2B5EF4-FFF2-40B4-BE49-F238E27FC236}">
-                  <a16:creationId xmlns:a16="http://schemas.microsoft.com/office/drawing/2014/main" xmlns="" id="{38338226-D6E2-4EEE-B271-DB4BD096DBA1}"/>
+                  <a16:creationId xmlns="" xmlns:a16="http://schemas.microsoft.com/office/drawing/2014/main" id="{38338226-D6E2-4EEE-B271-DB4BD096DBA1}"/>
                 </a:ext>
                 <a:ext uri="{C183D7F6-B498-43B3-948B-1728B52AA6E4}">
-                  <adec:decorative xmlns:adec="http://schemas.microsoft.com/office/drawing/2017/decorative" xmlns="" val="1"/>
+                  <adec:decorative xmlns="" xmlns:adec="http://schemas.microsoft.com/office/drawing/2017/decorative" val="1"/>
                 </a:ext>
               </a:extLst>
             </p:cNvPr>
@@ -6673,7 +6673,7 @@
             <p:nvPr>
               <p:extLst>
                 <p:ext uri="{386F3935-93C4-4BCD-93E2-E3B085C9AB24}">
-                  <p16:designElem xmlns:p16="http://schemas.microsoft.com/office/powerpoint/2015/main" xmlns="" val="1"/>
+                  <p16:designElem xmlns="" xmlns:p16="http://schemas.microsoft.com/office/powerpoint/2015/main" val="1"/>
                 </p:ext>
               </p:extLst>
             </p:nvPr>
@@ -6720,10 +6720,10 @@
             <p:cNvPr id="27" name="Freeform 13">
               <a:extLst>
                 <a:ext uri="{FF2B5EF4-FFF2-40B4-BE49-F238E27FC236}">
-                  <a16:creationId xmlns:a16="http://schemas.microsoft.com/office/drawing/2014/main" xmlns="" id="{4878FB48-17B3-4A11-8025-DE0945CD4E71}"/>
+                  <a16:creationId xmlns="" xmlns:a16="http://schemas.microsoft.com/office/drawing/2014/main" id="{4878FB48-17B3-4A11-8025-DE0945CD4E71}"/>
                 </a:ext>
                 <a:ext uri="{C183D7F6-B498-43B3-948B-1728B52AA6E4}">
-                  <adec:decorative xmlns:adec="http://schemas.microsoft.com/office/drawing/2017/decorative" xmlns="" val="1"/>
+                  <adec:decorative xmlns="" xmlns:adec="http://schemas.microsoft.com/office/drawing/2017/decorative" val="1"/>
                 </a:ext>
               </a:extLst>
             </p:cNvPr>
@@ -6731,7 +6731,7 @@
             <p:nvPr>
               <p:extLst>
                 <p:ext uri="{386F3935-93C4-4BCD-93E2-E3B085C9AB24}">
-                  <p16:designElem xmlns:p16="http://schemas.microsoft.com/office/powerpoint/2015/main" xmlns="" val="1"/>
+                  <p16:designElem xmlns="" xmlns:p16="http://schemas.microsoft.com/office/powerpoint/2015/main" val="1"/>
                 </p:ext>
               </p:extLst>
             </p:nvPr>
@@ -6780,10 +6780,10 @@
             <p:cNvPr id="28" name="Freeform 14">
               <a:extLst>
                 <a:ext uri="{FF2B5EF4-FFF2-40B4-BE49-F238E27FC236}">
-                  <a16:creationId xmlns:a16="http://schemas.microsoft.com/office/drawing/2014/main" xmlns="" id="{4150A21C-DD6D-4D3C-9E95-7A3CA263BEB9}"/>
+                  <a16:creationId xmlns="" xmlns:a16="http://schemas.microsoft.com/office/drawing/2014/main" id="{4150A21C-DD6D-4D3C-9E95-7A3CA263BEB9}"/>
                 </a:ext>
                 <a:ext uri="{C183D7F6-B498-43B3-948B-1728B52AA6E4}">
-                  <adec:decorative xmlns:adec="http://schemas.microsoft.com/office/drawing/2017/decorative" xmlns="" val="1"/>
+                  <adec:decorative xmlns="" xmlns:adec="http://schemas.microsoft.com/office/drawing/2017/decorative" val="1"/>
                 </a:ext>
               </a:extLst>
             </p:cNvPr>
@@ -6791,7 +6791,7 @@
             <p:nvPr>
               <p:extLst>
                 <p:ext uri="{386F3935-93C4-4BCD-93E2-E3B085C9AB24}">
-                  <p16:designElem xmlns:p16="http://schemas.microsoft.com/office/powerpoint/2015/main" xmlns="" val="1"/>
+                  <p16:designElem xmlns="" xmlns:p16="http://schemas.microsoft.com/office/powerpoint/2015/main" val="1"/>
                 </p:ext>
               </p:extLst>
             </p:nvPr>
@@ -6846,10 +6846,10 @@
             <p:cNvPr id="29" name="Freeform 15">
               <a:extLst>
                 <a:ext uri="{FF2B5EF4-FFF2-40B4-BE49-F238E27FC236}">
-                  <a16:creationId xmlns:a16="http://schemas.microsoft.com/office/drawing/2014/main" xmlns="" id="{7505BF04-104D-4180-A284-42FCD6B04DD6}"/>
+                  <a16:creationId xmlns="" xmlns:a16="http://schemas.microsoft.com/office/drawing/2014/main" id="{7505BF04-104D-4180-A284-42FCD6B04DD6}"/>
                 </a:ext>
                 <a:ext uri="{C183D7F6-B498-43B3-948B-1728B52AA6E4}">
-                  <adec:decorative xmlns:adec="http://schemas.microsoft.com/office/drawing/2017/decorative" xmlns="" val="1"/>
+                  <adec:decorative xmlns="" xmlns:adec="http://schemas.microsoft.com/office/drawing/2017/decorative" val="1"/>
                 </a:ext>
               </a:extLst>
             </p:cNvPr>
@@ -6857,7 +6857,7 @@
             <p:nvPr>
               <p:extLst>
                 <p:ext uri="{386F3935-93C4-4BCD-93E2-E3B085C9AB24}">
-                  <p16:designElem xmlns:p16="http://schemas.microsoft.com/office/powerpoint/2015/main" xmlns="" val="1"/>
+                  <p16:designElem xmlns="" xmlns:p16="http://schemas.microsoft.com/office/powerpoint/2015/main" val="1"/>
                 </p:ext>
               </p:extLst>
             </p:nvPr>
@@ -6917,7 +6917,7 @@
           <p:cNvPr id="2" name="Title 1">
             <a:extLst>
               <a:ext uri="{FF2B5EF4-FFF2-40B4-BE49-F238E27FC236}">
-                <a16:creationId xmlns:a16="http://schemas.microsoft.com/office/drawing/2014/main" xmlns="" id="{652CD06E-EB43-4697-A9C1-290232C3BAD6}"/>
+                <a16:creationId xmlns="" xmlns:a16="http://schemas.microsoft.com/office/drawing/2014/main" id="{652CD06E-EB43-4697-A9C1-290232C3BAD6}"/>
               </a:ext>
             </a:extLst>
           </p:cNvPr>
@@ -6953,7 +6953,7 @@
           <p:cNvPr id="3" name="Subtitle 2">
             <a:extLst>
               <a:ext uri="{FF2B5EF4-FFF2-40B4-BE49-F238E27FC236}">
-                <a16:creationId xmlns:a16="http://schemas.microsoft.com/office/drawing/2014/main" xmlns="" id="{1FBBDE4E-FFA3-44D5-BA0B-7575E2214B7C}"/>
+                <a16:creationId xmlns="" xmlns:a16="http://schemas.microsoft.com/office/drawing/2014/main" id="{1FBBDE4E-FFA3-44D5-BA0B-7575E2214B7C}"/>
               </a:ext>
             </a:extLst>
           </p:cNvPr>
@@ -7027,10 +7027,10 @@
           <p:cNvPr id="21" name="Rectangle 20">
             <a:extLst>
               <a:ext uri="{FF2B5EF4-FFF2-40B4-BE49-F238E27FC236}">
-                <a16:creationId xmlns:a16="http://schemas.microsoft.com/office/drawing/2014/main" xmlns="" id="{99CAC3B1-4879-424D-8F15-206277196159}"/>
+                <a16:creationId xmlns="" xmlns:a16="http://schemas.microsoft.com/office/drawing/2014/main" id="{99CAC3B1-4879-424D-8F15-206277196159}"/>
               </a:ext>
               <a:ext uri="{C183D7F6-B498-43B3-948B-1728B52AA6E4}">
-                <adec:decorative xmlns:adec="http://schemas.microsoft.com/office/drawing/2017/decorative" xmlns="" val="1"/>
+                <adec:decorative xmlns="" xmlns:adec="http://schemas.microsoft.com/office/drawing/2017/decorative" val="1"/>
               </a:ext>
             </a:extLst>
           </p:cNvPr>
@@ -7040,7 +7040,7 @@
           <p:nvPr>
             <p:extLst>
               <p:ext uri="{386F3935-93C4-4BCD-93E2-E3B085C9AB24}">
-                <p16:designElem xmlns:p16="http://schemas.microsoft.com/office/powerpoint/2015/main" xmlns="" val="1"/>
+                <p16:designElem xmlns="" xmlns:p16="http://schemas.microsoft.com/office/powerpoint/2015/main" val="1"/>
               </p:ext>
             </p:extLst>
           </p:nvPr>
@@ -7087,10 +7087,10 @@
           <p:cNvPr id="23" name="Group 22">
             <a:extLst>
               <a:ext uri="{FF2B5EF4-FFF2-40B4-BE49-F238E27FC236}">
-                <a16:creationId xmlns:a16="http://schemas.microsoft.com/office/drawing/2014/main" xmlns="" id="{4B8492CB-DFBA-4A82-9778-F21493DA36C1}"/>
+                <a16:creationId xmlns="" xmlns:a16="http://schemas.microsoft.com/office/drawing/2014/main" id="{4B8492CB-DFBA-4A82-9778-F21493DA36C1}"/>
               </a:ext>
               <a:ext uri="{C183D7F6-B498-43B3-948B-1728B52AA6E4}">
-                <adec:decorative xmlns:adec="http://schemas.microsoft.com/office/drawing/2017/decorative" xmlns="" val="1"/>
+                <adec:decorative xmlns="" xmlns:adec="http://schemas.microsoft.com/office/drawing/2017/decorative" val="1"/>
               </a:ext>
             </a:extLst>
           </p:cNvPr>
@@ -7100,7 +7100,7 @@
           <p:nvPr>
             <p:extLst>
               <p:ext uri="{386F3935-93C4-4BCD-93E2-E3B085C9AB24}">
-                <p16:designElem xmlns:p16="http://schemas.microsoft.com/office/powerpoint/2015/main" xmlns="" val="1"/>
+                <p16:designElem xmlns="" xmlns:p16="http://schemas.microsoft.com/office/powerpoint/2015/main" val="1"/>
               </p:ext>
             </p:extLst>
           </p:nvPr>
@@ -7118,10 +7118,10 @@
             <p:cNvPr id="24" name="Freeform 6">
               <a:extLst>
                 <a:ext uri="{FF2B5EF4-FFF2-40B4-BE49-F238E27FC236}">
-                  <a16:creationId xmlns:a16="http://schemas.microsoft.com/office/drawing/2014/main" xmlns="" id="{E34CC1C8-EBDD-4AEA-83E6-B27575B62E2E}"/>
+                  <a16:creationId xmlns="" xmlns:a16="http://schemas.microsoft.com/office/drawing/2014/main" id="{E34CC1C8-EBDD-4AEA-83E6-B27575B62E2E}"/>
                 </a:ext>
                 <a:ext uri="{C183D7F6-B498-43B3-948B-1728B52AA6E4}">
-                  <adec:decorative xmlns:adec="http://schemas.microsoft.com/office/drawing/2017/decorative" xmlns="" val="1"/>
+                  <adec:decorative xmlns="" xmlns:adec="http://schemas.microsoft.com/office/drawing/2017/decorative" val="1"/>
                 </a:ext>
               </a:extLst>
             </p:cNvPr>
@@ -7129,7 +7129,7 @@
             <p:nvPr>
               <p:extLst>
                 <p:ext uri="{386F3935-93C4-4BCD-93E2-E3B085C9AB24}">
-                  <p16:designElem xmlns:p16="http://schemas.microsoft.com/office/powerpoint/2015/main" xmlns="" val="1"/>
+                  <p16:designElem xmlns="" xmlns:p16="http://schemas.microsoft.com/office/powerpoint/2015/main" val="1"/>
                 </p:ext>
               </p:extLst>
             </p:nvPr>
@@ -7179,10 +7179,10 @@
             <p:cNvPr id="25" name="Freeform 7">
               <a:extLst>
                 <a:ext uri="{FF2B5EF4-FFF2-40B4-BE49-F238E27FC236}">
-                  <a16:creationId xmlns:a16="http://schemas.microsoft.com/office/drawing/2014/main" xmlns="" id="{D6B38644-B85D-4211-9526-5B4C2A662BF7}"/>
+                  <a16:creationId xmlns="" xmlns:a16="http://schemas.microsoft.com/office/drawing/2014/main" id="{D6B38644-B85D-4211-9526-5B4C2A662BF7}"/>
                 </a:ext>
                 <a:ext uri="{C183D7F6-B498-43B3-948B-1728B52AA6E4}">
-                  <adec:decorative xmlns:adec="http://schemas.microsoft.com/office/drawing/2017/decorative" xmlns="" val="1"/>
+                  <adec:decorative xmlns="" xmlns:adec="http://schemas.microsoft.com/office/drawing/2017/decorative" val="1"/>
                 </a:ext>
               </a:extLst>
             </p:cNvPr>
@@ -7190,7 +7190,7 @@
             <p:nvPr>
               <p:extLst>
                 <p:ext uri="{386F3935-93C4-4BCD-93E2-E3B085C9AB24}">
-                  <p16:designElem xmlns:p16="http://schemas.microsoft.com/office/powerpoint/2015/main" xmlns="" val="1"/>
+                  <p16:designElem xmlns="" xmlns:p16="http://schemas.microsoft.com/office/powerpoint/2015/main" val="1"/>
                 </p:ext>
               </p:extLst>
             </p:nvPr>
@@ -7243,10 +7243,10 @@
             <p:cNvPr id="26" name="Freeform 12">
               <a:extLst>
                 <a:ext uri="{FF2B5EF4-FFF2-40B4-BE49-F238E27FC236}">
-                  <a16:creationId xmlns:a16="http://schemas.microsoft.com/office/drawing/2014/main" xmlns="" id="{8A8B2820-6B8F-4C19-BFC5-D28EE44E54CB}"/>
+                  <a16:creationId xmlns="" xmlns:a16="http://schemas.microsoft.com/office/drawing/2014/main" id="{8A8B2820-6B8F-4C19-BFC5-D28EE44E54CB}"/>
                 </a:ext>
                 <a:ext uri="{C183D7F6-B498-43B3-948B-1728B52AA6E4}">
-                  <adec:decorative xmlns:adec="http://schemas.microsoft.com/office/drawing/2017/decorative" xmlns="" val="1"/>
+                  <adec:decorative xmlns="" xmlns:adec="http://schemas.microsoft.com/office/drawing/2017/decorative" val="1"/>
                 </a:ext>
               </a:extLst>
             </p:cNvPr>
@@ -7254,7 +7254,7 @@
             <p:nvPr>
               <p:extLst>
                 <p:ext uri="{386F3935-93C4-4BCD-93E2-E3B085C9AB24}">
-                  <p16:designElem xmlns:p16="http://schemas.microsoft.com/office/powerpoint/2015/main" xmlns="" val="1"/>
+                  <p16:designElem xmlns="" xmlns:p16="http://schemas.microsoft.com/office/powerpoint/2015/main" val="1"/>
                 </p:ext>
               </p:extLst>
             </p:nvPr>
@@ -7301,10 +7301,10 @@
             <p:cNvPr id="27" name="Freeform 13">
               <a:extLst>
                 <a:ext uri="{FF2B5EF4-FFF2-40B4-BE49-F238E27FC236}">
-                  <a16:creationId xmlns:a16="http://schemas.microsoft.com/office/drawing/2014/main" xmlns="" id="{773528ED-4D37-4A77-A8CA-86B6221C5E82}"/>
+                  <a16:creationId xmlns="" xmlns:a16="http://schemas.microsoft.com/office/drawing/2014/main" id="{773528ED-4D37-4A77-A8CA-86B6221C5E82}"/>
                 </a:ext>
                 <a:ext uri="{C183D7F6-B498-43B3-948B-1728B52AA6E4}">
-                  <adec:decorative xmlns:adec="http://schemas.microsoft.com/office/drawing/2017/decorative" xmlns="" val="1"/>
+                  <adec:decorative xmlns="" xmlns:adec="http://schemas.microsoft.com/office/drawing/2017/decorative" val="1"/>
                 </a:ext>
               </a:extLst>
             </p:cNvPr>
@@ -7312,7 +7312,7 @@
             <p:nvPr>
               <p:extLst>
                 <p:ext uri="{386F3935-93C4-4BCD-93E2-E3B085C9AB24}">
-                  <p16:designElem xmlns:p16="http://schemas.microsoft.com/office/powerpoint/2015/main" xmlns="" val="1"/>
+                  <p16:designElem xmlns="" xmlns:p16="http://schemas.microsoft.com/office/powerpoint/2015/main" val="1"/>
                 </p:ext>
               </p:extLst>
             </p:nvPr>
@@ -7361,10 +7361,10 @@
             <p:cNvPr id="28" name="Freeform 14">
               <a:extLst>
                 <a:ext uri="{FF2B5EF4-FFF2-40B4-BE49-F238E27FC236}">
-                  <a16:creationId xmlns:a16="http://schemas.microsoft.com/office/drawing/2014/main" xmlns="" id="{8A58A902-E944-4399-9A93-A91A6A82B166}"/>
+                  <a16:creationId xmlns="" xmlns:a16="http://schemas.microsoft.com/office/drawing/2014/main" id="{8A58A902-E944-4399-9A93-A91A6A82B166}"/>
                 </a:ext>
                 <a:ext uri="{C183D7F6-B498-43B3-948B-1728B52AA6E4}">
-                  <adec:decorative xmlns:adec="http://schemas.microsoft.com/office/drawing/2017/decorative" xmlns="" val="1"/>
+                  <adec:decorative xmlns="" xmlns:adec="http://schemas.microsoft.com/office/drawing/2017/decorative" val="1"/>
                 </a:ext>
               </a:extLst>
             </p:cNvPr>
@@ -7372,7 +7372,7 @@
             <p:nvPr>
               <p:extLst>
                 <p:ext uri="{386F3935-93C4-4BCD-93E2-E3B085C9AB24}">
-                  <p16:designElem xmlns:p16="http://schemas.microsoft.com/office/powerpoint/2015/main" xmlns="" val="1"/>
+                  <p16:designElem xmlns="" xmlns:p16="http://schemas.microsoft.com/office/powerpoint/2015/main" val="1"/>
                 </p:ext>
               </p:extLst>
             </p:nvPr>
@@ -7427,10 +7427,10 @@
             <p:cNvPr id="29" name="Freeform 15">
               <a:extLst>
                 <a:ext uri="{FF2B5EF4-FFF2-40B4-BE49-F238E27FC236}">
-                  <a16:creationId xmlns:a16="http://schemas.microsoft.com/office/drawing/2014/main" xmlns="" id="{4EDB1155-2E8E-4FB8-AD42-101FE4383231}"/>
+                  <a16:creationId xmlns="" xmlns:a16="http://schemas.microsoft.com/office/drawing/2014/main" id="{4EDB1155-2E8E-4FB8-AD42-101FE4383231}"/>
                 </a:ext>
                 <a:ext uri="{C183D7F6-B498-43B3-948B-1728B52AA6E4}">
-                  <adec:decorative xmlns:adec="http://schemas.microsoft.com/office/drawing/2017/decorative" xmlns="" val="1"/>
+                  <adec:decorative xmlns="" xmlns:adec="http://schemas.microsoft.com/office/drawing/2017/decorative" val="1"/>
                 </a:ext>
               </a:extLst>
             </p:cNvPr>
@@ -7438,7 +7438,7 @@
             <p:nvPr>
               <p:extLst>
                 <p:ext uri="{386F3935-93C4-4BCD-93E2-E3B085C9AB24}">
-                  <p16:designElem xmlns:p16="http://schemas.microsoft.com/office/powerpoint/2015/main" xmlns="" val="1"/>
+                  <p16:designElem xmlns="" xmlns:p16="http://schemas.microsoft.com/office/powerpoint/2015/main" val="1"/>
                 </p:ext>
               </p:extLst>
             </p:nvPr>
@@ -7498,7 +7498,7 @@
           <p:cNvPr id="2" name="Title 1">
             <a:extLst>
               <a:ext uri="{FF2B5EF4-FFF2-40B4-BE49-F238E27FC236}">
-                <a16:creationId xmlns:a16="http://schemas.microsoft.com/office/drawing/2014/main" xmlns="" id="{C7492CCE-C435-464E-A19A-D4C606FDBE3D}"/>
+                <a16:creationId xmlns="" xmlns:a16="http://schemas.microsoft.com/office/drawing/2014/main" id="{C7492CCE-C435-464E-A19A-D4C606FDBE3D}"/>
               </a:ext>
             </a:extLst>
           </p:cNvPr>
@@ -7534,7 +7534,7 @@
           <p:cNvPr id="3" name="Content Placeholder 2">
             <a:extLst>
               <a:ext uri="{FF2B5EF4-FFF2-40B4-BE49-F238E27FC236}">
-                <a16:creationId xmlns:a16="http://schemas.microsoft.com/office/drawing/2014/main" xmlns="" id="{60DFF4FA-F598-4962-B6AB-31A8BE724E52}"/>
+                <a16:creationId xmlns="" xmlns:a16="http://schemas.microsoft.com/office/drawing/2014/main" id="{60DFF4FA-F598-4962-B6AB-31A8BE724E52}"/>
               </a:ext>
             </a:extLst>
           </p:cNvPr>
@@ -7638,10 +7638,10 @@
           <p:cNvPr id="21" name="Rectangle 20">
             <a:extLst>
               <a:ext uri="{FF2B5EF4-FFF2-40B4-BE49-F238E27FC236}">
-                <a16:creationId xmlns:a16="http://schemas.microsoft.com/office/drawing/2014/main" xmlns="" id="{99CAC3B1-4879-424D-8F15-206277196159}"/>
+                <a16:creationId xmlns="" xmlns:a16="http://schemas.microsoft.com/office/drawing/2014/main" id="{99CAC3B1-4879-424D-8F15-206277196159}"/>
               </a:ext>
               <a:ext uri="{C183D7F6-B498-43B3-948B-1728B52AA6E4}">
-                <adec:decorative xmlns:adec="http://schemas.microsoft.com/office/drawing/2017/decorative" xmlns="" val="1"/>
+                <adec:decorative xmlns="" xmlns:adec="http://schemas.microsoft.com/office/drawing/2017/decorative" val="1"/>
               </a:ext>
             </a:extLst>
           </p:cNvPr>
@@ -7651,7 +7651,7 @@
           <p:nvPr>
             <p:extLst>
               <p:ext uri="{386F3935-93C4-4BCD-93E2-E3B085C9AB24}">
-                <p16:designElem xmlns:p16="http://schemas.microsoft.com/office/powerpoint/2015/main" xmlns="" val="1"/>
+                <p16:designElem xmlns="" xmlns:p16="http://schemas.microsoft.com/office/powerpoint/2015/main" val="1"/>
               </p:ext>
             </p:extLst>
           </p:nvPr>
@@ -7698,10 +7698,10 @@
           <p:cNvPr id="23" name="Group 22">
             <a:extLst>
               <a:ext uri="{FF2B5EF4-FFF2-40B4-BE49-F238E27FC236}">
-                <a16:creationId xmlns:a16="http://schemas.microsoft.com/office/drawing/2014/main" xmlns="" id="{4B8492CB-DFBA-4A82-9778-F21493DA36C1}"/>
+                <a16:creationId xmlns="" xmlns:a16="http://schemas.microsoft.com/office/drawing/2014/main" id="{4B8492CB-DFBA-4A82-9778-F21493DA36C1}"/>
               </a:ext>
               <a:ext uri="{C183D7F6-B498-43B3-948B-1728B52AA6E4}">
-                <adec:decorative xmlns:adec="http://schemas.microsoft.com/office/drawing/2017/decorative" xmlns="" val="1"/>
+                <adec:decorative xmlns="" xmlns:adec="http://schemas.microsoft.com/office/drawing/2017/decorative" val="1"/>
               </a:ext>
             </a:extLst>
           </p:cNvPr>
@@ -7711,7 +7711,7 @@
           <p:nvPr>
             <p:extLst>
               <p:ext uri="{386F3935-93C4-4BCD-93E2-E3B085C9AB24}">
-                <p16:designElem xmlns:p16="http://schemas.microsoft.com/office/powerpoint/2015/main" xmlns="" val="1"/>
+                <p16:designElem xmlns="" xmlns:p16="http://schemas.microsoft.com/office/powerpoint/2015/main" val="1"/>
               </p:ext>
             </p:extLst>
           </p:nvPr>
@@ -7729,10 +7729,10 @@
             <p:cNvPr id="24" name="Freeform 6">
               <a:extLst>
                 <a:ext uri="{FF2B5EF4-FFF2-40B4-BE49-F238E27FC236}">
-                  <a16:creationId xmlns:a16="http://schemas.microsoft.com/office/drawing/2014/main" xmlns="" id="{E34CC1C8-EBDD-4AEA-83E6-B27575B62E2E}"/>
+                  <a16:creationId xmlns="" xmlns:a16="http://schemas.microsoft.com/office/drawing/2014/main" id="{E34CC1C8-EBDD-4AEA-83E6-B27575B62E2E}"/>
                 </a:ext>
                 <a:ext uri="{C183D7F6-B498-43B3-948B-1728B52AA6E4}">
-                  <adec:decorative xmlns:adec="http://schemas.microsoft.com/office/drawing/2017/decorative" xmlns="" val="1"/>
+                  <adec:decorative xmlns="" xmlns:adec="http://schemas.microsoft.com/office/drawing/2017/decorative" val="1"/>
                 </a:ext>
               </a:extLst>
             </p:cNvPr>
@@ -7740,7 +7740,7 @@
             <p:nvPr>
               <p:extLst>
                 <p:ext uri="{386F3935-93C4-4BCD-93E2-E3B085C9AB24}">
-                  <p16:designElem xmlns:p16="http://schemas.microsoft.com/office/powerpoint/2015/main" xmlns="" val="1"/>
+                  <p16:designElem xmlns="" xmlns:p16="http://schemas.microsoft.com/office/powerpoint/2015/main" val="1"/>
                 </p:ext>
               </p:extLst>
             </p:nvPr>
@@ -7790,10 +7790,10 @@
             <p:cNvPr id="25" name="Freeform 7">
               <a:extLst>
                 <a:ext uri="{FF2B5EF4-FFF2-40B4-BE49-F238E27FC236}">
-                  <a16:creationId xmlns:a16="http://schemas.microsoft.com/office/drawing/2014/main" xmlns="" id="{D6B38644-B85D-4211-9526-5B4C2A662BF7}"/>
+                  <a16:creationId xmlns="" xmlns:a16="http://schemas.microsoft.com/office/drawing/2014/main" id="{D6B38644-B85D-4211-9526-5B4C2A662BF7}"/>
                 </a:ext>
                 <a:ext uri="{C183D7F6-B498-43B3-948B-1728B52AA6E4}">
-                  <adec:decorative xmlns:adec="http://schemas.microsoft.com/office/drawing/2017/decorative" xmlns="" val="1"/>
+                  <adec:decorative xmlns="" xmlns:adec="http://schemas.microsoft.com/office/drawing/2017/decorative" val="1"/>
                 </a:ext>
               </a:extLst>
             </p:cNvPr>
@@ -7801,7 +7801,7 @@
             <p:nvPr>
               <p:extLst>
                 <p:ext uri="{386F3935-93C4-4BCD-93E2-E3B085C9AB24}">
-                  <p16:designElem xmlns:p16="http://schemas.microsoft.com/office/powerpoint/2015/main" xmlns="" val="1"/>
+                  <p16:designElem xmlns="" xmlns:p16="http://schemas.microsoft.com/office/powerpoint/2015/main" val="1"/>
                 </p:ext>
               </p:extLst>
             </p:nvPr>
@@ -7854,10 +7854,10 @@
             <p:cNvPr id="26" name="Freeform 12">
               <a:extLst>
                 <a:ext uri="{FF2B5EF4-FFF2-40B4-BE49-F238E27FC236}">
-                  <a16:creationId xmlns:a16="http://schemas.microsoft.com/office/drawing/2014/main" xmlns="" id="{8A8B2820-6B8F-4C19-BFC5-D28EE44E54CB}"/>
+                  <a16:creationId xmlns="" xmlns:a16="http://schemas.microsoft.com/office/drawing/2014/main" id="{8A8B2820-6B8F-4C19-BFC5-D28EE44E54CB}"/>
                 </a:ext>
                 <a:ext uri="{C183D7F6-B498-43B3-948B-1728B52AA6E4}">
-                  <adec:decorative xmlns:adec="http://schemas.microsoft.com/office/drawing/2017/decorative" xmlns="" val="1"/>
+                  <adec:decorative xmlns="" xmlns:adec="http://schemas.microsoft.com/office/drawing/2017/decorative" val="1"/>
                 </a:ext>
               </a:extLst>
             </p:cNvPr>
@@ -7865,7 +7865,7 @@
             <p:nvPr>
               <p:extLst>
                 <p:ext uri="{386F3935-93C4-4BCD-93E2-E3B085C9AB24}">
-                  <p16:designElem xmlns:p16="http://schemas.microsoft.com/office/powerpoint/2015/main" xmlns="" val="1"/>
+                  <p16:designElem xmlns="" xmlns:p16="http://schemas.microsoft.com/office/powerpoint/2015/main" val="1"/>
                 </p:ext>
               </p:extLst>
             </p:nvPr>
@@ -7912,10 +7912,10 @@
             <p:cNvPr id="27" name="Freeform 13">
               <a:extLst>
                 <a:ext uri="{FF2B5EF4-FFF2-40B4-BE49-F238E27FC236}">
-                  <a16:creationId xmlns:a16="http://schemas.microsoft.com/office/drawing/2014/main" xmlns="" id="{773528ED-4D37-4A77-A8CA-86B6221C5E82}"/>
+                  <a16:creationId xmlns="" xmlns:a16="http://schemas.microsoft.com/office/drawing/2014/main" id="{773528ED-4D37-4A77-A8CA-86B6221C5E82}"/>
                 </a:ext>
                 <a:ext uri="{C183D7F6-B498-43B3-948B-1728B52AA6E4}">
-                  <adec:decorative xmlns:adec="http://schemas.microsoft.com/office/drawing/2017/decorative" xmlns="" val="1"/>
+                  <adec:decorative xmlns="" xmlns:adec="http://schemas.microsoft.com/office/drawing/2017/decorative" val="1"/>
                 </a:ext>
               </a:extLst>
             </p:cNvPr>
@@ -7923,7 +7923,7 @@
             <p:nvPr>
               <p:extLst>
                 <p:ext uri="{386F3935-93C4-4BCD-93E2-E3B085C9AB24}">
-                  <p16:designElem xmlns:p16="http://schemas.microsoft.com/office/powerpoint/2015/main" xmlns="" val="1"/>
+                  <p16:designElem xmlns="" xmlns:p16="http://schemas.microsoft.com/office/powerpoint/2015/main" val="1"/>
                 </p:ext>
               </p:extLst>
             </p:nvPr>
@@ -7972,10 +7972,10 @@
             <p:cNvPr id="28" name="Freeform 14">
               <a:extLst>
                 <a:ext uri="{FF2B5EF4-FFF2-40B4-BE49-F238E27FC236}">
-                  <a16:creationId xmlns:a16="http://schemas.microsoft.com/office/drawing/2014/main" xmlns="" id="{8A58A902-E944-4399-9A93-A91A6A82B166}"/>
+                  <a16:creationId xmlns="" xmlns:a16="http://schemas.microsoft.com/office/drawing/2014/main" id="{8A58A902-E944-4399-9A93-A91A6A82B166}"/>
                 </a:ext>
                 <a:ext uri="{C183D7F6-B498-43B3-948B-1728B52AA6E4}">
-                  <adec:decorative xmlns:adec="http://schemas.microsoft.com/office/drawing/2017/decorative" xmlns="" val="1"/>
+                  <adec:decorative xmlns="" xmlns:adec="http://schemas.microsoft.com/office/drawing/2017/decorative" val="1"/>
                 </a:ext>
               </a:extLst>
             </p:cNvPr>
@@ -7983,7 +7983,7 @@
             <p:nvPr>
               <p:extLst>
                 <p:ext uri="{386F3935-93C4-4BCD-93E2-E3B085C9AB24}">
-                  <p16:designElem xmlns:p16="http://schemas.microsoft.com/office/powerpoint/2015/main" xmlns="" val="1"/>
+                  <p16:designElem xmlns="" xmlns:p16="http://schemas.microsoft.com/office/powerpoint/2015/main" val="1"/>
                 </p:ext>
               </p:extLst>
             </p:nvPr>
@@ -8038,10 +8038,10 @@
             <p:cNvPr id="29" name="Freeform 15">
               <a:extLst>
                 <a:ext uri="{FF2B5EF4-FFF2-40B4-BE49-F238E27FC236}">
-                  <a16:creationId xmlns:a16="http://schemas.microsoft.com/office/drawing/2014/main" xmlns="" id="{4EDB1155-2E8E-4FB8-AD42-101FE4383231}"/>
+                  <a16:creationId xmlns="" xmlns:a16="http://schemas.microsoft.com/office/drawing/2014/main" id="{4EDB1155-2E8E-4FB8-AD42-101FE4383231}"/>
                 </a:ext>
                 <a:ext uri="{C183D7F6-B498-43B3-948B-1728B52AA6E4}">
-                  <adec:decorative xmlns:adec="http://schemas.microsoft.com/office/drawing/2017/decorative" xmlns="" val="1"/>
+                  <adec:decorative xmlns="" xmlns:adec="http://schemas.microsoft.com/office/drawing/2017/decorative" val="1"/>
                 </a:ext>
               </a:extLst>
             </p:cNvPr>
@@ -8049,7 +8049,7 @@
             <p:nvPr>
               <p:extLst>
                 <p:ext uri="{386F3935-93C4-4BCD-93E2-E3B085C9AB24}">
-                  <p16:designElem xmlns:p16="http://schemas.microsoft.com/office/powerpoint/2015/main" xmlns="" val="1"/>
+                  <p16:designElem xmlns="" xmlns:p16="http://schemas.microsoft.com/office/powerpoint/2015/main" val="1"/>
                 </p:ext>
               </p:extLst>
             </p:nvPr>
@@ -8109,7 +8109,7 @@
           <p:cNvPr id="2" name="Title 1">
             <a:extLst>
               <a:ext uri="{FF2B5EF4-FFF2-40B4-BE49-F238E27FC236}">
-                <a16:creationId xmlns:a16="http://schemas.microsoft.com/office/drawing/2014/main" xmlns="" id="{C7492CCE-C435-464E-A19A-D4C606FDBE3D}"/>
+                <a16:creationId xmlns="" xmlns:a16="http://schemas.microsoft.com/office/drawing/2014/main" id="{C7492CCE-C435-464E-A19A-D4C606FDBE3D}"/>
               </a:ext>
             </a:extLst>
           </p:cNvPr>
@@ -8142,7 +8142,7 @@
           <p:cNvPr id="3" name="Content Placeholder 2">
             <a:extLst>
               <a:ext uri="{FF2B5EF4-FFF2-40B4-BE49-F238E27FC236}">
-                <a16:creationId xmlns:a16="http://schemas.microsoft.com/office/drawing/2014/main" xmlns="" id="{60DFF4FA-F598-4962-B6AB-31A8BE724E52}"/>
+                <a16:creationId xmlns="" xmlns:a16="http://schemas.microsoft.com/office/drawing/2014/main" id="{60DFF4FA-F598-4962-B6AB-31A8BE724E52}"/>
               </a:ext>
             </a:extLst>
           </p:cNvPr>
@@ -8174,7 +8174,7 @@
           <p:cNvPr id="5" name="TextBox 4">
             <a:extLst>
               <a:ext uri="{FF2B5EF4-FFF2-40B4-BE49-F238E27FC236}">
-                <a16:creationId xmlns:a16="http://schemas.microsoft.com/office/drawing/2014/main" xmlns="" id="{466A409B-90E2-4ACB-8A16-0329B5CEE6DF}"/>
+                <a16:creationId xmlns="" xmlns:a16="http://schemas.microsoft.com/office/drawing/2014/main" id="{466A409B-90E2-4ACB-8A16-0329B5CEE6DF}"/>
               </a:ext>
             </a:extLst>
           </p:cNvPr>
@@ -8225,7 +8225,7 @@
           <p:cNvPr id="7" name="Straight Arrow Connector 6">
             <a:extLst>
               <a:ext uri="{FF2B5EF4-FFF2-40B4-BE49-F238E27FC236}">
-                <a16:creationId xmlns:a16="http://schemas.microsoft.com/office/drawing/2014/main" xmlns="" id="{6C986E87-252D-4CDD-90A3-050A5080DF44}"/>
+                <a16:creationId xmlns="" xmlns:a16="http://schemas.microsoft.com/office/drawing/2014/main" id="{6C986E87-252D-4CDD-90A3-050A5080DF44}"/>
               </a:ext>
             </a:extLst>
           </p:cNvPr>
@@ -8266,7 +8266,7 @@
           <p:cNvPr id="17" name="Straight Arrow Connector 16">
             <a:extLst>
               <a:ext uri="{FF2B5EF4-FFF2-40B4-BE49-F238E27FC236}">
-                <a16:creationId xmlns:a16="http://schemas.microsoft.com/office/drawing/2014/main" xmlns="" id="{8B32EEAB-6F30-4731-8D76-02708A63C23C}"/>
+                <a16:creationId xmlns="" xmlns:a16="http://schemas.microsoft.com/office/drawing/2014/main" id="{8B32EEAB-6F30-4731-8D76-02708A63C23C}"/>
               </a:ext>
             </a:extLst>
           </p:cNvPr>
@@ -8307,7 +8307,7 @@
           <p:cNvPr id="18" name="Straight Arrow Connector 17">
             <a:extLst>
               <a:ext uri="{FF2B5EF4-FFF2-40B4-BE49-F238E27FC236}">
-                <a16:creationId xmlns:a16="http://schemas.microsoft.com/office/drawing/2014/main" xmlns="" id="{E930BBA9-7BA1-48A0-A9E1-F9545CD11BAA}"/>
+                <a16:creationId xmlns="" xmlns:a16="http://schemas.microsoft.com/office/drawing/2014/main" id="{E930BBA9-7BA1-48A0-A9E1-F9545CD11BAA}"/>
               </a:ext>
             </a:extLst>
           </p:cNvPr>
@@ -8348,7 +8348,7 @@
           <p:cNvPr id="19" name="Straight Arrow Connector 18">
             <a:extLst>
               <a:ext uri="{FF2B5EF4-FFF2-40B4-BE49-F238E27FC236}">
-                <a16:creationId xmlns:a16="http://schemas.microsoft.com/office/drawing/2014/main" xmlns="" id="{72D8D5ED-08A2-4E59-AA33-3E70202E855D}"/>
+                <a16:creationId xmlns="" xmlns:a16="http://schemas.microsoft.com/office/drawing/2014/main" id="{72D8D5ED-08A2-4E59-AA33-3E70202E855D}"/>
               </a:ext>
             </a:extLst>
           </p:cNvPr>
@@ -8427,10 +8427,10 @@
           <p:cNvPr id="21" name="Rectangle 20">
             <a:extLst>
               <a:ext uri="{FF2B5EF4-FFF2-40B4-BE49-F238E27FC236}">
-                <a16:creationId xmlns:a16="http://schemas.microsoft.com/office/drawing/2014/main" xmlns="" id="{99CAC3B1-4879-424D-8F15-206277196159}"/>
+                <a16:creationId xmlns="" xmlns:a16="http://schemas.microsoft.com/office/drawing/2014/main" id="{99CAC3B1-4879-424D-8F15-206277196159}"/>
               </a:ext>
               <a:ext uri="{C183D7F6-B498-43B3-948B-1728B52AA6E4}">
-                <adec:decorative xmlns:adec="http://schemas.microsoft.com/office/drawing/2017/decorative" xmlns="" val="1"/>
+                <adec:decorative xmlns="" xmlns:adec="http://schemas.microsoft.com/office/drawing/2017/decorative" val="1"/>
               </a:ext>
             </a:extLst>
           </p:cNvPr>
@@ -8440,7 +8440,7 @@
           <p:nvPr>
             <p:extLst>
               <p:ext uri="{386F3935-93C4-4BCD-93E2-E3B085C9AB24}">
-                <p16:designElem xmlns:p16="http://schemas.microsoft.com/office/powerpoint/2015/main" xmlns="" val="1"/>
+                <p16:designElem xmlns="" xmlns:p16="http://schemas.microsoft.com/office/powerpoint/2015/main" val="1"/>
               </p:ext>
             </p:extLst>
           </p:nvPr>
@@ -8487,10 +8487,10 @@
           <p:cNvPr id="23" name="Group 22">
             <a:extLst>
               <a:ext uri="{FF2B5EF4-FFF2-40B4-BE49-F238E27FC236}">
-                <a16:creationId xmlns:a16="http://schemas.microsoft.com/office/drawing/2014/main" xmlns="" id="{4B8492CB-DFBA-4A82-9778-F21493DA36C1}"/>
+                <a16:creationId xmlns="" xmlns:a16="http://schemas.microsoft.com/office/drawing/2014/main" id="{4B8492CB-DFBA-4A82-9778-F21493DA36C1}"/>
               </a:ext>
               <a:ext uri="{C183D7F6-B498-43B3-948B-1728B52AA6E4}">
-                <adec:decorative xmlns:adec="http://schemas.microsoft.com/office/drawing/2017/decorative" xmlns="" val="1"/>
+                <adec:decorative xmlns="" xmlns:adec="http://schemas.microsoft.com/office/drawing/2017/decorative" val="1"/>
               </a:ext>
             </a:extLst>
           </p:cNvPr>
@@ -8500,7 +8500,7 @@
           <p:nvPr>
             <p:extLst>
               <p:ext uri="{386F3935-93C4-4BCD-93E2-E3B085C9AB24}">
-                <p16:designElem xmlns:p16="http://schemas.microsoft.com/office/powerpoint/2015/main" xmlns="" val="1"/>
+                <p16:designElem xmlns="" xmlns:p16="http://schemas.microsoft.com/office/powerpoint/2015/main" val="1"/>
               </p:ext>
             </p:extLst>
           </p:nvPr>
@@ -8518,10 +8518,10 @@
             <p:cNvPr id="24" name="Freeform 6">
               <a:extLst>
                 <a:ext uri="{FF2B5EF4-FFF2-40B4-BE49-F238E27FC236}">
-                  <a16:creationId xmlns:a16="http://schemas.microsoft.com/office/drawing/2014/main" xmlns="" id="{E34CC1C8-EBDD-4AEA-83E6-B27575B62E2E}"/>
+                  <a16:creationId xmlns="" xmlns:a16="http://schemas.microsoft.com/office/drawing/2014/main" id="{E34CC1C8-EBDD-4AEA-83E6-B27575B62E2E}"/>
                 </a:ext>
                 <a:ext uri="{C183D7F6-B498-43B3-948B-1728B52AA6E4}">
-                  <adec:decorative xmlns:adec="http://schemas.microsoft.com/office/drawing/2017/decorative" xmlns="" val="1"/>
+                  <adec:decorative xmlns="" xmlns:adec="http://schemas.microsoft.com/office/drawing/2017/decorative" val="1"/>
                 </a:ext>
               </a:extLst>
             </p:cNvPr>
@@ -8529,7 +8529,7 @@
             <p:nvPr>
               <p:extLst>
                 <p:ext uri="{386F3935-93C4-4BCD-93E2-E3B085C9AB24}">
-                  <p16:designElem xmlns:p16="http://schemas.microsoft.com/office/powerpoint/2015/main" xmlns="" val="1"/>
+                  <p16:designElem xmlns="" xmlns:p16="http://schemas.microsoft.com/office/powerpoint/2015/main" val="1"/>
                 </p:ext>
               </p:extLst>
             </p:nvPr>
@@ -8579,10 +8579,10 @@
             <p:cNvPr id="25" name="Freeform 7">
               <a:extLst>
                 <a:ext uri="{FF2B5EF4-FFF2-40B4-BE49-F238E27FC236}">
-                  <a16:creationId xmlns:a16="http://schemas.microsoft.com/office/drawing/2014/main" xmlns="" id="{D6B38644-B85D-4211-9526-5B4C2A662BF7}"/>
+                  <a16:creationId xmlns="" xmlns:a16="http://schemas.microsoft.com/office/drawing/2014/main" id="{D6B38644-B85D-4211-9526-5B4C2A662BF7}"/>
                 </a:ext>
                 <a:ext uri="{C183D7F6-B498-43B3-948B-1728B52AA6E4}">
-                  <adec:decorative xmlns:adec="http://schemas.microsoft.com/office/drawing/2017/decorative" xmlns="" val="1"/>
+                  <adec:decorative xmlns="" xmlns:adec="http://schemas.microsoft.com/office/drawing/2017/decorative" val="1"/>
                 </a:ext>
               </a:extLst>
             </p:cNvPr>
@@ -8590,7 +8590,7 @@
             <p:nvPr>
               <p:extLst>
                 <p:ext uri="{386F3935-93C4-4BCD-93E2-E3B085C9AB24}">
-                  <p16:designElem xmlns:p16="http://schemas.microsoft.com/office/powerpoint/2015/main" xmlns="" val="1"/>
+                  <p16:designElem xmlns="" xmlns:p16="http://schemas.microsoft.com/office/powerpoint/2015/main" val="1"/>
                 </p:ext>
               </p:extLst>
             </p:nvPr>
@@ -8643,10 +8643,10 @@
             <p:cNvPr id="26" name="Freeform 12">
               <a:extLst>
                 <a:ext uri="{FF2B5EF4-FFF2-40B4-BE49-F238E27FC236}">
-                  <a16:creationId xmlns:a16="http://schemas.microsoft.com/office/drawing/2014/main" xmlns="" id="{8A8B2820-6B8F-4C19-BFC5-D28EE44E54CB}"/>
+                  <a16:creationId xmlns="" xmlns:a16="http://schemas.microsoft.com/office/drawing/2014/main" id="{8A8B2820-6B8F-4C19-BFC5-D28EE44E54CB}"/>
                 </a:ext>
                 <a:ext uri="{C183D7F6-B498-43B3-948B-1728B52AA6E4}">
-                  <adec:decorative xmlns:adec="http://schemas.microsoft.com/office/drawing/2017/decorative" xmlns="" val="1"/>
+                  <adec:decorative xmlns="" xmlns:adec="http://schemas.microsoft.com/office/drawing/2017/decorative" val="1"/>
                 </a:ext>
               </a:extLst>
             </p:cNvPr>
@@ -8654,7 +8654,7 @@
             <p:nvPr>
               <p:extLst>
                 <p:ext uri="{386F3935-93C4-4BCD-93E2-E3B085C9AB24}">
-                  <p16:designElem xmlns:p16="http://schemas.microsoft.com/office/powerpoint/2015/main" xmlns="" val="1"/>
+                  <p16:designElem xmlns="" xmlns:p16="http://schemas.microsoft.com/office/powerpoint/2015/main" val="1"/>
                 </p:ext>
               </p:extLst>
             </p:nvPr>
@@ -8701,10 +8701,10 @@
             <p:cNvPr id="27" name="Freeform 13">
               <a:extLst>
                 <a:ext uri="{FF2B5EF4-FFF2-40B4-BE49-F238E27FC236}">
-                  <a16:creationId xmlns:a16="http://schemas.microsoft.com/office/drawing/2014/main" xmlns="" id="{773528ED-4D37-4A77-A8CA-86B6221C5E82}"/>
+                  <a16:creationId xmlns="" xmlns:a16="http://schemas.microsoft.com/office/drawing/2014/main" id="{773528ED-4D37-4A77-A8CA-86B6221C5E82}"/>
                 </a:ext>
                 <a:ext uri="{C183D7F6-B498-43B3-948B-1728B52AA6E4}">
-                  <adec:decorative xmlns:adec="http://schemas.microsoft.com/office/drawing/2017/decorative" xmlns="" val="1"/>
+                  <adec:decorative xmlns="" xmlns:adec="http://schemas.microsoft.com/office/drawing/2017/decorative" val="1"/>
                 </a:ext>
               </a:extLst>
             </p:cNvPr>
@@ -8712,7 +8712,7 @@
             <p:nvPr>
               <p:extLst>
                 <p:ext uri="{386F3935-93C4-4BCD-93E2-E3B085C9AB24}">
-                  <p16:designElem xmlns:p16="http://schemas.microsoft.com/office/powerpoint/2015/main" xmlns="" val="1"/>
+                  <p16:designElem xmlns="" xmlns:p16="http://schemas.microsoft.com/office/powerpoint/2015/main" val="1"/>
                 </p:ext>
               </p:extLst>
             </p:nvPr>
@@ -8761,10 +8761,10 @@
             <p:cNvPr id="28" name="Freeform 14">
               <a:extLst>
                 <a:ext uri="{FF2B5EF4-FFF2-40B4-BE49-F238E27FC236}">
-                  <a16:creationId xmlns:a16="http://schemas.microsoft.com/office/drawing/2014/main" xmlns="" id="{8A58A902-E944-4399-9A93-A91A6A82B166}"/>
+                  <a16:creationId xmlns="" xmlns:a16="http://schemas.microsoft.com/office/drawing/2014/main" id="{8A58A902-E944-4399-9A93-A91A6A82B166}"/>
                 </a:ext>
                 <a:ext uri="{C183D7F6-B498-43B3-948B-1728B52AA6E4}">
-                  <adec:decorative xmlns:adec="http://schemas.microsoft.com/office/drawing/2017/decorative" xmlns="" val="1"/>
+                  <adec:decorative xmlns="" xmlns:adec="http://schemas.microsoft.com/office/drawing/2017/decorative" val="1"/>
                 </a:ext>
               </a:extLst>
             </p:cNvPr>
@@ -8772,7 +8772,7 @@
             <p:nvPr>
               <p:extLst>
                 <p:ext uri="{386F3935-93C4-4BCD-93E2-E3B085C9AB24}">
-                  <p16:designElem xmlns:p16="http://schemas.microsoft.com/office/powerpoint/2015/main" xmlns="" val="1"/>
+                  <p16:designElem xmlns="" xmlns:p16="http://schemas.microsoft.com/office/powerpoint/2015/main" val="1"/>
                 </p:ext>
               </p:extLst>
             </p:nvPr>
@@ -8827,10 +8827,10 @@
             <p:cNvPr id="29" name="Freeform 15">
               <a:extLst>
                 <a:ext uri="{FF2B5EF4-FFF2-40B4-BE49-F238E27FC236}">
-                  <a16:creationId xmlns:a16="http://schemas.microsoft.com/office/drawing/2014/main" xmlns="" id="{4EDB1155-2E8E-4FB8-AD42-101FE4383231}"/>
+                  <a16:creationId xmlns="" xmlns:a16="http://schemas.microsoft.com/office/drawing/2014/main" id="{4EDB1155-2E8E-4FB8-AD42-101FE4383231}"/>
                 </a:ext>
                 <a:ext uri="{C183D7F6-B498-43B3-948B-1728B52AA6E4}">
-                  <adec:decorative xmlns:adec="http://schemas.microsoft.com/office/drawing/2017/decorative" xmlns="" val="1"/>
+                  <adec:decorative xmlns="" xmlns:adec="http://schemas.microsoft.com/office/drawing/2017/decorative" val="1"/>
                 </a:ext>
               </a:extLst>
             </p:cNvPr>
@@ -8838,7 +8838,7 @@
             <p:nvPr>
               <p:extLst>
                 <p:ext uri="{386F3935-93C4-4BCD-93E2-E3B085C9AB24}">
-                  <p16:designElem xmlns:p16="http://schemas.microsoft.com/office/powerpoint/2015/main" xmlns="" val="1"/>
+                  <p16:designElem xmlns="" xmlns:p16="http://schemas.microsoft.com/office/powerpoint/2015/main" val="1"/>
                 </p:ext>
               </p:extLst>
             </p:nvPr>
@@ -8898,7 +8898,7 @@
           <p:cNvPr id="2" name="Title 1">
             <a:extLst>
               <a:ext uri="{FF2B5EF4-FFF2-40B4-BE49-F238E27FC236}">
-                <a16:creationId xmlns:a16="http://schemas.microsoft.com/office/drawing/2014/main" xmlns="" id="{C7492CCE-C435-464E-A19A-D4C606FDBE3D}"/>
+                <a16:creationId xmlns="" xmlns:a16="http://schemas.microsoft.com/office/drawing/2014/main" id="{C7492CCE-C435-464E-A19A-D4C606FDBE3D}"/>
               </a:ext>
             </a:extLst>
           </p:cNvPr>
@@ -8934,7 +8934,7 @@
           <p:cNvPr id="3" name="Content Placeholder 2">
             <a:extLst>
               <a:ext uri="{FF2B5EF4-FFF2-40B4-BE49-F238E27FC236}">
-                <a16:creationId xmlns:a16="http://schemas.microsoft.com/office/drawing/2014/main" xmlns="" id="{60DFF4FA-F598-4962-B6AB-31A8BE724E52}"/>
+                <a16:creationId xmlns="" xmlns:a16="http://schemas.microsoft.com/office/drawing/2014/main" id="{60DFF4FA-F598-4962-B6AB-31A8BE724E52}"/>
               </a:ext>
             </a:extLst>
           </p:cNvPr>
@@ -9038,10 +9038,10 @@
           <p:cNvPr id="21" name="Rectangle 20">
             <a:extLst>
               <a:ext uri="{FF2B5EF4-FFF2-40B4-BE49-F238E27FC236}">
-                <a16:creationId xmlns:a16="http://schemas.microsoft.com/office/drawing/2014/main" xmlns="" id="{99CAC3B1-4879-424D-8F15-206277196159}"/>
+                <a16:creationId xmlns="" xmlns:a16="http://schemas.microsoft.com/office/drawing/2014/main" id="{99CAC3B1-4879-424D-8F15-206277196159}"/>
               </a:ext>
               <a:ext uri="{C183D7F6-B498-43B3-948B-1728B52AA6E4}">
-                <adec:decorative xmlns:adec="http://schemas.microsoft.com/office/drawing/2017/decorative" xmlns="" val="1"/>
+                <adec:decorative xmlns="" xmlns:adec="http://schemas.microsoft.com/office/drawing/2017/decorative" val="1"/>
               </a:ext>
             </a:extLst>
           </p:cNvPr>
@@ -9051,7 +9051,7 @@
           <p:nvPr>
             <p:extLst>
               <p:ext uri="{386F3935-93C4-4BCD-93E2-E3B085C9AB24}">
-                <p16:designElem xmlns:p16="http://schemas.microsoft.com/office/powerpoint/2015/main" xmlns="" val="1"/>
+                <p16:designElem xmlns="" xmlns:p16="http://schemas.microsoft.com/office/powerpoint/2015/main" val="1"/>
               </p:ext>
             </p:extLst>
           </p:nvPr>
@@ -9098,10 +9098,10 @@
           <p:cNvPr id="23" name="Group 22">
             <a:extLst>
               <a:ext uri="{FF2B5EF4-FFF2-40B4-BE49-F238E27FC236}">
-                <a16:creationId xmlns:a16="http://schemas.microsoft.com/office/drawing/2014/main" xmlns="" id="{4B8492CB-DFBA-4A82-9778-F21493DA36C1}"/>
+                <a16:creationId xmlns="" xmlns:a16="http://schemas.microsoft.com/office/drawing/2014/main" id="{4B8492CB-DFBA-4A82-9778-F21493DA36C1}"/>
               </a:ext>
               <a:ext uri="{C183D7F6-B498-43B3-948B-1728B52AA6E4}">
-                <adec:decorative xmlns:adec="http://schemas.microsoft.com/office/drawing/2017/decorative" xmlns="" val="1"/>
+                <adec:decorative xmlns="" xmlns:adec="http://schemas.microsoft.com/office/drawing/2017/decorative" val="1"/>
               </a:ext>
             </a:extLst>
           </p:cNvPr>
@@ -9111,7 +9111,7 @@
           <p:nvPr>
             <p:extLst>
               <p:ext uri="{386F3935-93C4-4BCD-93E2-E3B085C9AB24}">
-                <p16:designElem xmlns:p16="http://schemas.microsoft.com/office/powerpoint/2015/main" xmlns="" val="1"/>
+                <p16:designElem xmlns="" xmlns:p16="http://schemas.microsoft.com/office/powerpoint/2015/main" val="1"/>
               </p:ext>
             </p:extLst>
           </p:nvPr>
@@ -9129,10 +9129,10 @@
             <p:cNvPr id="24" name="Freeform 6">
               <a:extLst>
                 <a:ext uri="{FF2B5EF4-FFF2-40B4-BE49-F238E27FC236}">
-                  <a16:creationId xmlns:a16="http://schemas.microsoft.com/office/drawing/2014/main" xmlns="" id="{E34CC1C8-EBDD-4AEA-83E6-B27575B62E2E}"/>
+                  <a16:creationId xmlns="" xmlns:a16="http://schemas.microsoft.com/office/drawing/2014/main" id="{E34CC1C8-EBDD-4AEA-83E6-B27575B62E2E}"/>
                 </a:ext>
                 <a:ext uri="{C183D7F6-B498-43B3-948B-1728B52AA6E4}">
-                  <adec:decorative xmlns:adec="http://schemas.microsoft.com/office/drawing/2017/decorative" xmlns="" val="1"/>
+                  <adec:decorative xmlns="" xmlns:adec="http://schemas.microsoft.com/office/drawing/2017/decorative" val="1"/>
                 </a:ext>
               </a:extLst>
             </p:cNvPr>
@@ -9140,7 +9140,7 @@
             <p:nvPr>
               <p:extLst>
                 <p:ext uri="{386F3935-93C4-4BCD-93E2-E3B085C9AB24}">
-                  <p16:designElem xmlns:p16="http://schemas.microsoft.com/office/powerpoint/2015/main" xmlns="" val="1"/>
+                  <p16:designElem xmlns="" xmlns:p16="http://schemas.microsoft.com/office/powerpoint/2015/main" val="1"/>
                 </p:ext>
               </p:extLst>
             </p:nvPr>
@@ -9190,10 +9190,10 @@
             <p:cNvPr id="25" name="Freeform 7">
               <a:extLst>
                 <a:ext uri="{FF2B5EF4-FFF2-40B4-BE49-F238E27FC236}">
-                  <a16:creationId xmlns:a16="http://schemas.microsoft.com/office/drawing/2014/main" xmlns="" id="{D6B38644-B85D-4211-9526-5B4C2A662BF7}"/>
+                  <a16:creationId xmlns="" xmlns:a16="http://schemas.microsoft.com/office/drawing/2014/main" id="{D6B38644-B85D-4211-9526-5B4C2A662BF7}"/>
                 </a:ext>
                 <a:ext uri="{C183D7F6-B498-43B3-948B-1728B52AA6E4}">
-                  <adec:decorative xmlns:adec="http://schemas.microsoft.com/office/drawing/2017/decorative" xmlns="" val="1"/>
+                  <adec:decorative xmlns="" xmlns:adec="http://schemas.microsoft.com/office/drawing/2017/decorative" val="1"/>
                 </a:ext>
               </a:extLst>
             </p:cNvPr>
@@ -9201,7 +9201,7 @@
             <p:nvPr>
               <p:extLst>
                 <p:ext uri="{386F3935-93C4-4BCD-93E2-E3B085C9AB24}">
-                  <p16:designElem xmlns:p16="http://schemas.microsoft.com/office/powerpoint/2015/main" xmlns="" val="1"/>
+                  <p16:designElem xmlns="" xmlns:p16="http://schemas.microsoft.com/office/powerpoint/2015/main" val="1"/>
                 </p:ext>
               </p:extLst>
             </p:nvPr>
@@ -9254,10 +9254,10 @@
             <p:cNvPr id="26" name="Freeform 12">
               <a:extLst>
                 <a:ext uri="{FF2B5EF4-FFF2-40B4-BE49-F238E27FC236}">
-                  <a16:creationId xmlns:a16="http://schemas.microsoft.com/office/drawing/2014/main" xmlns="" id="{8A8B2820-6B8F-4C19-BFC5-D28EE44E54CB}"/>
+                  <a16:creationId xmlns="" xmlns:a16="http://schemas.microsoft.com/office/drawing/2014/main" id="{8A8B2820-6B8F-4C19-BFC5-D28EE44E54CB}"/>
                 </a:ext>
                 <a:ext uri="{C183D7F6-B498-43B3-948B-1728B52AA6E4}">
-                  <adec:decorative xmlns:adec="http://schemas.microsoft.com/office/drawing/2017/decorative" xmlns="" val="1"/>
+                  <adec:decorative xmlns="" xmlns:adec="http://schemas.microsoft.com/office/drawing/2017/decorative" val="1"/>
                 </a:ext>
               </a:extLst>
             </p:cNvPr>
@@ -9265,7 +9265,7 @@
             <p:nvPr>
               <p:extLst>
                 <p:ext uri="{386F3935-93C4-4BCD-93E2-E3B085C9AB24}">
-                  <p16:designElem xmlns:p16="http://schemas.microsoft.com/office/powerpoint/2015/main" xmlns="" val="1"/>
+                  <p16:designElem xmlns="" xmlns:p16="http://schemas.microsoft.com/office/powerpoint/2015/main" val="1"/>
                 </p:ext>
               </p:extLst>
             </p:nvPr>
@@ -9312,10 +9312,10 @@
             <p:cNvPr id="27" name="Freeform 13">
               <a:extLst>
                 <a:ext uri="{FF2B5EF4-FFF2-40B4-BE49-F238E27FC236}">
-                  <a16:creationId xmlns:a16="http://schemas.microsoft.com/office/drawing/2014/main" xmlns="" id="{773528ED-4D37-4A77-A8CA-86B6221C5E82}"/>
+                  <a16:creationId xmlns="" xmlns:a16="http://schemas.microsoft.com/office/drawing/2014/main" id="{773528ED-4D37-4A77-A8CA-86B6221C5E82}"/>
                 </a:ext>
                 <a:ext uri="{C183D7F6-B498-43B3-948B-1728B52AA6E4}">
-                  <adec:decorative xmlns:adec="http://schemas.microsoft.com/office/drawing/2017/decorative" xmlns="" val="1"/>
+                  <adec:decorative xmlns="" xmlns:adec="http://schemas.microsoft.com/office/drawing/2017/decorative" val="1"/>
                 </a:ext>
               </a:extLst>
             </p:cNvPr>
@@ -9323,7 +9323,7 @@
             <p:nvPr>
               <p:extLst>
                 <p:ext uri="{386F3935-93C4-4BCD-93E2-E3B085C9AB24}">
-                  <p16:designElem xmlns:p16="http://schemas.microsoft.com/office/powerpoint/2015/main" xmlns="" val="1"/>
+                  <p16:designElem xmlns="" xmlns:p16="http://schemas.microsoft.com/office/powerpoint/2015/main" val="1"/>
                 </p:ext>
               </p:extLst>
             </p:nvPr>
@@ -9372,10 +9372,10 @@
             <p:cNvPr id="28" name="Freeform 14">
               <a:extLst>
                 <a:ext uri="{FF2B5EF4-FFF2-40B4-BE49-F238E27FC236}">
-                  <a16:creationId xmlns:a16="http://schemas.microsoft.com/office/drawing/2014/main" xmlns="" id="{8A58A902-E944-4399-9A93-A91A6A82B166}"/>
+                  <a16:creationId xmlns="" xmlns:a16="http://schemas.microsoft.com/office/drawing/2014/main" id="{8A58A902-E944-4399-9A93-A91A6A82B166}"/>
                 </a:ext>
                 <a:ext uri="{C183D7F6-B498-43B3-948B-1728B52AA6E4}">
-                  <adec:decorative xmlns:adec="http://schemas.microsoft.com/office/drawing/2017/decorative" xmlns="" val="1"/>
+                  <adec:decorative xmlns="" xmlns:adec="http://schemas.microsoft.com/office/drawing/2017/decorative" val="1"/>
                 </a:ext>
               </a:extLst>
             </p:cNvPr>
@@ -9383,7 +9383,7 @@
             <p:nvPr>
               <p:extLst>
                 <p:ext uri="{386F3935-93C4-4BCD-93E2-E3B085C9AB24}">
-                  <p16:designElem xmlns:p16="http://schemas.microsoft.com/office/powerpoint/2015/main" xmlns="" val="1"/>
+                  <p16:designElem xmlns="" xmlns:p16="http://schemas.microsoft.com/office/powerpoint/2015/main" val="1"/>
                 </p:ext>
               </p:extLst>
             </p:nvPr>
@@ -9438,10 +9438,10 @@
             <p:cNvPr id="29" name="Freeform 15">
               <a:extLst>
                 <a:ext uri="{FF2B5EF4-FFF2-40B4-BE49-F238E27FC236}">
-                  <a16:creationId xmlns:a16="http://schemas.microsoft.com/office/drawing/2014/main" xmlns="" id="{4EDB1155-2E8E-4FB8-AD42-101FE4383231}"/>
+                  <a16:creationId xmlns="" xmlns:a16="http://schemas.microsoft.com/office/drawing/2014/main" id="{4EDB1155-2E8E-4FB8-AD42-101FE4383231}"/>
                 </a:ext>
                 <a:ext uri="{C183D7F6-B498-43B3-948B-1728B52AA6E4}">
-                  <adec:decorative xmlns:adec="http://schemas.microsoft.com/office/drawing/2017/decorative" xmlns="" val="1"/>
+                  <adec:decorative xmlns="" xmlns:adec="http://schemas.microsoft.com/office/drawing/2017/decorative" val="1"/>
                 </a:ext>
               </a:extLst>
             </p:cNvPr>
@@ -9449,7 +9449,7 @@
             <p:nvPr>
               <p:extLst>
                 <p:ext uri="{386F3935-93C4-4BCD-93E2-E3B085C9AB24}">
-                  <p16:designElem xmlns:p16="http://schemas.microsoft.com/office/powerpoint/2015/main" xmlns="" val="1"/>
+                  <p16:designElem xmlns="" xmlns:p16="http://schemas.microsoft.com/office/powerpoint/2015/main" val="1"/>
                 </p:ext>
               </p:extLst>
             </p:nvPr>
@@ -9509,7 +9509,7 @@
           <p:cNvPr id="2" name="Title 1">
             <a:extLst>
               <a:ext uri="{FF2B5EF4-FFF2-40B4-BE49-F238E27FC236}">
-                <a16:creationId xmlns:a16="http://schemas.microsoft.com/office/drawing/2014/main" xmlns="" id="{C7492CCE-C435-464E-A19A-D4C606FDBE3D}"/>
+                <a16:creationId xmlns="" xmlns:a16="http://schemas.microsoft.com/office/drawing/2014/main" id="{C7492CCE-C435-464E-A19A-D4C606FDBE3D}"/>
               </a:ext>
             </a:extLst>
           </p:cNvPr>
@@ -9542,7 +9542,7 @@
           <p:cNvPr id="3" name="Content Placeholder 2">
             <a:extLst>
               <a:ext uri="{FF2B5EF4-FFF2-40B4-BE49-F238E27FC236}">
-                <a16:creationId xmlns:a16="http://schemas.microsoft.com/office/drawing/2014/main" xmlns="" id="{60DFF4FA-F598-4962-B6AB-31A8BE724E52}"/>
+                <a16:creationId xmlns="" xmlns:a16="http://schemas.microsoft.com/office/drawing/2014/main" id="{60DFF4FA-F598-4962-B6AB-31A8BE724E52}"/>
               </a:ext>
             </a:extLst>
           </p:cNvPr>
@@ -9574,7 +9574,7 @@
           <p:cNvPr id="5" name="TextBox 4">
             <a:extLst>
               <a:ext uri="{FF2B5EF4-FFF2-40B4-BE49-F238E27FC236}">
-                <a16:creationId xmlns:a16="http://schemas.microsoft.com/office/drawing/2014/main" xmlns="" id="{466A409B-90E2-4ACB-8A16-0329B5CEE6DF}"/>
+                <a16:creationId xmlns="" xmlns:a16="http://schemas.microsoft.com/office/drawing/2014/main" id="{466A409B-90E2-4ACB-8A16-0329B5CEE6DF}"/>
               </a:ext>
             </a:extLst>
           </p:cNvPr>
@@ -9625,7 +9625,7 @@
           <p:cNvPr id="7" name="Straight Arrow Connector 6">
             <a:extLst>
               <a:ext uri="{FF2B5EF4-FFF2-40B4-BE49-F238E27FC236}">
-                <a16:creationId xmlns:a16="http://schemas.microsoft.com/office/drawing/2014/main" xmlns="" id="{6C986E87-252D-4CDD-90A3-050A5080DF44}"/>
+                <a16:creationId xmlns="" xmlns:a16="http://schemas.microsoft.com/office/drawing/2014/main" id="{6C986E87-252D-4CDD-90A3-050A5080DF44}"/>
               </a:ext>
             </a:extLst>
           </p:cNvPr>
@@ -9666,7 +9666,7 @@
           <p:cNvPr id="17" name="Straight Arrow Connector 16">
             <a:extLst>
               <a:ext uri="{FF2B5EF4-FFF2-40B4-BE49-F238E27FC236}">
-                <a16:creationId xmlns:a16="http://schemas.microsoft.com/office/drawing/2014/main" xmlns="" id="{8B32EEAB-6F30-4731-8D76-02708A63C23C}"/>
+                <a16:creationId xmlns="" xmlns:a16="http://schemas.microsoft.com/office/drawing/2014/main" id="{8B32EEAB-6F30-4731-8D76-02708A63C23C}"/>
               </a:ext>
             </a:extLst>
           </p:cNvPr>
@@ -9707,7 +9707,7 @@
           <p:cNvPr id="18" name="Straight Arrow Connector 17">
             <a:extLst>
               <a:ext uri="{FF2B5EF4-FFF2-40B4-BE49-F238E27FC236}">
-                <a16:creationId xmlns:a16="http://schemas.microsoft.com/office/drawing/2014/main" xmlns="" id="{E930BBA9-7BA1-48A0-A9E1-F9545CD11BAA}"/>
+                <a16:creationId xmlns="" xmlns:a16="http://schemas.microsoft.com/office/drawing/2014/main" id="{E930BBA9-7BA1-48A0-A9E1-F9545CD11BAA}"/>
               </a:ext>
             </a:extLst>
           </p:cNvPr>
@@ -9748,7 +9748,7 @@
           <p:cNvPr id="19" name="Straight Arrow Connector 18">
             <a:extLst>
               <a:ext uri="{FF2B5EF4-FFF2-40B4-BE49-F238E27FC236}">
-                <a16:creationId xmlns:a16="http://schemas.microsoft.com/office/drawing/2014/main" xmlns="" id="{72D8D5ED-08A2-4E59-AA33-3E70202E855D}"/>
+                <a16:creationId xmlns="" xmlns:a16="http://schemas.microsoft.com/office/drawing/2014/main" id="{72D8D5ED-08A2-4E59-AA33-3E70202E855D}"/>
               </a:ext>
             </a:extLst>
           </p:cNvPr>
@@ -9827,10 +9827,10 @@
           <p:cNvPr id="21" name="Rectangle 20">
             <a:extLst>
               <a:ext uri="{FF2B5EF4-FFF2-40B4-BE49-F238E27FC236}">
-                <a16:creationId xmlns:a16="http://schemas.microsoft.com/office/drawing/2014/main" xmlns="" id="{99CAC3B1-4879-424D-8F15-206277196159}"/>
+                <a16:creationId xmlns="" xmlns:a16="http://schemas.microsoft.com/office/drawing/2014/main" id="{99CAC3B1-4879-424D-8F15-206277196159}"/>
               </a:ext>
               <a:ext uri="{C183D7F6-B498-43B3-948B-1728B52AA6E4}">
-                <adec:decorative xmlns:adec="http://schemas.microsoft.com/office/drawing/2017/decorative" xmlns="" val="1"/>
+                <adec:decorative xmlns="" xmlns:adec="http://schemas.microsoft.com/office/drawing/2017/decorative" val="1"/>
               </a:ext>
             </a:extLst>
           </p:cNvPr>
@@ -9840,7 +9840,7 @@
           <p:nvPr>
             <p:extLst>
               <p:ext uri="{386F3935-93C4-4BCD-93E2-E3B085C9AB24}">
-                <p16:designElem xmlns:p16="http://schemas.microsoft.com/office/powerpoint/2015/main" xmlns="" val="1"/>
+                <p16:designElem xmlns="" xmlns:p16="http://schemas.microsoft.com/office/powerpoint/2015/main" val="1"/>
               </p:ext>
             </p:extLst>
           </p:nvPr>
@@ -9887,10 +9887,10 @@
           <p:cNvPr id="23" name="Group 22">
             <a:extLst>
               <a:ext uri="{FF2B5EF4-FFF2-40B4-BE49-F238E27FC236}">
-                <a16:creationId xmlns:a16="http://schemas.microsoft.com/office/drawing/2014/main" xmlns="" id="{4B8492CB-DFBA-4A82-9778-F21493DA36C1}"/>
+                <a16:creationId xmlns="" xmlns:a16="http://schemas.microsoft.com/office/drawing/2014/main" id="{4B8492CB-DFBA-4A82-9778-F21493DA36C1}"/>
               </a:ext>
               <a:ext uri="{C183D7F6-B498-43B3-948B-1728B52AA6E4}">
-                <adec:decorative xmlns:adec="http://schemas.microsoft.com/office/drawing/2017/decorative" xmlns="" val="1"/>
+                <adec:decorative xmlns="" xmlns:adec="http://schemas.microsoft.com/office/drawing/2017/decorative" val="1"/>
               </a:ext>
             </a:extLst>
           </p:cNvPr>
@@ -9900,7 +9900,7 @@
           <p:nvPr>
             <p:extLst>
               <p:ext uri="{386F3935-93C4-4BCD-93E2-E3B085C9AB24}">
-                <p16:designElem xmlns:p16="http://schemas.microsoft.com/office/powerpoint/2015/main" xmlns="" val="1"/>
+                <p16:designElem xmlns="" xmlns:p16="http://schemas.microsoft.com/office/powerpoint/2015/main" val="1"/>
               </p:ext>
             </p:extLst>
           </p:nvPr>
@@ -9918,10 +9918,10 @@
             <p:cNvPr id="24" name="Freeform 6">
               <a:extLst>
                 <a:ext uri="{FF2B5EF4-FFF2-40B4-BE49-F238E27FC236}">
-                  <a16:creationId xmlns:a16="http://schemas.microsoft.com/office/drawing/2014/main" xmlns="" id="{E34CC1C8-EBDD-4AEA-83E6-B27575B62E2E}"/>
+                  <a16:creationId xmlns="" xmlns:a16="http://schemas.microsoft.com/office/drawing/2014/main" id="{E34CC1C8-EBDD-4AEA-83E6-B27575B62E2E}"/>
                 </a:ext>
                 <a:ext uri="{C183D7F6-B498-43B3-948B-1728B52AA6E4}">
-                  <adec:decorative xmlns:adec="http://schemas.microsoft.com/office/drawing/2017/decorative" xmlns="" val="1"/>
+                  <adec:decorative xmlns="" xmlns:adec="http://schemas.microsoft.com/office/drawing/2017/decorative" val="1"/>
                 </a:ext>
               </a:extLst>
             </p:cNvPr>
@@ -9929,7 +9929,7 @@
             <p:nvPr>
               <p:extLst>
                 <p:ext uri="{386F3935-93C4-4BCD-93E2-E3B085C9AB24}">
-                  <p16:designElem xmlns:p16="http://schemas.microsoft.com/office/powerpoint/2015/main" xmlns="" val="1"/>
+                  <p16:designElem xmlns="" xmlns:p16="http://schemas.microsoft.com/office/powerpoint/2015/main" val="1"/>
                 </p:ext>
               </p:extLst>
             </p:nvPr>
@@ -9979,10 +9979,10 @@
             <p:cNvPr id="25" name="Freeform 7">
               <a:extLst>
                 <a:ext uri="{FF2B5EF4-FFF2-40B4-BE49-F238E27FC236}">
-                  <a16:creationId xmlns:a16="http://schemas.microsoft.com/office/drawing/2014/main" xmlns="" id="{D6B38644-B85D-4211-9526-5B4C2A662BF7}"/>
+                  <a16:creationId xmlns="" xmlns:a16="http://schemas.microsoft.com/office/drawing/2014/main" id="{D6B38644-B85D-4211-9526-5B4C2A662BF7}"/>
                 </a:ext>
                 <a:ext uri="{C183D7F6-B498-43B3-948B-1728B52AA6E4}">
-                  <adec:decorative xmlns:adec="http://schemas.microsoft.com/office/drawing/2017/decorative" xmlns="" val="1"/>
+                  <adec:decorative xmlns="" xmlns:adec="http://schemas.microsoft.com/office/drawing/2017/decorative" val="1"/>
                 </a:ext>
               </a:extLst>
             </p:cNvPr>
@@ -9990,7 +9990,7 @@
             <p:nvPr>
               <p:extLst>
                 <p:ext uri="{386F3935-93C4-4BCD-93E2-E3B085C9AB24}">
-                  <p16:designElem xmlns:p16="http://schemas.microsoft.com/office/powerpoint/2015/main" xmlns="" val="1"/>
+                  <p16:designElem xmlns="" xmlns:p16="http://schemas.microsoft.com/office/powerpoint/2015/main" val="1"/>
                 </p:ext>
               </p:extLst>
             </p:nvPr>
@@ -10043,10 +10043,10 @@
             <p:cNvPr id="26" name="Freeform 12">
               <a:extLst>
                 <a:ext uri="{FF2B5EF4-FFF2-40B4-BE49-F238E27FC236}">
-                  <a16:creationId xmlns:a16="http://schemas.microsoft.com/office/drawing/2014/main" xmlns="" id="{8A8B2820-6B8F-4C19-BFC5-D28EE44E54CB}"/>
+                  <a16:creationId xmlns="" xmlns:a16="http://schemas.microsoft.com/office/drawing/2014/main" id="{8A8B2820-6B8F-4C19-BFC5-D28EE44E54CB}"/>
                 </a:ext>
                 <a:ext uri="{C183D7F6-B498-43B3-948B-1728B52AA6E4}">
-                  <adec:decorative xmlns:adec="http://schemas.microsoft.com/office/drawing/2017/decorative" xmlns="" val="1"/>
+                  <adec:decorative xmlns="" xmlns:adec="http://schemas.microsoft.com/office/drawing/2017/decorative" val="1"/>
                 </a:ext>
               </a:extLst>
             </p:cNvPr>
@@ -10054,7 +10054,7 @@
             <p:nvPr>
               <p:extLst>
                 <p:ext uri="{386F3935-93C4-4BCD-93E2-E3B085C9AB24}">
-                  <p16:designElem xmlns:p16="http://schemas.microsoft.com/office/powerpoint/2015/main" xmlns="" val="1"/>
+                  <p16:designElem xmlns="" xmlns:p16="http://schemas.microsoft.com/office/powerpoint/2015/main" val="1"/>
                 </p:ext>
               </p:extLst>
             </p:nvPr>
@@ -10101,10 +10101,10 @@
             <p:cNvPr id="27" name="Freeform 13">
               <a:extLst>
                 <a:ext uri="{FF2B5EF4-FFF2-40B4-BE49-F238E27FC236}">
-                  <a16:creationId xmlns:a16="http://schemas.microsoft.com/office/drawing/2014/main" xmlns="" id="{773528ED-4D37-4A77-A8CA-86B6221C5E82}"/>
+                  <a16:creationId xmlns="" xmlns:a16="http://schemas.microsoft.com/office/drawing/2014/main" id="{773528ED-4D37-4A77-A8CA-86B6221C5E82}"/>
                 </a:ext>
                 <a:ext uri="{C183D7F6-B498-43B3-948B-1728B52AA6E4}">
-                  <adec:decorative xmlns:adec="http://schemas.microsoft.com/office/drawing/2017/decorative" xmlns="" val="1"/>
+                  <adec:decorative xmlns="" xmlns:adec="http://schemas.microsoft.com/office/drawing/2017/decorative" val="1"/>
                 </a:ext>
               </a:extLst>
             </p:cNvPr>
@@ -10112,7 +10112,7 @@
             <p:nvPr>
               <p:extLst>
                 <p:ext uri="{386F3935-93C4-4BCD-93E2-E3B085C9AB24}">
-                  <p16:designElem xmlns:p16="http://schemas.microsoft.com/office/powerpoint/2015/main" xmlns="" val="1"/>
+                  <p16:designElem xmlns="" xmlns:p16="http://schemas.microsoft.com/office/powerpoint/2015/main" val="1"/>
                 </p:ext>
               </p:extLst>
             </p:nvPr>
@@ -10161,10 +10161,10 @@
             <p:cNvPr id="28" name="Freeform 14">
               <a:extLst>
                 <a:ext uri="{FF2B5EF4-FFF2-40B4-BE49-F238E27FC236}">
-                  <a16:creationId xmlns:a16="http://schemas.microsoft.com/office/drawing/2014/main" xmlns="" id="{8A58A902-E944-4399-9A93-A91A6A82B166}"/>
+                  <a16:creationId xmlns="" xmlns:a16="http://schemas.microsoft.com/office/drawing/2014/main" id="{8A58A902-E944-4399-9A93-A91A6A82B166}"/>
                 </a:ext>
                 <a:ext uri="{C183D7F6-B498-43B3-948B-1728B52AA6E4}">
-                  <adec:decorative xmlns:adec="http://schemas.microsoft.com/office/drawing/2017/decorative" xmlns="" val="1"/>
+                  <adec:decorative xmlns="" xmlns:adec="http://schemas.microsoft.com/office/drawing/2017/decorative" val="1"/>
                 </a:ext>
               </a:extLst>
             </p:cNvPr>
@@ -10172,7 +10172,7 @@
             <p:nvPr>
               <p:extLst>
                 <p:ext uri="{386F3935-93C4-4BCD-93E2-E3B085C9AB24}">
-                  <p16:designElem xmlns:p16="http://schemas.microsoft.com/office/powerpoint/2015/main" xmlns="" val="1"/>
+                  <p16:designElem xmlns="" xmlns:p16="http://schemas.microsoft.com/office/powerpoint/2015/main" val="1"/>
                 </p:ext>
               </p:extLst>
             </p:nvPr>
@@ -10227,10 +10227,10 @@
             <p:cNvPr id="29" name="Freeform 15">
               <a:extLst>
                 <a:ext uri="{FF2B5EF4-FFF2-40B4-BE49-F238E27FC236}">
-                  <a16:creationId xmlns:a16="http://schemas.microsoft.com/office/drawing/2014/main" xmlns="" id="{4EDB1155-2E8E-4FB8-AD42-101FE4383231}"/>
+                  <a16:creationId xmlns="" xmlns:a16="http://schemas.microsoft.com/office/drawing/2014/main" id="{4EDB1155-2E8E-4FB8-AD42-101FE4383231}"/>
                 </a:ext>
                 <a:ext uri="{C183D7F6-B498-43B3-948B-1728B52AA6E4}">
-                  <adec:decorative xmlns:adec="http://schemas.microsoft.com/office/drawing/2017/decorative" xmlns="" val="1"/>
+                  <adec:decorative xmlns="" xmlns:adec="http://schemas.microsoft.com/office/drawing/2017/decorative" val="1"/>
                 </a:ext>
               </a:extLst>
             </p:cNvPr>
@@ -10238,7 +10238,7 @@
             <p:nvPr>
               <p:extLst>
                 <p:ext uri="{386F3935-93C4-4BCD-93E2-E3B085C9AB24}">
-                  <p16:designElem xmlns:p16="http://schemas.microsoft.com/office/powerpoint/2015/main" xmlns="" val="1"/>
+                  <p16:designElem xmlns="" xmlns:p16="http://schemas.microsoft.com/office/powerpoint/2015/main" val="1"/>
                 </p:ext>
               </p:extLst>
             </p:nvPr>
@@ -10298,7 +10298,7 @@
           <p:cNvPr id="2" name="Title 1">
             <a:extLst>
               <a:ext uri="{FF2B5EF4-FFF2-40B4-BE49-F238E27FC236}">
-                <a16:creationId xmlns:a16="http://schemas.microsoft.com/office/drawing/2014/main" xmlns="" id="{C7492CCE-C435-464E-A19A-D4C606FDBE3D}"/>
+                <a16:creationId xmlns="" xmlns:a16="http://schemas.microsoft.com/office/drawing/2014/main" id="{C7492CCE-C435-464E-A19A-D4C606FDBE3D}"/>
               </a:ext>
             </a:extLst>
           </p:cNvPr>
@@ -10334,7 +10334,7 @@
           <p:cNvPr id="3" name="Content Placeholder 2">
             <a:extLst>
               <a:ext uri="{FF2B5EF4-FFF2-40B4-BE49-F238E27FC236}">
-                <a16:creationId xmlns:a16="http://schemas.microsoft.com/office/drawing/2014/main" xmlns="" id="{60DFF4FA-F598-4962-B6AB-31A8BE724E52}"/>
+                <a16:creationId xmlns="" xmlns:a16="http://schemas.microsoft.com/office/drawing/2014/main" id="{60DFF4FA-F598-4962-B6AB-31A8BE724E52}"/>
               </a:ext>
             </a:extLst>
           </p:cNvPr>
@@ -10438,10 +10438,10 @@
           <p:cNvPr id="21" name="Rectangle 20">
             <a:extLst>
               <a:ext uri="{FF2B5EF4-FFF2-40B4-BE49-F238E27FC236}">
-                <a16:creationId xmlns:a16="http://schemas.microsoft.com/office/drawing/2014/main" xmlns="" id="{99CAC3B1-4879-424D-8F15-206277196159}"/>
+                <a16:creationId xmlns="" xmlns:a16="http://schemas.microsoft.com/office/drawing/2014/main" id="{99CAC3B1-4879-424D-8F15-206277196159}"/>
               </a:ext>
               <a:ext uri="{C183D7F6-B498-43B3-948B-1728B52AA6E4}">
-                <adec:decorative xmlns:adec="http://schemas.microsoft.com/office/drawing/2017/decorative" xmlns="" val="1"/>
+                <adec:decorative xmlns="" xmlns:adec="http://schemas.microsoft.com/office/drawing/2017/decorative" val="1"/>
               </a:ext>
             </a:extLst>
           </p:cNvPr>
@@ -10451,7 +10451,7 @@
           <p:nvPr>
             <p:extLst>
               <p:ext uri="{386F3935-93C4-4BCD-93E2-E3B085C9AB24}">
-                <p16:designElem xmlns:p16="http://schemas.microsoft.com/office/powerpoint/2015/main" xmlns="" val="1"/>
+                <p16:designElem xmlns="" xmlns:p16="http://schemas.microsoft.com/office/powerpoint/2015/main" val="1"/>
               </p:ext>
             </p:extLst>
           </p:nvPr>
@@ -10498,10 +10498,10 @@
           <p:cNvPr id="23" name="Group 22">
             <a:extLst>
               <a:ext uri="{FF2B5EF4-FFF2-40B4-BE49-F238E27FC236}">
-                <a16:creationId xmlns:a16="http://schemas.microsoft.com/office/drawing/2014/main" xmlns="" id="{4B8492CB-DFBA-4A82-9778-F21493DA36C1}"/>
+                <a16:creationId xmlns="" xmlns:a16="http://schemas.microsoft.com/office/drawing/2014/main" id="{4B8492CB-DFBA-4A82-9778-F21493DA36C1}"/>
               </a:ext>
               <a:ext uri="{C183D7F6-B498-43B3-948B-1728B52AA6E4}">
-                <adec:decorative xmlns:adec="http://schemas.microsoft.com/office/drawing/2017/decorative" xmlns="" val="1"/>
+                <adec:decorative xmlns="" xmlns:adec="http://schemas.microsoft.com/office/drawing/2017/decorative" val="1"/>
               </a:ext>
             </a:extLst>
           </p:cNvPr>
@@ -10511,7 +10511,7 @@
           <p:nvPr>
             <p:extLst>
               <p:ext uri="{386F3935-93C4-4BCD-93E2-E3B085C9AB24}">
-                <p16:designElem xmlns:p16="http://schemas.microsoft.com/office/powerpoint/2015/main" xmlns="" val="1"/>
+                <p16:designElem xmlns="" xmlns:p16="http://schemas.microsoft.com/office/powerpoint/2015/main" val="1"/>
               </p:ext>
             </p:extLst>
           </p:nvPr>
@@ -10529,10 +10529,10 @@
             <p:cNvPr id="24" name="Freeform 6">
               <a:extLst>
                 <a:ext uri="{FF2B5EF4-FFF2-40B4-BE49-F238E27FC236}">
-                  <a16:creationId xmlns:a16="http://schemas.microsoft.com/office/drawing/2014/main" xmlns="" id="{E34CC1C8-EBDD-4AEA-83E6-B27575B62E2E}"/>
+                  <a16:creationId xmlns="" xmlns:a16="http://schemas.microsoft.com/office/drawing/2014/main" id="{E34CC1C8-EBDD-4AEA-83E6-B27575B62E2E}"/>
                 </a:ext>
                 <a:ext uri="{C183D7F6-B498-43B3-948B-1728B52AA6E4}">
-                  <adec:decorative xmlns:adec="http://schemas.microsoft.com/office/drawing/2017/decorative" xmlns="" val="1"/>
+                  <adec:decorative xmlns="" xmlns:adec="http://schemas.microsoft.com/office/drawing/2017/decorative" val="1"/>
                 </a:ext>
               </a:extLst>
             </p:cNvPr>
@@ -10540,7 +10540,7 @@
             <p:nvPr>
               <p:extLst>
                 <p:ext uri="{386F3935-93C4-4BCD-93E2-E3B085C9AB24}">
-                  <p16:designElem xmlns:p16="http://schemas.microsoft.com/office/powerpoint/2015/main" xmlns="" val="1"/>
+                  <p16:designElem xmlns="" xmlns:p16="http://schemas.microsoft.com/office/powerpoint/2015/main" val="1"/>
                 </p:ext>
               </p:extLst>
             </p:nvPr>
@@ -10590,10 +10590,10 @@
             <p:cNvPr id="25" name="Freeform 7">
               <a:extLst>
                 <a:ext uri="{FF2B5EF4-FFF2-40B4-BE49-F238E27FC236}">
-                  <a16:creationId xmlns:a16="http://schemas.microsoft.com/office/drawing/2014/main" xmlns="" id="{D6B38644-B85D-4211-9526-5B4C2A662BF7}"/>
+                  <a16:creationId xmlns="" xmlns:a16="http://schemas.microsoft.com/office/drawing/2014/main" id="{D6B38644-B85D-4211-9526-5B4C2A662BF7}"/>
                 </a:ext>
                 <a:ext uri="{C183D7F6-B498-43B3-948B-1728B52AA6E4}">
-                  <adec:decorative xmlns:adec="http://schemas.microsoft.com/office/drawing/2017/decorative" xmlns="" val="1"/>
+                  <adec:decorative xmlns="" xmlns:adec="http://schemas.microsoft.com/office/drawing/2017/decorative" val="1"/>
                 </a:ext>
               </a:extLst>
             </p:cNvPr>
@@ -10601,7 +10601,7 @@
             <p:nvPr>
               <p:extLst>
                 <p:ext uri="{386F3935-93C4-4BCD-93E2-E3B085C9AB24}">
-                  <p16:designElem xmlns:p16="http://schemas.microsoft.com/office/powerpoint/2015/main" xmlns="" val="1"/>
+                  <p16:designElem xmlns="" xmlns:p16="http://schemas.microsoft.com/office/powerpoint/2015/main" val="1"/>
                 </p:ext>
               </p:extLst>
             </p:nvPr>
@@ -10654,10 +10654,10 @@
             <p:cNvPr id="26" name="Freeform 12">
               <a:extLst>
                 <a:ext uri="{FF2B5EF4-FFF2-40B4-BE49-F238E27FC236}">
-                  <a16:creationId xmlns:a16="http://schemas.microsoft.com/office/drawing/2014/main" xmlns="" id="{8A8B2820-6B8F-4C19-BFC5-D28EE44E54CB}"/>
+                  <a16:creationId xmlns="" xmlns:a16="http://schemas.microsoft.com/office/drawing/2014/main" id="{8A8B2820-6B8F-4C19-BFC5-D28EE44E54CB}"/>
                 </a:ext>
                 <a:ext uri="{C183D7F6-B498-43B3-948B-1728B52AA6E4}">
-                  <adec:decorative xmlns:adec="http://schemas.microsoft.com/office/drawing/2017/decorative" xmlns="" val="1"/>
+                  <adec:decorative xmlns="" xmlns:adec="http://schemas.microsoft.com/office/drawing/2017/decorative" val="1"/>
                 </a:ext>
               </a:extLst>
             </p:cNvPr>
@@ -10665,7 +10665,7 @@
             <p:nvPr>
               <p:extLst>
                 <p:ext uri="{386F3935-93C4-4BCD-93E2-E3B085C9AB24}">
-                  <p16:designElem xmlns:p16="http://schemas.microsoft.com/office/powerpoint/2015/main" xmlns="" val="1"/>
+                  <p16:designElem xmlns="" xmlns:p16="http://schemas.microsoft.com/office/powerpoint/2015/main" val="1"/>
                 </p:ext>
               </p:extLst>
             </p:nvPr>
@@ -10712,10 +10712,10 @@
             <p:cNvPr id="27" name="Freeform 13">
               <a:extLst>
                 <a:ext uri="{FF2B5EF4-FFF2-40B4-BE49-F238E27FC236}">
-                  <a16:creationId xmlns:a16="http://schemas.microsoft.com/office/drawing/2014/main" xmlns="" id="{773528ED-4D37-4A77-A8CA-86B6221C5E82}"/>
+                  <a16:creationId xmlns="" xmlns:a16="http://schemas.microsoft.com/office/drawing/2014/main" id="{773528ED-4D37-4A77-A8CA-86B6221C5E82}"/>
                 </a:ext>
                 <a:ext uri="{C183D7F6-B498-43B3-948B-1728B52AA6E4}">
-                  <adec:decorative xmlns:adec="http://schemas.microsoft.com/office/drawing/2017/decorative" xmlns="" val="1"/>
+                  <adec:decorative xmlns="" xmlns:adec="http://schemas.microsoft.com/office/drawing/2017/decorative" val="1"/>
                 </a:ext>
               </a:extLst>
             </p:cNvPr>
@@ -10723,7 +10723,7 @@
             <p:nvPr>
               <p:extLst>
                 <p:ext uri="{386F3935-93C4-4BCD-93E2-E3B085C9AB24}">
-                  <p16:designElem xmlns:p16="http://schemas.microsoft.com/office/powerpoint/2015/main" xmlns="" val="1"/>
+                  <p16:designElem xmlns="" xmlns:p16="http://schemas.microsoft.com/office/powerpoint/2015/main" val="1"/>
                 </p:ext>
               </p:extLst>
             </p:nvPr>
@@ -10772,10 +10772,10 @@
             <p:cNvPr id="28" name="Freeform 14">
               <a:extLst>
                 <a:ext uri="{FF2B5EF4-FFF2-40B4-BE49-F238E27FC236}">
-                  <a16:creationId xmlns:a16="http://schemas.microsoft.com/office/drawing/2014/main" xmlns="" id="{8A58A902-E944-4399-9A93-A91A6A82B166}"/>
+                  <a16:creationId xmlns="" xmlns:a16="http://schemas.microsoft.com/office/drawing/2014/main" id="{8A58A902-E944-4399-9A93-A91A6A82B166}"/>
                 </a:ext>
                 <a:ext uri="{C183D7F6-B498-43B3-948B-1728B52AA6E4}">
-                  <adec:decorative xmlns:adec="http://schemas.microsoft.com/office/drawing/2017/decorative" xmlns="" val="1"/>
+                  <adec:decorative xmlns="" xmlns:adec="http://schemas.microsoft.com/office/drawing/2017/decorative" val="1"/>
                 </a:ext>
               </a:extLst>
             </p:cNvPr>
@@ -10783,7 +10783,7 @@
             <p:nvPr>
               <p:extLst>
                 <p:ext uri="{386F3935-93C4-4BCD-93E2-E3B085C9AB24}">
-                  <p16:designElem xmlns:p16="http://schemas.microsoft.com/office/powerpoint/2015/main" xmlns="" val="1"/>
+                  <p16:designElem xmlns="" xmlns:p16="http://schemas.microsoft.com/office/powerpoint/2015/main" val="1"/>
                 </p:ext>
               </p:extLst>
             </p:nvPr>
@@ -10838,10 +10838,10 @@
             <p:cNvPr id="29" name="Freeform 15">
               <a:extLst>
                 <a:ext uri="{FF2B5EF4-FFF2-40B4-BE49-F238E27FC236}">
-                  <a16:creationId xmlns:a16="http://schemas.microsoft.com/office/drawing/2014/main" xmlns="" id="{4EDB1155-2E8E-4FB8-AD42-101FE4383231}"/>
+                  <a16:creationId xmlns="" xmlns:a16="http://schemas.microsoft.com/office/drawing/2014/main" id="{4EDB1155-2E8E-4FB8-AD42-101FE4383231}"/>
                 </a:ext>
                 <a:ext uri="{C183D7F6-B498-43B3-948B-1728B52AA6E4}">
-                  <adec:decorative xmlns:adec="http://schemas.microsoft.com/office/drawing/2017/decorative" xmlns="" val="1"/>
+                  <adec:decorative xmlns="" xmlns:adec="http://schemas.microsoft.com/office/drawing/2017/decorative" val="1"/>
                 </a:ext>
               </a:extLst>
             </p:cNvPr>
@@ -10849,7 +10849,7 @@
             <p:nvPr>
               <p:extLst>
                 <p:ext uri="{386F3935-93C4-4BCD-93E2-E3B085C9AB24}">
-                  <p16:designElem xmlns:p16="http://schemas.microsoft.com/office/powerpoint/2015/main" xmlns="" val="1"/>
+                  <p16:designElem xmlns="" xmlns:p16="http://schemas.microsoft.com/office/powerpoint/2015/main" val="1"/>
                 </p:ext>
               </p:extLst>
             </p:nvPr>
@@ -10909,7 +10909,7 @@
           <p:cNvPr id="2" name="Title 1">
             <a:extLst>
               <a:ext uri="{FF2B5EF4-FFF2-40B4-BE49-F238E27FC236}">
-                <a16:creationId xmlns:a16="http://schemas.microsoft.com/office/drawing/2014/main" xmlns="" id="{C7492CCE-C435-464E-A19A-D4C606FDBE3D}"/>
+                <a16:creationId xmlns="" xmlns:a16="http://schemas.microsoft.com/office/drawing/2014/main" id="{C7492CCE-C435-464E-A19A-D4C606FDBE3D}"/>
               </a:ext>
             </a:extLst>
           </p:cNvPr>
@@ -10942,7 +10942,7 @@
           <p:cNvPr id="3" name="Content Placeholder 2">
             <a:extLst>
               <a:ext uri="{FF2B5EF4-FFF2-40B4-BE49-F238E27FC236}">
-                <a16:creationId xmlns:a16="http://schemas.microsoft.com/office/drawing/2014/main" xmlns="" id="{60DFF4FA-F598-4962-B6AB-31A8BE724E52}"/>
+                <a16:creationId xmlns="" xmlns:a16="http://schemas.microsoft.com/office/drawing/2014/main" id="{60DFF4FA-F598-4962-B6AB-31A8BE724E52}"/>
               </a:ext>
             </a:extLst>
           </p:cNvPr>
@@ -10974,7 +10974,7 @@
           <p:cNvPr id="5" name="TextBox 4">
             <a:extLst>
               <a:ext uri="{FF2B5EF4-FFF2-40B4-BE49-F238E27FC236}">
-                <a16:creationId xmlns:a16="http://schemas.microsoft.com/office/drawing/2014/main" xmlns="" id="{466A409B-90E2-4ACB-8A16-0329B5CEE6DF}"/>
+                <a16:creationId xmlns="" xmlns:a16="http://schemas.microsoft.com/office/drawing/2014/main" id="{466A409B-90E2-4ACB-8A16-0329B5CEE6DF}"/>
               </a:ext>
             </a:extLst>
           </p:cNvPr>
@@ -11021,7 +11021,7 @@
           <p:cNvPr id="7" name="Straight Arrow Connector 6">
             <a:extLst>
               <a:ext uri="{FF2B5EF4-FFF2-40B4-BE49-F238E27FC236}">
-                <a16:creationId xmlns:a16="http://schemas.microsoft.com/office/drawing/2014/main" xmlns="" id="{6C986E87-252D-4CDD-90A3-050A5080DF44}"/>
+                <a16:creationId xmlns="" xmlns:a16="http://schemas.microsoft.com/office/drawing/2014/main" id="{6C986E87-252D-4CDD-90A3-050A5080DF44}"/>
               </a:ext>
             </a:extLst>
           </p:cNvPr>
@@ -11062,7 +11062,7 @@
           <p:cNvPr id="17" name="Straight Arrow Connector 16">
             <a:extLst>
               <a:ext uri="{FF2B5EF4-FFF2-40B4-BE49-F238E27FC236}">
-                <a16:creationId xmlns:a16="http://schemas.microsoft.com/office/drawing/2014/main" xmlns="" id="{8B32EEAB-6F30-4731-8D76-02708A63C23C}"/>
+                <a16:creationId xmlns="" xmlns:a16="http://schemas.microsoft.com/office/drawing/2014/main" id="{8B32EEAB-6F30-4731-8D76-02708A63C23C}"/>
               </a:ext>
             </a:extLst>
           </p:cNvPr>
@@ -11103,7 +11103,7 @@
           <p:cNvPr id="18" name="Straight Arrow Connector 17">
             <a:extLst>
               <a:ext uri="{FF2B5EF4-FFF2-40B4-BE49-F238E27FC236}">
-                <a16:creationId xmlns:a16="http://schemas.microsoft.com/office/drawing/2014/main" xmlns="" id="{E930BBA9-7BA1-48A0-A9E1-F9545CD11BAA}"/>
+                <a16:creationId xmlns="" xmlns:a16="http://schemas.microsoft.com/office/drawing/2014/main" id="{E930BBA9-7BA1-48A0-A9E1-F9545CD11BAA}"/>
               </a:ext>
             </a:extLst>
           </p:cNvPr>
@@ -11144,7 +11144,7 @@
           <p:cNvPr id="19" name="Straight Arrow Connector 18">
             <a:extLst>
               <a:ext uri="{FF2B5EF4-FFF2-40B4-BE49-F238E27FC236}">
-                <a16:creationId xmlns:a16="http://schemas.microsoft.com/office/drawing/2014/main" xmlns="" id="{72D8D5ED-08A2-4E59-AA33-3E70202E855D}"/>
+                <a16:creationId xmlns="" xmlns:a16="http://schemas.microsoft.com/office/drawing/2014/main" id="{72D8D5ED-08A2-4E59-AA33-3E70202E855D}"/>
               </a:ext>
             </a:extLst>
           </p:cNvPr>
@@ -11223,10 +11223,10 @@
           <p:cNvPr id="21" name="Rectangle 20">
             <a:extLst>
               <a:ext uri="{FF2B5EF4-FFF2-40B4-BE49-F238E27FC236}">
-                <a16:creationId xmlns:a16="http://schemas.microsoft.com/office/drawing/2014/main" xmlns="" id="{99CAC3B1-4879-424D-8F15-206277196159}"/>
+                <a16:creationId xmlns="" xmlns:a16="http://schemas.microsoft.com/office/drawing/2014/main" id="{99CAC3B1-4879-424D-8F15-206277196159}"/>
               </a:ext>
               <a:ext uri="{C183D7F6-B498-43B3-948B-1728B52AA6E4}">
-                <adec:decorative xmlns:adec="http://schemas.microsoft.com/office/drawing/2017/decorative" xmlns="" val="1"/>
+                <adec:decorative xmlns="" xmlns:adec="http://schemas.microsoft.com/office/drawing/2017/decorative" val="1"/>
               </a:ext>
             </a:extLst>
           </p:cNvPr>
@@ -11236,7 +11236,7 @@
           <p:nvPr>
             <p:extLst>
               <p:ext uri="{386F3935-93C4-4BCD-93E2-E3B085C9AB24}">
-                <p16:designElem xmlns:p16="http://schemas.microsoft.com/office/powerpoint/2015/main" xmlns="" val="1"/>
+                <p16:designElem xmlns="" xmlns:p16="http://schemas.microsoft.com/office/powerpoint/2015/main" val="1"/>
               </p:ext>
             </p:extLst>
           </p:nvPr>
@@ -11283,10 +11283,10 @@
           <p:cNvPr id="23" name="Group 22">
             <a:extLst>
               <a:ext uri="{FF2B5EF4-FFF2-40B4-BE49-F238E27FC236}">
-                <a16:creationId xmlns:a16="http://schemas.microsoft.com/office/drawing/2014/main" xmlns="" id="{4B8492CB-DFBA-4A82-9778-F21493DA36C1}"/>
+                <a16:creationId xmlns="" xmlns:a16="http://schemas.microsoft.com/office/drawing/2014/main" id="{4B8492CB-DFBA-4A82-9778-F21493DA36C1}"/>
               </a:ext>
               <a:ext uri="{C183D7F6-B498-43B3-948B-1728B52AA6E4}">
-                <adec:decorative xmlns:adec="http://schemas.microsoft.com/office/drawing/2017/decorative" xmlns="" val="1"/>
+                <adec:decorative xmlns="" xmlns:adec="http://schemas.microsoft.com/office/drawing/2017/decorative" val="1"/>
               </a:ext>
             </a:extLst>
           </p:cNvPr>
@@ -11296,7 +11296,7 @@
           <p:nvPr>
             <p:extLst>
               <p:ext uri="{386F3935-93C4-4BCD-93E2-E3B085C9AB24}">
-                <p16:designElem xmlns:p16="http://schemas.microsoft.com/office/powerpoint/2015/main" xmlns="" val="1"/>
+                <p16:designElem xmlns="" xmlns:p16="http://schemas.microsoft.com/office/powerpoint/2015/main" val="1"/>
               </p:ext>
             </p:extLst>
           </p:nvPr>
@@ -11314,10 +11314,10 @@
             <p:cNvPr id="24" name="Freeform 6">
               <a:extLst>
                 <a:ext uri="{FF2B5EF4-FFF2-40B4-BE49-F238E27FC236}">
-                  <a16:creationId xmlns:a16="http://schemas.microsoft.com/office/drawing/2014/main" xmlns="" id="{E34CC1C8-EBDD-4AEA-83E6-B27575B62E2E}"/>
+                  <a16:creationId xmlns="" xmlns:a16="http://schemas.microsoft.com/office/drawing/2014/main" id="{E34CC1C8-EBDD-4AEA-83E6-B27575B62E2E}"/>
                 </a:ext>
                 <a:ext uri="{C183D7F6-B498-43B3-948B-1728B52AA6E4}">
-                  <adec:decorative xmlns:adec="http://schemas.microsoft.com/office/drawing/2017/decorative" xmlns="" val="1"/>
+                  <adec:decorative xmlns="" xmlns:adec="http://schemas.microsoft.com/office/drawing/2017/decorative" val="1"/>
                 </a:ext>
               </a:extLst>
             </p:cNvPr>
@@ -11325,7 +11325,7 @@
             <p:nvPr>
               <p:extLst>
                 <p:ext uri="{386F3935-93C4-4BCD-93E2-E3B085C9AB24}">
-                  <p16:designElem xmlns:p16="http://schemas.microsoft.com/office/powerpoint/2015/main" xmlns="" val="1"/>
+                  <p16:designElem xmlns="" xmlns:p16="http://schemas.microsoft.com/office/powerpoint/2015/main" val="1"/>
                 </p:ext>
               </p:extLst>
             </p:nvPr>
@@ -11375,10 +11375,10 @@
             <p:cNvPr id="25" name="Freeform 7">
               <a:extLst>
                 <a:ext uri="{FF2B5EF4-FFF2-40B4-BE49-F238E27FC236}">
-                  <a16:creationId xmlns:a16="http://schemas.microsoft.com/office/drawing/2014/main" xmlns="" id="{D6B38644-B85D-4211-9526-5B4C2A662BF7}"/>
+                  <a16:creationId xmlns="" xmlns:a16="http://schemas.microsoft.com/office/drawing/2014/main" id="{D6B38644-B85D-4211-9526-5B4C2A662BF7}"/>
                 </a:ext>
                 <a:ext uri="{C183D7F6-B498-43B3-948B-1728B52AA6E4}">
-                  <adec:decorative xmlns:adec="http://schemas.microsoft.com/office/drawing/2017/decorative" xmlns="" val="1"/>
+                  <adec:decorative xmlns="" xmlns:adec="http://schemas.microsoft.com/office/drawing/2017/decorative" val="1"/>
                 </a:ext>
               </a:extLst>
             </p:cNvPr>
@@ -11386,7 +11386,7 @@
             <p:nvPr>
               <p:extLst>
                 <p:ext uri="{386F3935-93C4-4BCD-93E2-E3B085C9AB24}">
-                  <p16:designElem xmlns:p16="http://schemas.microsoft.com/office/powerpoint/2015/main" xmlns="" val="1"/>
+                  <p16:designElem xmlns="" xmlns:p16="http://schemas.microsoft.com/office/powerpoint/2015/main" val="1"/>
                 </p:ext>
               </p:extLst>
             </p:nvPr>
@@ -11439,10 +11439,10 @@
             <p:cNvPr id="26" name="Freeform 12">
               <a:extLst>
                 <a:ext uri="{FF2B5EF4-FFF2-40B4-BE49-F238E27FC236}">
-                  <a16:creationId xmlns:a16="http://schemas.microsoft.com/office/drawing/2014/main" xmlns="" id="{8A8B2820-6B8F-4C19-BFC5-D28EE44E54CB}"/>
+                  <a16:creationId xmlns="" xmlns:a16="http://schemas.microsoft.com/office/drawing/2014/main" id="{8A8B2820-6B8F-4C19-BFC5-D28EE44E54CB}"/>
                 </a:ext>
                 <a:ext uri="{C183D7F6-B498-43B3-948B-1728B52AA6E4}">
-                  <adec:decorative xmlns:adec="http://schemas.microsoft.com/office/drawing/2017/decorative" xmlns="" val="1"/>
+                  <adec:decorative xmlns="" xmlns:adec="http://schemas.microsoft.com/office/drawing/2017/decorative" val="1"/>
                 </a:ext>
               </a:extLst>
             </p:cNvPr>
@@ -11450,7 +11450,7 @@
             <p:nvPr>
               <p:extLst>
                 <p:ext uri="{386F3935-93C4-4BCD-93E2-E3B085C9AB24}">
-                  <p16:designElem xmlns:p16="http://schemas.microsoft.com/office/powerpoint/2015/main" xmlns="" val="1"/>
+                  <p16:designElem xmlns="" xmlns:p16="http://schemas.microsoft.com/office/powerpoint/2015/main" val="1"/>
                 </p:ext>
               </p:extLst>
             </p:nvPr>
@@ -11497,10 +11497,10 @@
             <p:cNvPr id="27" name="Freeform 13">
               <a:extLst>
                 <a:ext uri="{FF2B5EF4-FFF2-40B4-BE49-F238E27FC236}">
-                  <a16:creationId xmlns:a16="http://schemas.microsoft.com/office/drawing/2014/main" xmlns="" id="{773528ED-4D37-4A77-A8CA-86B6221C5E82}"/>
+                  <a16:creationId xmlns="" xmlns:a16="http://schemas.microsoft.com/office/drawing/2014/main" id="{773528ED-4D37-4A77-A8CA-86B6221C5E82}"/>
                 </a:ext>
                 <a:ext uri="{C183D7F6-B498-43B3-948B-1728B52AA6E4}">
-                  <adec:decorative xmlns:adec="http://schemas.microsoft.com/office/drawing/2017/decorative" xmlns="" val="1"/>
+                  <adec:decorative xmlns="" xmlns:adec="http://schemas.microsoft.com/office/drawing/2017/decorative" val="1"/>
                 </a:ext>
               </a:extLst>
             </p:cNvPr>
@@ -11508,7 +11508,7 @@
             <p:nvPr>
               <p:extLst>
                 <p:ext uri="{386F3935-93C4-4BCD-93E2-E3B085C9AB24}">
-                  <p16:designElem xmlns:p16="http://schemas.microsoft.com/office/powerpoint/2015/main" xmlns="" val="1"/>
+                  <p16:designElem xmlns="" xmlns:p16="http://schemas.microsoft.com/office/powerpoint/2015/main" val="1"/>
                 </p:ext>
               </p:extLst>
             </p:nvPr>
@@ -11557,10 +11557,10 @@
             <p:cNvPr id="28" name="Freeform 14">
               <a:extLst>
                 <a:ext uri="{FF2B5EF4-FFF2-40B4-BE49-F238E27FC236}">
-                  <a16:creationId xmlns:a16="http://schemas.microsoft.com/office/drawing/2014/main" xmlns="" id="{8A58A902-E944-4399-9A93-A91A6A82B166}"/>
+                  <a16:creationId xmlns="" xmlns:a16="http://schemas.microsoft.com/office/drawing/2014/main" id="{8A58A902-E944-4399-9A93-A91A6A82B166}"/>
                 </a:ext>
                 <a:ext uri="{C183D7F6-B498-43B3-948B-1728B52AA6E4}">
-                  <adec:decorative xmlns:adec="http://schemas.microsoft.com/office/drawing/2017/decorative" xmlns="" val="1"/>
+                  <adec:decorative xmlns="" xmlns:adec="http://schemas.microsoft.com/office/drawing/2017/decorative" val="1"/>
                 </a:ext>
               </a:extLst>
             </p:cNvPr>
@@ -11568,7 +11568,7 @@
             <p:nvPr>
               <p:extLst>
                 <p:ext uri="{386F3935-93C4-4BCD-93E2-E3B085C9AB24}">
-                  <p16:designElem xmlns:p16="http://schemas.microsoft.com/office/powerpoint/2015/main" xmlns="" val="1"/>
+                  <p16:designElem xmlns="" xmlns:p16="http://schemas.microsoft.com/office/powerpoint/2015/main" val="1"/>
                 </p:ext>
               </p:extLst>
             </p:nvPr>
@@ -11623,10 +11623,10 @@
             <p:cNvPr id="29" name="Freeform 15">
               <a:extLst>
                 <a:ext uri="{FF2B5EF4-FFF2-40B4-BE49-F238E27FC236}">
-                  <a16:creationId xmlns:a16="http://schemas.microsoft.com/office/drawing/2014/main" xmlns="" id="{4EDB1155-2E8E-4FB8-AD42-101FE4383231}"/>
+                  <a16:creationId xmlns="" xmlns:a16="http://schemas.microsoft.com/office/drawing/2014/main" id="{4EDB1155-2E8E-4FB8-AD42-101FE4383231}"/>
                 </a:ext>
                 <a:ext uri="{C183D7F6-B498-43B3-948B-1728B52AA6E4}">
-                  <adec:decorative xmlns:adec="http://schemas.microsoft.com/office/drawing/2017/decorative" xmlns="" val="1"/>
+                  <adec:decorative xmlns="" xmlns:adec="http://schemas.microsoft.com/office/drawing/2017/decorative" val="1"/>
                 </a:ext>
               </a:extLst>
             </p:cNvPr>
@@ -11634,7 +11634,7 @@
             <p:nvPr>
               <p:extLst>
                 <p:ext uri="{386F3935-93C4-4BCD-93E2-E3B085C9AB24}">
-                  <p16:designElem xmlns:p16="http://schemas.microsoft.com/office/powerpoint/2015/main" xmlns="" val="1"/>
+                  <p16:designElem xmlns="" xmlns:p16="http://schemas.microsoft.com/office/powerpoint/2015/main" val="1"/>
                 </p:ext>
               </p:extLst>
             </p:nvPr>
@@ -11694,7 +11694,7 @@
           <p:cNvPr id="2" name="Title 1">
             <a:extLst>
               <a:ext uri="{FF2B5EF4-FFF2-40B4-BE49-F238E27FC236}">
-                <a16:creationId xmlns:a16="http://schemas.microsoft.com/office/drawing/2014/main" xmlns="" id="{C7492CCE-C435-464E-A19A-D4C606FDBE3D}"/>
+                <a16:creationId xmlns="" xmlns:a16="http://schemas.microsoft.com/office/drawing/2014/main" id="{C7492CCE-C435-464E-A19A-D4C606FDBE3D}"/>
               </a:ext>
             </a:extLst>
           </p:cNvPr>
@@ -11731,7 +11731,7 @@
           <p:cNvPr id="5" name="TextBox 4">
             <a:extLst>
               <a:ext uri="{FF2B5EF4-FFF2-40B4-BE49-F238E27FC236}">
-                <a16:creationId xmlns:a16="http://schemas.microsoft.com/office/drawing/2014/main" xmlns="" id="{466A409B-90E2-4ACB-8A16-0329B5CEE6DF}"/>
+                <a16:creationId xmlns="" xmlns:a16="http://schemas.microsoft.com/office/drawing/2014/main" id="{466A409B-90E2-4ACB-8A16-0329B5CEE6DF}"/>
               </a:ext>
             </a:extLst>
           </p:cNvPr>
@@ -11778,7 +11778,7 @@
           <p:cNvPr id="7" name="Straight Arrow Connector 6">
             <a:extLst>
               <a:ext uri="{FF2B5EF4-FFF2-40B4-BE49-F238E27FC236}">
-                <a16:creationId xmlns:a16="http://schemas.microsoft.com/office/drawing/2014/main" xmlns="" id="{6C986E87-252D-4CDD-90A3-050A5080DF44}"/>
+                <a16:creationId xmlns="" xmlns:a16="http://schemas.microsoft.com/office/drawing/2014/main" id="{6C986E87-252D-4CDD-90A3-050A5080DF44}"/>
               </a:ext>
             </a:extLst>
           </p:cNvPr>
@@ -11819,7 +11819,7 @@
           <p:cNvPr id="17" name="Straight Arrow Connector 16">
             <a:extLst>
               <a:ext uri="{FF2B5EF4-FFF2-40B4-BE49-F238E27FC236}">
-                <a16:creationId xmlns:a16="http://schemas.microsoft.com/office/drawing/2014/main" xmlns="" id="{8B32EEAB-6F30-4731-8D76-02708A63C23C}"/>
+                <a16:creationId xmlns="" xmlns:a16="http://schemas.microsoft.com/office/drawing/2014/main" id="{8B32EEAB-6F30-4731-8D76-02708A63C23C}"/>
               </a:ext>
             </a:extLst>
           </p:cNvPr>
@@ -11860,7 +11860,7 @@
           <p:cNvPr id="18" name="Straight Arrow Connector 17">
             <a:extLst>
               <a:ext uri="{FF2B5EF4-FFF2-40B4-BE49-F238E27FC236}">
-                <a16:creationId xmlns:a16="http://schemas.microsoft.com/office/drawing/2014/main" xmlns="" id="{E930BBA9-7BA1-48A0-A9E1-F9545CD11BAA}"/>
+                <a16:creationId xmlns="" xmlns:a16="http://schemas.microsoft.com/office/drawing/2014/main" id="{E930BBA9-7BA1-48A0-A9E1-F9545CD11BAA}"/>
               </a:ext>
             </a:extLst>
           </p:cNvPr>
@@ -11901,7 +11901,7 @@
           <p:cNvPr id="19" name="Straight Arrow Connector 18">
             <a:extLst>
               <a:ext uri="{FF2B5EF4-FFF2-40B4-BE49-F238E27FC236}">
-                <a16:creationId xmlns:a16="http://schemas.microsoft.com/office/drawing/2014/main" xmlns="" id="{72D8D5ED-08A2-4E59-AA33-3E70202E855D}"/>
+                <a16:creationId xmlns="" xmlns:a16="http://schemas.microsoft.com/office/drawing/2014/main" id="{72D8D5ED-08A2-4E59-AA33-3E70202E855D}"/>
               </a:ext>
             </a:extLst>
           </p:cNvPr>
@@ -12527,10 +12527,10 @@
           <p:cNvPr id="21" name="Rectangle 20">
             <a:extLst>
               <a:ext uri="{FF2B5EF4-FFF2-40B4-BE49-F238E27FC236}">
-                <a16:creationId xmlns:a16="http://schemas.microsoft.com/office/drawing/2014/main" xmlns="" id="{99CAC3B1-4879-424D-8F15-206277196159}"/>
+                <a16:creationId xmlns="" xmlns:a16="http://schemas.microsoft.com/office/drawing/2014/main" id="{99CAC3B1-4879-424D-8F15-206277196159}"/>
               </a:ext>
               <a:ext uri="{C183D7F6-B498-43B3-948B-1728B52AA6E4}">
-                <adec:decorative xmlns:adec="http://schemas.microsoft.com/office/drawing/2017/decorative" xmlns="" val="1"/>
+                <adec:decorative xmlns="" xmlns:adec="http://schemas.microsoft.com/office/drawing/2017/decorative" val="1"/>
               </a:ext>
             </a:extLst>
           </p:cNvPr>
@@ -12540,7 +12540,7 @@
           <p:nvPr>
             <p:extLst>
               <p:ext uri="{386F3935-93C4-4BCD-93E2-E3B085C9AB24}">
-                <p16:designElem xmlns:p16="http://schemas.microsoft.com/office/powerpoint/2015/main" xmlns="" val="1"/>
+                <p16:designElem xmlns="" xmlns:p16="http://schemas.microsoft.com/office/powerpoint/2015/main" val="1"/>
               </p:ext>
             </p:extLst>
           </p:nvPr>
@@ -12587,10 +12587,10 @@
           <p:cNvPr id="23" name="Group 22">
             <a:extLst>
               <a:ext uri="{FF2B5EF4-FFF2-40B4-BE49-F238E27FC236}">
-                <a16:creationId xmlns:a16="http://schemas.microsoft.com/office/drawing/2014/main" xmlns="" id="{4B8492CB-DFBA-4A82-9778-F21493DA36C1}"/>
+                <a16:creationId xmlns="" xmlns:a16="http://schemas.microsoft.com/office/drawing/2014/main" id="{4B8492CB-DFBA-4A82-9778-F21493DA36C1}"/>
               </a:ext>
               <a:ext uri="{C183D7F6-B498-43B3-948B-1728B52AA6E4}">
-                <adec:decorative xmlns:adec="http://schemas.microsoft.com/office/drawing/2017/decorative" xmlns="" val="1"/>
+                <adec:decorative xmlns="" xmlns:adec="http://schemas.microsoft.com/office/drawing/2017/decorative" val="1"/>
               </a:ext>
             </a:extLst>
           </p:cNvPr>
@@ -12600,7 +12600,7 @@
           <p:nvPr>
             <p:extLst>
               <p:ext uri="{386F3935-93C4-4BCD-93E2-E3B085C9AB24}">
-                <p16:designElem xmlns:p16="http://schemas.microsoft.com/office/powerpoint/2015/main" xmlns="" val="1"/>
+                <p16:designElem xmlns="" xmlns:p16="http://schemas.microsoft.com/office/powerpoint/2015/main" val="1"/>
               </p:ext>
             </p:extLst>
           </p:nvPr>
@@ -12618,10 +12618,10 @@
             <p:cNvPr id="24" name="Freeform 6">
               <a:extLst>
                 <a:ext uri="{FF2B5EF4-FFF2-40B4-BE49-F238E27FC236}">
-                  <a16:creationId xmlns:a16="http://schemas.microsoft.com/office/drawing/2014/main" xmlns="" id="{E34CC1C8-EBDD-4AEA-83E6-B27575B62E2E}"/>
+                  <a16:creationId xmlns="" xmlns:a16="http://schemas.microsoft.com/office/drawing/2014/main" id="{E34CC1C8-EBDD-4AEA-83E6-B27575B62E2E}"/>
                 </a:ext>
                 <a:ext uri="{C183D7F6-B498-43B3-948B-1728B52AA6E4}">
-                  <adec:decorative xmlns:adec="http://schemas.microsoft.com/office/drawing/2017/decorative" xmlns="" val="1"/>
+                  <adec:decorative xmlns="" xmlns:adec="http://schemas.microsoft.com/office/drawing/2017/decorative" val="1"/>
                 </a:ext>
               </a:extLst>
             </p:cNvPr>
@@ -12629,7 +12629,7 @@
             <p:nvPr>
               <p:extLst>
                 <p:ext uri="{386F3935-93C4-4BCD-93E2-E3B085C9AB24}">
-                  <p16:designElem xmlns:p16="http://schemas.microsoft.com/office/powerpoint/2015/main" xmlns="" val="1"/>
+                  <p16:designElem xmlns="" xmlns:p16="http://schemas.microsoft.com/office/powerpoint/2015/main" val="1"/>
                 </p:ext>
               </p:extLst>
             </p:nvPr>
@@ -12679,10 +12679,10 @@
             <p:cNvPr id="25" name="Freeform 7">
               <a:extLst>
                 <a:ext uri="{FF2B5EF4-FFF2-40B4-BE49-F238E27FC236}">
-                  <a16:creationId xmlns:a16="http://schemas.microsoft.com/office/drawing/2014/main" xmlns="" id="{D6B38644-B85D-4211-9526-5B4C2A662BF7}"/>
+                  <a16:creationId xmlns="" xmlns:a16="http://schemas.microsoft.com/office/drawing/2014/main" id="{D6B38644-B85D-4211-9526-5B4C2A662BF7}"/>
                 </a:ext>
                 <a:ext uri="{C183D7F6-B498-43B3-948B-1728B52AA6E4}">
-                  <adec:decorative xmlns:adec="http://schemas.microsoft.com/office/drawing/2017/decorative" xmlns="" val="1"/>
+                  <adec:decorative xmlns="" xmlns:adec="http://schemas.microsoft.com/office/drawing/2017/decorative" val="1"/>
                 </a:ext>
               </a:extLst>
             </p:cNvPr>
@@ -12690,7 +12690,7 @@
             <p:nvPr>
               <p:extLst>
                 <p:ext uri="{386F3935-93C4-4BCD-93E2-E3B085C9AB24}">
-                  <p16:designElem xmlns:p16="http://schemas.microsoft.com/office/powerpoint/2015/main" xmlns="" val="1"/>
+                  <p16:designElem xmlns="" xmlns:p16="http://schemas.microsoft.com/office/powerpoint/2015/main" val="1"/>
                 </p:ext>
               </p:extLst>
             </p:nvPr>
@@ -12743,10 +12743,10 @@
             <p:cNvPr id="26" name="Freeform 12">
               <a:extLst>
                 <a:ext uri="{FF2B5EF4-FFF2-40B4-BE49-F238E27FC236}">
-                  <a16:creationId xmlns:a16="http://schemas.microsoft.com/office/drawing/2014/main" xmlns="" id="{8A8B2820-6B8F-4C19-BFC5-D28EE44E54CB}"/>
+                  <a16:creationId xmlns="" xmlns:a16="http://schemas.microsoft.com/office/drawing/2014/main" id="{8A8B2820-6B8F-4C19-BFC5-D28EE44E54CB}"/>
                 </a:ext>
                 <a:ext uri="{C183D7F6-B498-43B3-948B-1728B52AA6E4}">
-                  <adec:decorative xmlns:adec="http://schemas.microsoft.com/office/drawing/2017/decorative" xmlns="" val="1"/>
+                  <adec:decorative xmlns="" xmlns:adec="http://schemas.microsoft.com/office/drawing/2017/decorative" val="1"/>
                 </a:ext>
               </a:extLst>
             </p:cNvPr>
@@ -12754,7 +12754,7 @@
             <p:nvPr>
               <p:extLst>
                 <p:ext uri="{386F3935-93C4-4BCD-93E2-E3B085C9AB24}">
-                  <p16:designElem xmlns:p16="http://schemas.microsoft.com/office/powerpoint/2015/main" xmlns="" val="1"/>
+                  <p16:designElem xmlns="" xmlns:p16="http://schemas.microsoft.com/office/powerpoint/2015/main" val="1"/>
                 </p:ext>
               </p:extLst>
             </p:nvPr>
@@ -12801,10 +12801,10 @@
             <p:cNvPr id="27" name="Freeform 13">
               <a:extLst>
                 <a:ext uri="{FF2B5EF4-FFF2-40B4-BE49-F238E27FC236}">
-                  <a16:creationId xmlns:a16="http://schemas.microsoft.com/office/drawing/2014/main" xmlns="" id="{773528ED-4D37-4A77-A8CA-86B6221C5E82}"/>
+                  <a16:creationId xmlns="" xmlns:a16="http://schemas.microsoft.com/office/drawing/2014/main" id="{773528ED-4D37-4A77-A8CA-86B6221C5E82}"/>
                 </a:ext>
                 <a:ext uri="{C183D7F6-B498-43B3-948B-1728B52AA6E4}">
-                  <adec:decorative xmlns:adec="http://schemas.microsoft.com/office/drawing/2017/decorative" xmlns="" val="1"/>
+                  <adec:decorative xmlns="" xmlns:adec="http://schemas.microsoft.com/office/drawing/2017/decorative" val="1"/>
                 </a:ext>
               </a:extLst>
             </p:cNvPr>
@@ -12812,7 +12812,7 @@
             <p:nvPr>
               <p:extLst>
                 <p:ext uri="{386F3935-93C4-4BCD-93E2-E3B085C9AB24}">
-                  <p16:designElem xmlns:p16="http://schemas.microsoft.com/office/powerpoint/2015/main" xmlns="" val="1"/>
+                  <p16:designElem xmlns="" xmlns:p16="http://schemas.microsoft.com/office/powerpoint/2015/main" val="1"/>
                 </p:ext>
               </p:extLst>
             </p:nvPr>
@@ -12861,10 +12861,10 @@
             <p:cNvPr id="28" name="Freeform 14">
               <a:extLst>
                 <a:ext uri="{FF2B5EF4-FFF2-40B4-BE49-F238E27FC236}">
-                  <a16:creationId xmlns:a16="http://schemas.microsoft.com/office/drawing/2014/main" xmlns="" id="{8A58A902-E944-4399-9A93-A91A6A82B166}"/>
+                  <a16:creationId xmlns="" xmlns:a16="http://schemas.microsoft.com/office/drawing/2014/main" id="{8A58A902-E944-4399-9A93-A91A6A82B166}"/>
                 </a:ext>
                 <a:ext uri="{C183D7F6-B498-43B3-948B-1728B52AA6E4}">
-                  <adec:decorative xmlns:adec="http://schemas.microsoft.com/office/drawing/2017/decorative" xmlns="" val="1"/>
+                  <adec:decorative xmlns="" xmlns:adec="http://schemas.microsoft.com/office/drawing/2017/decorative" val="1"/>
                 </a:ext>
               </a:extLst>
             </p:cNvPr>
@@ -12872,7 +12872,7 @@
             <p:nvPr>
               <p:extLst>
                 <p:ext uri="{386F3935-93C4-4BCD-93E2-E3B085C9AB24}">
-                  <p16:designElem xmlns:p16="http://schemas.microsoft.com/office/powerpoint/2015/main" xmlns="" val="1"/>
+                  <p16:designElem xmlns="" xmlns:p16="http://schemas.microsoft.com/office/powerpoint/2015/main" val="1"/>
                 </p:ext>
               </p:extLst>
             </p:nvPr>
@@ -12927,10 +12927,10 @@
             <p:cNvPr id="29" name="Freeform 15">
               <a:extLst>
                 <a:ext uri="{FF2B5EF4-FFF2-40B4-BE49-F238E27FC236}">
-                  <a16:creationId xmlns:a16="http://schemas.microsoft.com/office/drawing/2014/main" xmlns="" id="{4EDB1155-2E8E-4FB8-AD42-101FE4383231}"/>
+                  <a16:creationId xmlns="" xmlns:a16="http://schemas.microsoft.com/office/drawing/2014/main" id="{4EDB1155-2E8E-4FB8-AD42-101FE4383231}"/>
                 </a:ext>
                 <a:ext uri="{C183D7F6-B498-43B3-948B-1728B52AA6E4}">
-                  <adec:decorative xmlns:adec="http://schemas.microsoft.com/office/drawing/2017/decorative" xmlns="" val="1"/>
+                  <adec:decorative xmlns="" xmlns:adec="http://schemas.microsoft.com/office/drawing/2017/decorative" val="1"/>
                 </a:ext>
               </a:extLst>
             </p:cNvPr>
@@ -12938,7 +12938,7 @@
             <p:nvPr>
               <p:extLst>
                 <p:ext uri="{386F3935-93C4-4BCD-93E2-E3B085C9AB24}">
-                  <p16:designElem xmlns:p16="http://schemas.microsoft.com/office/powerpoint/2015/main" xmlns="" val="1"/>
+                  <p16:designElem xmlns="" xmlns:p16="http://schemas.microsoft.com/office/powerpoint/2015/main" val="1"/>
                 </p:ext>
               </p:extLst>
             </p:nvPr>
@@ -12998,7 +12998,7 @@
           <p:cNvPr id="2" name="Title 1">
             <a:extLst>
               <a:ext uri="{FF2B5EF4-FFF2-40B4-BE49-F238E27FC236}">
-                <a16:creationId xmlns:a16="http://schemas.microsoft.com/office/drawing/2014/main" xmlns="" id="{C7492CCE-C435-464E-A19A-D4C606FDBE3D}"/>
+                <a16:creationId xmlns="" xmlns:a16="http://schemas.microsoft.com/office/drawing/2014/main" id="{C7492CCE-C435-464E-A19A-D4C606FDBE3D}"/>
               </a:ext>
             </a:extLst>
           </p:cNvPr>
@@ -13034,7 +13034,7 @@
           <p:cNvPr id="3" name="Content Placeholder 2">
             <a:extLst>
               <a:ext uri="{FF2B5EF4-FFF2-40B4-BE49-F238E27FC236}">
-                <a16:creationId xmlns:a16="http://schemas.microsoft.com/office/drawing/2014/main" xmlns="" id="{60DFF4FA-F598-4962-B6AB-31A8BE724E52}"/>
+                <a16:creationId xmlns="" xmlns:a16="http://schemas.microsoft.com/office/drawing/2014/main" id="{60DFF4FA-F598-4962-B6AB-31A8BE724E52}"/>
               </a:ext>
             </a:extLst>
           </p:cNvPr>
@@ -13134,10 +13134,10 @@
           <p:cNvPr id="21" name="Rectangle 20">
             <a:extLst>
               <a:ext uri="{FF2B5EF4-FFF2-40B4-BE49-F238E27FC236}">
-                <a16:creationId xmlns:a16="http://schemas.microsoft.com/office/drawing/2014/main" xmlns="" id="{99CAC3B1-4879-424D-8F15-206277196159}"/>
+                <a16:creationId xmlns="" xmlns:a16="http://schemas.microsoft.com/office/drawing/2014/main" id="{99CAC3B1-4879-424D-8F15-206277196159}"/>
               </a:ext>
               <a:ext uri="{C183D7F6-B498-43B3-948B-1728B52AA6E4}">
-                <adec:decorative xmlns:adec="http://schemas.microsoft.com/office/drawing/2017/decorative" xmlns="" val="1"/>
+                <adec:decorative xmlns="" xmlns:adec="http://schemas.microsoft.com/office/drawing/2017/decorative" val="1"/>
               </a:ext>
             </a:extLst>
           </p:cNvPr>
@@ -13147,7 +13147,7 @@
           <p:nvPr>
             <p:extLst>
               <p:ext uri="{386F3935-93C4-4BCD-93E2-E3B085C9AB24}">
-                <p16:designElem xmlns:p16="http://schemas.microsoft.com/office/powerpoint/2015/main" xmlns="" val="1"/>
+                <p16:designElem xmlns="" xmlns:p16="http://schemas.microsoft.com/office/powerpoint/2015/main" val="1"/>
               </p:ext>
             </p:extLst>
           </p:nvPr>
@@ -13194,10 +13194,10 @@
           <p:cNvPr id="23" name="Group 22">
             <a:extLst>
               <a:ext uri="{FF2B5EF4-FFF2-40B4-BE49-F238E27FC236}">
-                <a16:creationId xmlns:a16="http://schemas.microsoft.com/office/drawing/2014/main" xmlns="" id="{4B8492CB-DFBA-4A82-9778-F21493DA36C1}"/>
+                <a16:creationId xmlns="" xmlns:a16="http://schemas.microsoft.com/office/drawing/2014/main" id="{4B8492CB-DFBA-4A82-9778-F21493DA36C1}"/>
               </a:ext>
               <a:ext uri="{C183D7F6-B498-43B3-948B-1728B52AA6E4}">
-                <adec:decorative xmlns:adec="http://schemas.microsoft.com/office/drawing/2017/decorative" xmlns="" val="1"/>
+                <adec:decorative xmlns="" xmlns:adec="http://schemas.microsoft.com/office/drawing/2017/decorative" val="1"/>
               </a:ext>
             </a:extLst>
           </p:cNvPr>
@@ -13207,7 +13207,7 @@
           <p:nvPr>
             <p:extLst>
               <p:ext uri="{386F3935-93C4-4BCD-93E2-E3B085C9AB24}">
-                <p16:designElem xmlns:p16="http://schemas.microsoft.com/office/powerpoint/2015/main" xmlns="" val="1"/>
+                <p16:designElem xmlns="" xmlns:p16="http://schemas.microsoft.com/office/powerpoint/2015/main" val="1"/>
               </p:ext>
             </p:extLst>
           </p:nvPr>
@@ -13225,10 +13225,10 @@
             <p:cNvPr id="24" name="Freeform 6">
               <a:extLst>
                 <a:ext uri="{FF2B5EF4-FFF2-40B4-BE49-F238E27FC236}">
-                  <a16:creationId xmlns:a16="http://schemas.microsoft.com/office/drawing/2014/main" xmlns="" id="{E34CC1C8-EBDD-4AEA-83E6-B27575B62E2E}"/>
+                  <a16:creationId xmlns="" xmlns:a16="http://schemas.microsoft.com/office/drawing/2014/main" id="{E34CC1C8-EBDD-4AEA-83E6-B27575B62E2E}"/>
                 </a:ext>
                 <a:ext uri="{C183D7F6-B498-43B3-948B-1728B52AA6E4}">
-                  <adec:decorative xmlns:adec="http://schemas.microsoft.com/office/drawing/2017/decorative" xmlns="" val="1"/>
+                  <adec:decorative xmlns="" xmlns:adec="http://schemas.microsoft.com/office/drawing/2017/decorative" val="1"/>
                 </a:ext>
               </a:extLst>
             </p:cNvPr>
@@ -13236,7 +13236,7 @@
             <p:nvPr>
               <p:extLst>
                 <p:ext uri="{386F3935-93C4-4BCD-93E2-E3B085C9AB24}">
-                  <p16:designElem xmlns:p16="http://schemas.microsoft.com/office/powerpoint/2015/main" xmlns="" val="1"/>
+                  <p16:designElem xmlns="" xmlns:p16="http://schemas.microsoft.com/office/powerpoint/2015/main" val="1"/>
                 </p:ext>
               </p:extLst>
             </p:nvPr>
@@ -13286,10 +13286,10 @@
             <p:cNvPr id="25" name="Freeform 7">
               <a:extLst>
                 <a:ext uri="{FF2B5EF4-FFF2-40B4-BE49-F238E27FC236}">
-                  <a16:creationId xmlns:a16="http://schemas.microsoft.com/office/drawing/2014/main" xmlns="" id="{D6B38644-B85D-4211-9526-5B4C2A662BF7}"/>
+                  <a16:creationId xmlns="" xmlns:a16="http://schemas.microsoft.com/office/drawing/2014/main" id="{D6B38644-B85D-4211-9526-5B4C2A662BF7}"/>
                 </a:ext>
                 <a:ext uri="{C183D7F6-B498-43B3-948B-1728B52AA6E4}">
-                  <adec:decorative xmlns:adec="http://schemas.microsoft.com/office/drawing/2017/decorative" xmlns="" val="1"/>
+                  <adec:decorative xmlns="" xmlns:adec="http://schemas.microsoft.com/office/drawing/2017/decorative" val="1"/>
                 </a:ext>
               </a:extLst>
             </p:cNvPr>
@@ -13297,7 +13297,7 @@
             <p:nvPr>
               <p:extLst>
                 <p:ext uri="{386F3935-93C4-4BCD-93E2-E3B085C9AB24}">
-                  <p16:designElem xmlns:p16="http://schemas.microsoft.com/office/powerpoint/2015/main" xmlns="" val="1"/>
+                  <p16:designElem xmlns="" xmlns:p16="http://schemas.microsoft.com/office/powerpoint/2015/main" val="1"/>
                 </p:ext>
               </p:extLst>
             </p:nvPr>
@@ -13350,10 +13350,10 @@
             <p:cNvPr id="26" name="Freeform 12">
               <a:extLst>
                 <a:ext uri="{FF2B5EF4-FFF2-40B4-BE49-F238E27FC236}">
-                  <a16:creationId xmlns:a16="http://schemas.microsoft.com/office/drawing/2014/main" xmlns="" id="{8A8B2820-6B8F-4C19-BFC5-D28EE44E54CB}"/>
+                  <a16:creationId xmlns="" xmlns:a16="http://schemas.microsoft.com/office/drawing/2014/main" id="{8A8B2820-6B8F-4C19-BFC5-D28EE44E54CB}"/>
                 </a:ext>
                 <a:ext uri="{C183D7F6-B498-43B3-948B-1728B52AA6E4}">
-                  <adec:decorative xmlns:adec="http://schemas.microsoft.com/office/drawing/2017/decorative" xmlns="" val="1"/>
+                  <adec:decorative xmlns="" xmlns:adec="http://schemas.microsoft.com/office/drawing/2017/decorative" val="1"/>
                 </a:ext>
               </a:extLst>
             </p:cNvPr>
@@ -13361,7 +13361,7 @@
             <p:nvPr>
               <p:extLst>
                 <p:ext uri="{386F3935-93C4-4BCD-93E2-E3B085C9AB24}">
-                  <p16:designElem xmlns:p16="http://schemas.microsoft.com/office/powerpoint/2015/main" xmlns="" val="1"/>
+                  <p16:designElem xmlns="" xmlns:p16="http://schemas.microsoft.com/office/powerpoint/2015/main" val="1"/>
                 </p:ext>
               </p:extLst>
             </p:nvPr>
@@ -13408,10 +13408,10 @@
             <p:cNvPr id="27" name="Freeform 13">
               <a:extLst>
                 <a:ext uri="{FF2B5EF4-FFF2-40B4-BE49-F238E27FC236}">
-                  <a16:creationId xmlns:a16="http://schemas.microsoft.com/office/drawing/2014/main" xmlns="" id="{773528ED-4D37-4A77-A8CA-86B6221C5E82}"/>
+                  <a16:creationId xmlns="" xmlns:a16="http://schemas.microsoft.com/office/drawing/2014/main" id="{773528ED-4D37-4A77-A8CA-86B6221C5E82}"/>
                 </a:ext>
                 <a:ext uri="{C183D7F6-B498-43B3-948B-1728B52AA6E4}">
-                  <adec:decorative xmlns:adec="http://schemas.microsoft.com/office/drawing/2017/decorative" xmlns="" val="1"/>
+                  <adec:decorative xmlns="" xmlns:adec="http://schemas.microsoft.com/office/drawing/2017/decorative" val="1"/>
                 </a:ext>
               </a:extLst>
             </p:cNvPr>
@@ -13419,7 +13419,7 @@
             <p:nvPr>
               <p:extLst>
                 <p:ext uri="{386F3935-93C4-4BCD-93E2-E3B085C9AB24}">
-                  <p16:designElem xmlns:p16="http://schemas.microsoft.com/office/powerpoint/2015/main" xmlns="" val="1"/>
+                  <p16:designElem xmlns="" xmlns:p16="http://schemas.microsoft.com/office/powerpoint/2015/main" val="1"/>
                 </p:ext>
               </p:extLst>
             </p:nvPr>
@@ -13468,10 +13468,10 @@
             <p:cNvPr id="28" name="Freeform 14">
               <a:extLst>
                 <a:ext uri="{FF2B5EF4-FFF2-40B4-BE49-F238E27FC236}">
-                  <a16:creationId xmlns:a16="http://schemas.microsoft.com/office/drawing/2014/main" xmlns="" id="{8A58A902-E944-4399-9A93-A91A6A82B166}"/>
+                  <a16:creationId xmlns="" xmlns:a16="http://schemas.microsoft.com/office/drawing/2014/main" id="{8A58A902-E944-4399-9A93-A91A6A82B166}"/>
                 </a:ext>
                 <a:ext uri="{C183D7F6-B498-43B3-948B-1728B52AA6E4}">
-                  <adec:decorative xmlns:adec="http://schemas.microsoft.com/office/drawing/2017/decorative" xmlns="" val="1"/>
+                  <adec:decorative xmlns="" xmlns:adec="http://schemas.microsoft.com/office/drawing/2017/decorative" val="1"/>
                 </a:ext>
               </a:extLst>
             </p:cNvPr>
@@ -13479,7 +13479,7 @@
             <p:nvPr>
               <p:extLst>
                 <p:ext uri="{386F3935-93C4-4BCD-93E2-E3B085C9AB24}">
-                  <p16:designElem xmlns:p16="http://schemas.microsoft.com/office/powerpoint/2015/main" xmlns="" val="1"/>
+                  <p16:designElem xmlns="" xmlns:p16="http://schemas.microsoft.com/office/powerpoint/2015/main" val="1"/>
                 </p:ext>
               </p:extLst>
             </p:nvPr>
@@ -13534,10 +13534,10 @@
             <p:cNvPr id="29" name="Freeform 15">
               <a:extLst>
                 <a:ext uri="{FF2B5EF4-FFF2-40B4-BE49-F238E27FC236}">
-                  <a16:creationId xmlns:a16="http://schemas.microsoft.com/office/drawing/2014/main" xmlns="" id="{4EDB1155-2E8E-4FB8-AD42-101FE4383231}"/>
+                  <a16:creationId xmlns="" xmlns:a16="http://schemas.microsoft.com/office/drawing/2014/main" id="{4EDB1155-2E8E-4FB8-AD42-101FE4383231}"/>
                 </a:ext>
                 <a:ext uri="{C183D7F6-B498-43B3-948B-1728B52AA6E4}">
-                  <adec:decorative xmlns:adec="http://schemas.microsoft.com/office/drawing/2017/decorative" xmlns="" val="1"/>
+                  <adec:decorative xmlns="" xmlns:adec="http://schemas.microsoft.com/office/drawing/2017/decorative" val="1"/>
                 </a:ext>
               </a:extLst>
             </p:cNvPr>
@@ -13545,7 +13545,7 @@
             <p:nvPr>
               <p:extLst>
                 <p:ext uri="{386F3935-93C4-4BCD-93E2-E3B085C9AB24}">
-                  <p16:designElem xmlns:p16="http://schemas.microsoft.com/office/powerpoint/2015/main" xmlns="" val="1"/>
+                  <p16:designElem xmlns="" xmlns:p16="http://schemas.microsoft.com/office/powerpoint/2015/main" val="1"/>
                 </p:ext>
               </p:extLst>
             </p:nvPr>
@@ -13605,7 +13605,7 @@
           <p:cNvPr id="2" name="Title 1">
             <a:extLst>
               <a:ext uri="{FF2B5EF4-FFF2-40B4-BE49-F238E27FC236}">
-                <a16:creationId xmlns:a16="http://schemas.microsoft.com/office/drawing/2014/main" xmlns="" id="{C7492CCE-C435-464E-A19A-D4C606FDBE3D}"/>
+                <a16:creationId xmlns="" xmlns:a16="http://schemas.microsoft.com/office/drawing/2014/main" id="{C7492CCE-C435-464E-A19A-D4C606FDBE3D}"/>
               </a:ext>
             </a:extLst>
           </p:cNvPr>
@@ -13641,7 +13641,7 @@
           <p:cNvPr id="3" name="Content Placeholder 2">
             <a:extLst>
               <a:ext uri="{FF2B5EF4-FFF2-40B4-BE49-F238E27FC236}">
-                <a16:creationId xmlns:a16="http://schemas.microsoft.com/office/drawing/2014/main" xmlns="" id="{60DFF4FA-F598-4962-B6AB-31A8BE724E52}"/>
+                <a16:creationId xmlns="" xmlns:a16="http://schemas.microsoft.com/office/drawing/2014/main" id="{60DFF4FA-F598-4962-B6AB-31A8BE724E52}"/>
               </a:ext>
             </a:extLst>
           </p:cNvPr>
@@ -13745,10 +13745,10 @@
           <p:cNvPr id="21" name="Rectangle 20">
             <a:extLst>
               <a:ext uri="{FF2B5EF4-FFF2-40B4-BE49-F238E27FC236}">
-                <a16:creationId xmlns:a16="http://schemas.microsoft.com/office/drawing/2014/main" xmlns="" id="{99CAC3B1-4879-424D-8F15-206277196159}"/>
+                <a16:creationId xmlns="" xmlns:a16="http://schemas.microsoft.com/office/drawing/2014/main" id="{99CAC3B1-4879-424D-8F15-206277196159}"/>
               </a:ext>
               <a:ext uri="{C183D7F6-B498-43B3-948B-1728B52AA6E4}">
-                <adec:decorative xmlns:adec="http://schemas.microsoft.com/office/drawing/2017/decorative" xmlns="" val="1"/>
+                <adec:decorative xmlns="" xmlns:adec="http://schemas.microsoft.com/office/drawing/2017/decorative" val="1"/>
               </a:ext>
             </a:extLst>
           </p:cNvPr>
@@ -13758,7 +13758,7 @@
           <p:nvPr>
             <p:extLst>
               <p:ext uri="{386F3935-93C4-4BCD-93E2-E3B085C9AB24}">
-                <p16:designElem xmlns:p16="http://schemas.microsoft.com/office/powerpoint/2015/main" xmlns="" val="1"/>
+                <p16:designElem xmlns="" xmlns:p16="http://schemas.microsoft.com/office/powerpoint/2015/main" val="1"/>
               </p:ext>
             </p:extLst>
           </p:nvPr>
@@ -13805,10 +13805,10 @@
           <p:cNvPr id="23" name="Group 22">
             <a:extLst>
               <a:ext uri="{FF2B5EF4-FFF2-40B4-BE49-F238E27FC236}">
-                <a16:creationId xmlns:a16="http://schemas.microsoft.com/office/drawing/2014/main" xmlns="" id="{4B8492CB-DFBA-4A82-9778-F21493DA36C1}"/>
+                <a16:creationId xmlns="" xmlns:a16="http://schemas.microsoft.com/office/drawing/2014/main" id="{4B8492CB-DFBA-4A82-9778-F21493DA36C1}"/>
               </a:ext>
               <a:ext uri="{C183D7F6-B498-43B3-948B-1728B52AA6E4}">
-                <adec:decorative xmlns:adec="http://schemas.microsoft.com/office/drawing/2017/decorative" xmlns="" val="1"/>
+                <adec:decorative xmlns="" xmlns:adec="http://schemas.microsoft.com/office/drawing/2017/decorative" val="1"/>
               </a:ext>
             </a:extLst>
           </p:cNvPr>
@@ -13818,7 +13818,7 @@
           <p:nvPr>
             <p:extLst>
               <p:ext uri="{386F3935-93C4-4BCD-93E2-E3B085C9AB24}">
-                <p16:designElem xmlns:p16="http://schemas.microsoft.com/office/powerpoint/2015/main" xmlns="" val="1"/>
+                <p16:designElem xmlns="" xmlns:p16="http://schemas.microsoft.com/office/powerpoint/2015/main" val="1"/>
               </p:ext>
             </p:extLst>
           </p:nvPr>
@@ -13836,10 +13836,10 @@
             <p:cNvPr id="24" name="Freeform 6">
               <a:extLst>
                 <a:ext uri="{FF2B5EF4-FFF2-40B4-BE49-F238E27FC236}">
-                  <a16:creationId xmlns:a16="http://schemas.microsoft.com/office/drawing/2014/main" xmlns="" id="{E34CC1C8-EBDD-4AEA-83E6-B27575B62E2E}"/>
+                  <a16:creationId xmlns="" xmlns:a16="http://schemas.microsoft.com/office/drawing/2014/main" id="{E34CC1C8-EBDD-4AEA-83E6-B27575B62E2E}"/>
                 </a:ext>
                 <a:ext uri="{C183D7F6-B498-43B3-948B-1728B52AA6E4}">
-                  <adec:decorative xmlns:adec="http://schemas.microsoft.com/office/drawing/2017/decorative" xmlns="" val="1"/>
+                  <adec:decorative xmlns="" xmlns:adec="http://schemas.microsoft.com/office/drawing/2017/decorative" val="1"/>
                 </a:ext>
               </a:extLst>
             </p:cNvPr>
@@ -13847,7 +13847,7 @@
             <p:nvPr>
               <p:extLst>
                 <p:ext uri="{386F3935-93C4-4BCD-93E2-E3B085C9AB24}">
-                  <p16:designElem xmlns:p16="http://schemas.microsoft.com/office/powerpoint/2015/main" xmlns="" val="1"/>
+                  <p16:designElem xmlns="" xmlns:p16="http://schemas.microsoft.com/office/powerpoint/2015/main" val="1"/>
                 </p:ext>
               </p:extLst>
             </p:nvPr>
@@ -13897,10 +13897,10 @@
             <p:cNvPr id="25" name="Freeform 7">
               <a:extLst>
                 <a:ext uri="{FF2B5EF4-FFF2-40B4-BE49-F238E27FC236}">
-                  <a16:creationId xmlns:a16="http://schemas.microsoft.com/office/drawing/2014/main" xmlns="" id="{D6B38644-B85D-4211-9526-5B4C2A662BF7}"/>
+                  <a16:creationId xmlns="" xmlns:a16="http://schemas.microsoft.com/office/drawing/2014/main" id="{D6B38644-B85D-4211-9526-5B4C2A662BF7}"/>
                 </a:ext>
                 <a:ext uri="{C183D7F6-B498-43B3-948B-1728B52AA6E4}">
-                  <adec:decorative xmlns:adec="http://schemas.microsoft.com/office/drawing/2017/decorative" xmlns="" val="1"/>
+                  <adec:decorative xmlns="" xmlns:adec="http://schemas.microsoft.com/office/drawing/2017/decorative" val="1"/>
                 </a:ext>
               </a:extLst>
             </p:cNvPr>
@@ -13908,7 +13908,7 @@
             <p:nvPr>
               <p:extLst>
                 <p:ext uri="{386F3935-93C4-4BCD-93E2-E3B085C9AB24}">
-                  <p16:designElem xmlns:p16="http://schemas.microsoft.com/office/powerpoint/2015/main" xmlns="" val="1"/>
+                  <p16:designElem xmlns="" xmlns:p16="http://schemas.microsoft.com/office/powerpoint/2015/main" val="1"/>
                 </p:ext>
               </p:extLst>
             </p:nvPr>
@@ -13961,10 +13961,10 @@
             <p:cNvPr id="26" name="Freeform 12">
               <a:extLst>
                 <a:ext uri="{FF2B5EF4-FFF2-40B4-BE49-F238E27FC236}">
-                  <a16:creationId xmlns:a16="http://schemas.microsoft.com/office/drawing/2014/main" xmlns="" id="{8A8B2820-6B8F-4C19-BFC5-D28EE44E54CB}"/>
+                  <a16:creationId xmlns="" xmlns:a16="http://schemas.microsoft.com/office/drawing/2014/main" id="{8A8B2820-6B8F-4C19-BFC5-D28EE44E54CB}"/>
                 </a:ext>
                 <a:ext uri="{C183D7F6-B498-43B3-948B-1728B52AA6E4}">
-                  <adec:decorative xmlns:adec="http://schemas.microsoft.com/office/drawing/2017/decorative" xmlns="" val="1"/>
+                  <adec:decorative xmlns="" xmlns:adec="http://schemas.microsoft.com/office/drawing/2017/decorative" val="1"/>
                 </a:ext>
               </a:extLst>
             </p:cNvPr>
@@ -13972,7 +13972,7 @@
             <p:nvPr>
               <p:extLst>
                 <p:ext uri="{386F3935-93C4-4BCD-93E2-E3B085C9AB24}">
-                  <p16:designElem xmlns:p16="http://schemas.microsoft.com/office/powerpoint/2015/main" xmlns="" val="1"/>
+                  <p16:designElem xmlns="" xmlns:p16="http://schemas.microsoft.com/office/powerpoint/2015/main" val="1"/>
                 </p:ext>
               </p:extLst>
             </p:nvPr>
@@ -14019,10 +14019,10 @@
             <p:cNvPr id="27" name="Freeform 13">
               <a:extLst>
                 <a:ext uri="{FF2B5EF4-FFF2-40B4-BE49-F238E27FC236}">
-                  <a16:creationId xmlns:a16="http://schemas.microsoft.com/office/drawing/2014/main" xmlns="" id="{773528ED-4D37-4A77-A8CA-86B6221C5E82}"/>
+                  <a16:creationId xmlns="" xmlns:a16="http://schemas.microsoft.com/office/drawing/2014/main" id="{773528ED-4D37-4A77-A8CA-86B6221C5E82}"/>
                 </a:ext>
                 <a:ext uri="{C183D7F6-B498-43B3-948B-1728B52AA6E4}">
-                  <adec:decorative xmlns:adec="http://schemas.microsoft.com/office/drawing/2017/decorative" xmlns="" val="1"/>
+                  <adec:decorative xmlns="" xmlns:adec="http://schemas.microsoft.com/office/drawing/2017/decorative" val="1"/>
                 </a:ext>
               </a:extLst>
             </p:cNvPr>
@@ -14030,7 +14030,7 @@
             <p:nvPr>
               <p:extLst>
                 <p:ext uri="{386F3935-93C4-4BCD-93E2-E3B085C9AB24}">
-                  <p16:designElem xmlns:p16="http://schemas.microsoft.com/office/powerpoint/2015/main" xmlns="" val="1"/>
+                  <p16:designElem xmlns="" xmlns:p16="http://schemas.microsoft.com/office/powerpoint/2015/main" val="1"/>
                 </p:ext>
               </p:extLst>
             </p:nvPr>
@@ -14079,10 +14079,10 @@
             <p:cNvPr id="28" name="Freeform 14">
               <a:extLst>
                 <a:ext uri="{FF2B5EF4-FFF2-40B4-BE49-F238E27FC236}">
-                  <a16:creationId xmlns:a16="http://schemas.microsoft.com/office/drawing/2014/main" xmlns="" id="{8A58A902-E944-4399-9A93-A91A6A82B166}"/>
+                  <a16:creationId xmlns="" xmlns:a16="http://schemas.microsoft.com/office/drawing/2014/main" id="{8A58A902-E944-4399-9A93-A91A6A82B166}"/>
                 </a:ext>
                 <a:ext uri="{C183D7F6-B498-43B3-948B-1728B52AA6E4}">
-                  <adec:decorative xmlns:adec="http://schemas.microsoft.com/office/drawing/2017/decorative" xmlns="" val="1"/>
+                  <adec:decorative xmlns="" xmlns:adec="http://schemas.microsoft.com/office/drawing/2017/decorative" val="1"/>
                 </a:ext>
               </a:extLst>
             </p:cNvPr>
@@ -14090,7 +14090,7 @@
             <p:nvPr>
               <p:extLst>
                 <p:ext uri="{386F3935-93C4-4BCD-93E2-E3B085C9AB24}">
-                  <p16:designElem xmlns:p16="http://schemas.microsoft.com/office/powerpoint/2015/main" xmlns="" val="1"/>
+                  <p16:designElem xmlns="" xmlns:p16="http://schemas.microsoft.com/office/powerpoint/2015/main" val="1"/>
                 </p:ext>
               </p:extLst>
             </p:nvPr>
@@ -14145,10 +14145,10 @@
             <p:cNvPr id="29" name="Freeform 15">
               <a:extLst>
                 <a:ext uri="{FF2B5EF4-FFF2-40B4-BE49-F238E27FC236}">
-                  <a16:creationId xmlns:a16="http://schemas.microsoft.com/office/drawing/2014/main" xmlns="" id="{4EDB1155-2E8E-4FB8-AD42-101FE4383231}"/>
+                  <a16:creationId xmlns="" xmlns:a16="http://schemas.microsoft.com/office/drawing/2014/main" id="{4EDB1155-2E8E-4FB8-AD42-101FE4383231}"/>
                 </a:ext>
                 <a:ext uri="{C183D7F6-B498-43B3-948B-1728B52AA6E4}">
-                  <adec:decorative xmlns:adec="http://schemas.microsoft.com/office/drawing/2017/decorative" xmlns="" val="1"/>
+                  <adec:decorative xmlns="" xmlns:adec="http://schemas.microsoft.com/office/drawing/2017/decorative" val="1"/>
                 </a:ext>
               </a:extLst>
             </p:cNvPr>
@@ -14156,7 +14156,7 @@
             <p:nvPr>
               <p:extLst>
                 <p:ext uri="{386F3935-93C4-4BCD-93E2-E3B085C9AB24}">
-                  <p16:designElem xmlns:p16="http://schemas.microsoft.com/office/powerpoint/2015/main" xmlns="" val="1"/>
+                  <p16:designElem xmlns="" xmlns:p16="http://schemas.microsoft.com/office/powerpoint/2015/main" val="1"/>
                 </p:ext>
               </p:extLst>
             </p:nvPr>
@@ -14216,7 +14216,7 @@
           <p:cNvPr id="2" name="Title 1">
             <a:extLst>
               <a:ext uri="{FF2B5EF4-FFF2-40B4-BE49-F238E27FC236}">
-                <a16:creationId xmlns:a16="http://schemas.microsoft.com/office/drawing/2014/main" xmlns="" id="{C7492CCE-C435-464E-A19A-D4C606FDBE3D}"/>
+                <a16:creationId xmlns="" xmlns:a16="http://schemas.microsoft.com/office/drawing/2014/main" id="{C7492CCE-C435-464E-A19A-D4C606FDBE3D}"/>
               </a:ext>
             </a:extLst>
           </p:cNvPr>
@@ -14252,7 +14252,7 @@
           <p:cNvPr id="3" name="Content Placeholder 2">
             <a:extLst>
               <a:ext uri="{FF2B5EF4-FFF2-40B4-BE49-F238E27FC236}">
-                <a16:creationId xmlns:a16="http://schemas.microsoft.com/office/drawing/2014/main" xmlns="" id="{60DFF4FA-F598-4962-B6AB-31A8BE724E52}"/>
+                <a16:creationId xmlns="" xmlns:a16="http://schemas.microsoft.com/office/drawing/2014/main" id="{60DFF4FA-F598-4962-B6AB-31A8BE724E52}"/>
               </a:ext>
             </a:extLst>
           </p:cNvPr>
@@ -14282,10 +14282,25 @@
           </a:p>
           <a:p>
             <a:r>
-              <a:rPr lang="en-US" sz="1800"/>
-              <a:t>Large Scale Ocean surface simulation</a:t>
+              <a:rPr lang="en-US" sz="1800" dirty="0"/>
+              <a:t>Large </a:t>
             </a:r>
-            <a:endParaRPr lang="en-US" sz="1800" dirty="0"/>
+            <a:r>
+              <a:rPr lang="en-US" sz="1800" dirty="0" smtClean="0"/>
+              <a:t>scale </a:t>
+            </a:r>
+            <a:r>
+              <a:rPr lang="en-US" sz="1800" dirty="0"/>
+              <a:t>o</a:t>
+            </a:r>
+            <a:r>
+              <a:rPr lang="en-US" sz="1800" dirty="0" smtClean="0"/>
+              <a:t>cean </a:t>
+            </a:r>
+            <a:r>
+              <a:rPr lang="en-US" sz="1800" dirty="0"/>
+              <a:t>surface simulation</a:t>
+            </a:r>
           </a:p>
           <a:p>
             <a:r>
@@ -14306,7 +14321,7 @@
           <p:cNvPr id="5" name="TextBox 4">
             <a:extLst>
               <a:ext uri="{FF2B5EF4-FFF2-40B4-BE49-F238E27FC236}">
-                <a16:creationId xmlns:a16="http://schemas.microsoft.com/office/drawing/2014/main" xmlns="" id="{466A409B-90E2-4ACB-8A16-0329B5CEE6DF}"/>
+                <a16:creationId xmlns="" xmlns:a16="http://schemas.microsoft.com/office/drawing/2014/main" id="{466A409B-90E2-4ACB-8A16-0329B5CEE6DF}"/>
               </a:ext>
             </a:extLst>
           </p:cNvPr>
@@ -14353,7 +14368,7 @@
           <p:cNvPr id="7" name="Straight Arrow Connector 6">
             <a:extLst>
               <a:ext uri="{FF2B5EF4-FFF2-40B4-BE49-F238E27FC236}">
-                <a16:creationId xmlns:a16="http://schemas.microsoft.com/office/drawing/2014/main" xmlns="" id="{6C986E87-252D-4CDD-90A3-050A5080DF44}"/>
+                <a16:creationId xmlns="" xmlns:a16="http://schemas.microsoft.com/office/drawing/2014/main" id="{6C986E87-252D-4CDD-90A3-050A5080DF44}"/>
               </a:ext>
             </a:extLst>
           </p:cNvPr>
@@ -14394,7 +14409,7 @@
           <p:cNvPr id="17" name="Straight Arrow Connector 16">
             <a:extLst>
               <a:ext uri="{FF2B5EF4-FFF2-40B4-BE49-F238E27FC236}">
-                <a16:creationId xmlns:a16="http://schemas.microsoft.com/office/drawing/2014/main" xmlns="" id="{8B32EEAB-6F30-4731-8D76-02708A63C23C}"/>
+                <a16:creationId xmlns="" xmlns:a16="http://schemas.microsoft.com/office/drawing/2014/main" id="{8B32EEAB-6F30-4731-8D76-02708A63C23C}"/>
               </a:ext>
             </a:extLst>
           </p:cNvPr>
@@ -14435,7 +14450,7 @@
           <p:cNvPr id="18" name="Straight Arrow Connector 17">
             <a:extLst>
               <a:ext uri="{FF2B5EF4-FFF2-40B4-BE49-F238E27FC236}">
-                <a16:creationId xmlns:a16="http://schemas.microsoft.com/office/drawing/2014/main" xmlns="" id="{E930BBA9-7BA1-48A0-A9E1-F9545CD11BAA}"/>
+                <a16:creationId xmlns="" xmlns:a16="http://schemas.microsoft.com/office/drawing/2014/main" id="{E930BBA9-7BA1-48A0-A9E1-F9545CD11BAA}"/>
               </a:ext>
             </a:extLst>
           </p:cNvPr>
@@ -14476,7 +14491,7 @@
           <p:cNvPr id="19" name="Straight Arrow Connector 18">
             <a:extLst>
               <a:ext uri="{FF2B5EF4-FFF2-40B4-BE49-F238E27FC236}">
-                <a16:creationId xmlns:a16="http://schemas.microsoft.com/office/drawing/2014/main" xmlns="" id="{72D8D5ED-08A2-4E59-AA33-3E70202E855D}"/>
+                <a16:creationId xmlns="" xmlns:a16="http://schemas.microsoft.com/office/drawing/2014/main" id="{72D8D5ED-08A2-4E59-AA33-3E70202E855D}"/>
               </a:ext>
             </a:extLst>
           </p:cNvPr>
@@ -14555,10 +14570,10 @@
           <p:cNvPr id="21" name="Rectangle 20">
             <a:extLst>
               <a:ext uri="{FF2B5EF4-FFF2-40B4-BE49-F238E27FC236}">
-                <a16:creationId xmlns:a16="http://schemas.microsoft.com/office/drawing/2014/main" xmlns="" id="{99CAC3B1-4879-424D-8F15-206277196159}"/>
+                <a16:creationId xmlns="" xmlns:a16="http://schemas.microsoft.com/office/drawing/2014/main" id="{99CAC3B1-4879-424D-8F15-206277196159}"/>
               </a:ext>
               <a:ext uri="{C183D7F6-B498-43B3-948B-1728B52AA6E4}">
-                <adec:decorative xmlns:adec="http://schemas.microsoft.com/office/drawing/2017/decorative" xmlns="" val="1"/>
+                <adec:decorative xmlns="" xmlns:adec="http://schemas.microsoft.com/office/drawing/2017/decorative" val="1"/>
               </a:ext>
             </a:extLst>
           </p:cNvPr>
@@ -14568,7 +14583,7 @@
           <p:nvPr>
             <p:extLst>
               <p:ext uri="{386F3935-93C4-4BCD-93E2-E3B085C9AB24}">
-                <p16:designElem xmlns:p16="http://schemas.microsoft.com/office/powerpoint/2015/main" xmlns="" val="1"/>
+                <p16:designElem xmlns="" xmlns:p16="http://schemas.microsoft.com/office/powerpoint/2015/main" val="1"/>
               </p:ext>
             </p:extLst>
           </p:nvPr>
@@ -14615,10 +14630,10 @@
           <p:cNvPr id="23" name="Group 22">
             <a:extLst>
               <a:ext uri="{FF2B5EF4-FFF2-40B4-BE49-F238E27FC236}">
-                <a16:creationId xmlns:a16="http://schemas.microsoft.com/office/drawing/2014/main" xmlns="" id="{4B8492CB-DFBA-4A82-9778-F21493DA36C1}"/>
+                <a16:creationId xmlns="" xmlns:a16="http://schemas.microsoft.com/office/drawing/2014/main" id="{4B8492CB-DFBA-4A82-9778-F21493DA36C1}"/>
               </a:ext>
               <a:ext uri="{C183D7F6-B498-43B3-948B-1728B52AA6E4}">
-                <adec:decorative xmlns:adec="http://schemas.microsoft.com/office/drawing/2017/decorative" xmlns="" val="1"/>
+                <adec:decorative xmlns="" xmlns:adec="http://schemas.microsoft.com/office/drawing/2017/decorative" val="1"/>
               </a:ext>
             </a:extLst>
           </p:cNvPr>
@@ -14628,7 +14643,7 @@
           <p:nvPr>
             <p:extLst>
               <p:ext uri="{386F3935-93C4-4BCD-93E2-E3B085C9AB24}">
-                <p16:designElem xmlns:p16="http://schemas.microsoft.com/office/powerpoint/2015/main" xmlns="" val="1"/>
+                <p16:designElem xmlns="" xmlns:p16="http://schemas.microsoft.com/office/powerpoint/2015/main" val="1"/>
               </p:ext>
             </p:extLst>
           </p:nvPr>
@@ -14646,10 +14661,10 @@
             <p:cNvPr id="24" name="Freeform 6">
               <a:extLst>
                 <a:ext uri="{FF2B5EF4-FFF2-40B4-BE49-F238E27FC236}">
-                  <a16:creationId xmlns:a16="http://schemas.microsoft.com/office/drawing/2014/main" xmlns="" id="{E34CC1C8-EBDD-4AEA-83E6-B27575B62E2E}"/>
+                  <a16:creationId xmlns="" xmlns:a16="http://schemas.microsoft.com/office/drawing/2014/main" id="{E34CC1C8-EBDD-4AEA-83E6-B27575B62E2E}"/>
                 </a:ext>
                 <a:ext uri="{C183D7F6-B498-43B3-948B-1728B52AA6E4}">
-                  <adec:decorative xmlns:adec="http://schemas.microsoft.com/office/drawing/2017/decorative" xmlns="" val="1"/>
+                  <adec:decorative xmlns="" xmlns:adec="http://schemas.microsoft.com/office/drawing/2017/decorative" val="1"/>
                 </a:ext>
               </a:extLst>
             </p:cNvPr>
@@ -14657,7 +14672,7 @@
             <p:nvPr>
               <p:extLst>
                 <p:ext uri="{386F3935-93C4-4BCD-93E2-E3B085C9AB24}">
-                  <p16:designElem xmlns:p16="http://schemas.microsoft.com/office/powerpoint/2015/main" xmlns="" val="1"/>
+                  <p16:designElem xmlns="" xmlns:p16="http://schemas.microsoft.com/office/powerpoint/2015/main" val="1"/>
                 </p:ext>
               </p:extLst>
             </p:nvPr>
@@ -14707,10 +14722,10 @@
             <p:cNvPr id="25" name="Freeform 7">
               <a:extLst>
                 <a:ext uri="{FF2B5EF4-FFF2-40B4-BE49-F238E27FC236}">
-                  <a16:creationId xmlns:a16="http://schemas.microsoft.com/office/drawing/2014/main" xmlns="" id="{D6B38644-B85D-4211-9526-5B4C2A662BF7}"/>
+                  <a16:creationId xmlns="" xmlns:a16="http://schemas.microsoft.com/office/drawing/2014/main" id="{D6B38644-B85D-4211-9526-5B4C2A662BF7}"/>
                 </a:ext>
                 <a:ext uri="{C183D7F6-B498-43B3-948B-1728B52AA6E4}">
-                  <adec:decorative xmlns:adec="http://schemas.microsoft.com/office/drawing/2017/decorative" xmlns="" val="1"/>
+                  <adec:decorative xmlns="" xmlns:adec="http://schemas.microsoft.com/office/drawing/2017/decorative" val="1"/>
                 </a:ext>
               </a:extLst>
             </p:cNvPr>
@@ -14718,7 +14733,7 @@
             <p:nvPr>
               <p:extLst>
                 <p:ext uri="{386F3935-93C4-4BCD-93E2-E3B085C9AB24}">
-                  <p16:designElem xmlns:p16="http://schemas.microsoft.com/office/powerpoint/2015/main" xmlns="" val="1"/>
+                  <p16:designElem xmlns="" xmlns:p16="http://schemas.microsoft.com/office/powerpoint/2015/main" val="1"/>
                 </p:ext>
               </p:extLst>
             </p:nvPr>
@@ -14771,10 +14786,10 @@
             <p:cNvPr id="26" name="Freeform 12">
               <a:extLst>
                 <a:ext uri="{FF2B5EF4-FFF2-40B4-BE49-F238E27FC236}">
-                  <a16:creationId xmlns:a16="http://schemas.microsoft.com/office/drawing/2014/main" xmlns="" id="{8A8B2820-6B8F-4C19-BFC5-D28EE44E54CB}"/>
+                  <a16:creationId xmlns="" xmlns:a16="http://schemas.microsoft.com/office/drawing/2014/main" id="{8A8B2820-6B8F-4C19-BFC5-D28EE44E54CB}"/>
                 </a:ext>
                 <a:ext uri="{C183D7F6-B498-43B3-948B-1728B52AA6E4}">
-                  <adec:decorative xmlns:adec="http://schemas.microsoft.com/office/drawing/2017/decorative" xmlns="" val="1"/>
+                  <adec:decorative xmlns="" xmlns:adec="http://schemas.microsoft.com/office/drawing/2017/decorative" val="1"/>
                 </a:ext>
               </a:extLst>
             </p:cNvPr>
@@ -14782,7 +14797,7 @@
             <p:nvPr>
               <p:extLst>
                 <p:ext uri="{386F3935-93C4-4BCD-93E2-E3B085C9AB24}">
-                  <p16:designElem xmlns:p16="http://schemas.microsoft.com/office/powerpoint/2015/main" xmlns="" val="1"/>
+                  <p16:designElem xmlns="" xmlns:p16="http://schemas.microsoft.com/office/powerpoint/2015/main" val="1"/>
                 </p:ext>
               </p:extLst>
             </p:nvPr>
@@ -14829,10 +14844,10 @@
             <p:cNvPr id="27" name="Freeform 13">
               <a:extLst>
                 <a:ext uri="{FF2B5EF4-FFF2-40B4-BE49-F238E27FC236}">
-                  <a16:creationId xmlns:a16="http://schemas.microsoft.com/office/drawing/2014/main" xmlns="" id="{773528ED-4D37-4A77-A8CA-86B6221C5E82}"/>
+                  <a16:creationId xmlns="" xmlns:a16="http://schemas.microsoft.com/office/drawing/2014/main" id="{773528ED-4D37-4A77-A8CA-86B6221C5E82}"/>
                 </a:ext>
                 <a:ext uri="{C183D7F6-B498-43B3-948B-1728B52AA6E4}">
-                  <adec:decorative xmlns:adec="http://schemas.microsoft.com/office/drawing/2017/decorative" xmlns="" val="1"/>
+                  <adec:decorative xmlns="" xmlns:adec="http://schemas.microsoft.com/office/drawing/2017/decorative" val="1"/>
                 </a:ext>
               </a:extLst>
             </p:cNvPr>
@@ -14840,7 +14855,7 @@
             <p:nvPr>
               <p:extLst>
                 <p:ext uri="{386F3935-93C4-4BCD-93E2-E3B085C9AB24}">
-                  <p16:designElem xmlns:p16="http://schemas.microsoft.com/office/powerpoint/2015/main" xmlns="" val="1"/>
+                  <p16:designElem xmlns="" xmlns:p16="http://schemas.microsoft.com/office/powerpoint/2015/main" val="1"/>
                 </p:ext>
               </p:extLst>
             </p:nvPr>
@@ -14889,10 +14904,10 @@
             <p:cNvPr id="28" name="Freeform 14">
               <a:extLst>
                 <a:ext uri="{FF2B5EF4-FFF2-40B4-BE49-F238E27FC236}">
-                  <a16:creationId xmlns:a16="http://schemas.microsoft.com/office/drawing/2014/main" xmlns="" id="{8A58A902-E944-4399-9A93-A91A6A82B166}"/>
+                  <a16:creationId xmlns="" xmlns:a16="http://schemas.microsoft.com/office/drawing/2014/main" id="{8A58A902-E944-4399-9A93-A91A6A82B166}"/>
                 </a:ext>
                 <a:ext uri="{C183D7F6-B498-43B3-948B-1728B52AA6E4}">
-                  <adec:decorative xmlns:adec="http://schemas.microsoft.com/office/drawing/2017/decorative" xmlns="" val="1"/>
+                  <adec:decorative xmlns="" xmlns:adec="http://schemas.microsoft.com/office/drawing/2017/decorative" val="1"/>
                 </a:ext>
               </a:extLst>
             </p:cNvPr>
@@ -14900,7 +14915,7 @@
             <p:nvPr>
               <p:extLst>
                 <p:ext uri="{386F3935-93C4-4BCD-93E2-E3B085C9AB24}">
-                  <p16:designElem xmlns:p16="http://schemas.microsoft.com/office/powerpoint/2015/main" xmlns="" val="1"/>
+                  <p16:designElem xmlns="" xmlns:p16="http://schemas.microsoft.com/office/powerpoint/2015/main" val="1"/>
                 </p:ext>
               </p:extLst>
             </p:nvPr>
@@ -14955,10 +14970,10 @@
             <p:cNvPr id="29" name="Freeform 15">
               <a:extLst>
                 <a:ext uri="{FF2B5EF4-FFF2-40B4-BE49-F238E27FC236}">
-                  <a16:creationId xmlns:a16="http://schemas.microsoft.com/office/drawing/2014/main" xmlns="" id="{4EDB1155-2E8E-4FB8-AD42-101FE4383231}"/>
+                  <a16:creationId xmlns="" xmlns:a16="http://schemas.microsoft.com/office/drawing/2014/main" id="{4EDB1155-2E8E-4FB8-AD42-101FE4383231}"/>
                 </a:ext>
                 <a:ext uri="{C183D7F6-B498-43B3-948B-1728B52AA6E4}">
-                  <adec:decorative xmlns:adec="http://schemas.microsoft.com/office/drawing/2017/decorative" xmlns="" val="1"/>
+                  <adec:decorative xmlns="" xmlns:adec="http://schemas.microsoft.com/office/drawing/2017/decorative" val="1"/>
                 </a:ext>
               </a:extLst>
             </p:cNvPr>
@@ -14966,7 +14981,7 @@
             <p:nvPr>
               <p:extLst>
                 <p:ext uri="{386F3935-93C4-4BCD-93E2-E3B085C9AB24}">
-                  <p16:designElem xmlns:p16="http://schemas.microsoft.com/office/powerpoint/2015/main" xmlns="" val="1"/>
+                  <p16:designElem xmlns="" xmlns:p16="http://schemas.microsoft.com/office/powerpoint/2015/main" val="1"/>
                 </p:ext>
               </p:extLst>
             </p:nvPr>
@@ -15026,7 +15041,7 @@
           <p:cNvPr id="5" name="TextBox 4">
             <a:extLst>
               <a:ext uri="{FF2B5EF4-FFF2-40B4-BE49-F238E27FC236}">
-                <a16:creationId xmlns:a16="http://schemas.microsoft.com/office/drawing/2014/main" xmlns="" id="{466A409B-90E2-4ACB-8A16-0329B5CEE6DF}"/>
+                <a16:creationId xmlns="" xmlns:a16="http://schemas.microsoft.com/office/drawing/2014/main" id="{466A409B-90E2-4ACB-8A16-0329B5CEE6DF}"/>
               </a:ext>
             </a:extLst>
           </p:cNvPr>
@@ -15073,7 +15088,7 @@
           <p:cNvPr id="7" name="Straight Arrow Connector 6">
             <a:extLst>
               <a:ext uri="{FF2B5EF4-FFF2-40B4-BE49-F238E27FC236}">
-                <a16:creationId xmlns:a16="http://schemas.microsoft.com/office/drawing/2014/main" xmlns="" id="{6C986E87-252D-4CDD-90A3-050A5080DF44}"/>
+                <a16:creationId xmlns="" xmlns:a16="http://schemas.microsoft.com/office/drawing/2014/main" id="{6C986E87-252D-4CDD-90A3-050A5080DF44}"/>
               </a:ext>
             </a:extLst>
           </p:cNvPr>
@@ -15114,7 +15129,7 @@
           <p:cNvPr id="17" name="Straight Arrow Connector 16">
             <a:extLst>
               <a:ext uri="{FF2B5EF4-FFF2-40B4-BE49-F238E27FC236}">
-                <a16:creationId xmlns:a16="http://schemas.microsoft.com/office/drawing/2014/main" xmlns="" id="{8B32EEAB-6F30-4731-8D76-02708A63C23C}"/>
+                <a16:creationId xmlns="" xmlns:a16="http://schemas.microsoft.com/office/drawing/2014/main" id="{8B32EEAB-6F30-4731-8D76-02708A63C23C}"/>
               </a:ext>
             </a:extLst>
           </p:cNvPr>
@@ -15155,7 +15170,7 @@
           <p:cNvPr id="18" name="Straight Arrow Connector 17">
             <a:extLst>
               <a:ext uri="{FF2B5EF4-FFF2-40B4-BE49-F238E27FC236}">
-                <a16:creationId xmlns:a16="http://schemas.microsoft.com/office/drawing/2014/main" xmlns="" id="{E930BBA9-7BA1-48A0-A9E1-F9545CD11BAA}"/>
+                <a16:creationId xmlns="" xmlns:a16="http://schemas.microsoft.com/office/drawing/2014/main" id="{E930BBA9-7BA1-48A0-A9E1-F9545CD11BAA}"/>
               </a:ext>
             </a:extLst>
           </p:cNvPr>
@@ -15196,7 +15211,7 @@
           <p:cNvPr id="19" name="Straight Arrow Connector 18">
             <a:extLst>
               <a:ext uri="{FF2B5EF4-FFF2-40B4-BE49-F238E27FC236}">
-                <a16:creationId xmlns:a16="http://schemas.microsoft.com/office/drawing/2014/main" xmlns="" id="{72D8D5ED-08A2-4E59-AA33-3E70202E855D}"/>
+                <a16:creationId xmlns="" xmlns:a16="http://schemas.microsoft.com/office/drawing/2014/main" id="{72D8D5ED-08A2-4E59-AA33-3E70202E855D}"/>
               </a:ext>
             </a:extLst>
           </p:cNvPr>
@@ -15237,7 +15252,7 @@
           <p:cNvPr id="34" name="Picture 33">
             <a:extLst>
               <a:ext uri="{FF2B5EF4-FFF2-40B4-BE49-F238E27FC236}">
-                <a16:creationId xmlns="" xmlns:a16="http://schemas.microsoft.com/office/drawing/2014/main" xmlns:lc="http://schemas.openxmlformats.org/drawingml/2006/lockedCanvas" id="{C796CA00-FA13-476A-9ABE-1A17344ABC61}"/>
+                <a16:creationId xmlns:lc="http://schemas.openxmlformats.org/drawingml/2006/lockedCanvas" xmlns:a16="http://schemas.microsoft.com/office/drawing/2014/main" xmlns="" id="{C796CA00-FA13-476A-9ABE-1A17344ABC61}"/>
               </a:ext>
             </a:extLst>
           </p:cNvPr>
@@ -15267,7 +15282,7 @@
           <p:cNvPr id="35" name="Picture 34">
             <a:extLst>
               <a:ext uri="{FF2B5EF4-FFF2-40B4-BE49-F238E27FC236}">
-                <a16:creationId xmlns="" xmlns:a16="http://schemas.microsoft.com/office/drawing/2014/main" xmlns:lc="http://schemas.openxmlformats.org/drawingml/2006/lockedCanvas" id="{A79A5D21-C558-490D-B09E-AE5E23A6C111}"/>
+                <a16:creationId xmlns:lc="http://schemas.openxmlformats.org/drawingml/2006/lockedCanvas" xmlns:a16="http://schemas.microsoft.com/office/drawing/2014/main" xmlns="" id="{A79A5D21-C558-490D-B09E-AE5E23A6C111}"/>
               </a:ext>
             </a:extLst>
           </p:cNvPr>
@@ -15297,7 +15312,7 @@
           <p:cNvPr id="36" name="Picture 35">
             <a:extLst>
               <a:ext uri="{FF2B5EF4-FFF2-40B4-BE49-F238E27FC236}">
-                <a16:creationId xmlns="" xmlns:a16="http://schemas.microsoft.com/office/drawing/2014/main" xmlns:lc="http://schemas.openxmlformats.org/drawingml/2006/lockedCanvas" id="{24BE2ABE-8A1A-4A61-8921-27405C2CCB19}"/>
+                <a16:creationId xmlns:lc="http://schemas.openxmlformats.org/drawingml/2006/lockedCanvas" xmlns:a16="http://schemas.microsoft.com/office/drawing/2014/main" xmlns="" id="{24BE2ABE-8A1A-4A61-8921-27405C2CCB19}"/>
               </a:ext>
             </a:extLst>
           </p:cNvPr>
@@ -15327,7 +15342,7 @@
           <p:cNvPr id="37" name="TextBox 11">
             <a:extLst>
               <a:ext uri="{FF2B5EF4-FFF2-40B4-BE49-F238E27FC236}">
-                <a16:creationId xmlns="" xmlns:a16="http://schemas.microsoft.com/office/drawing/2014/main" xmlns:lc="http://schemas.openxmlformats.org/drawingml/2006/lockedCanvas" id="{3ED8D828-23F6-4F62-895A-0C04DE02C6A7}"/>
+                <a16:creationId xmlns:lc="http://schemas.openxmlformats.org/drawingml/2006/lockedCanvas" xmlns:a16="http://schemas.microsoft.com/office/drawing/2014/main" xmlns="" id="{3ED8D828-23F6-4F62-895A-0C04DE02C6A7}"/>
               </a:ext>
             </a:extLst>
           </p:cNvPr>
@@ -15456,7 +15471,7 @@
           <p:cNvPr id="38" name="TextBox 13">
             <a:extLst>
               <a:ext uri="{FF2B5EF4-FFF2-40B4-BE49-F238E27FC236}">
-                <a16:creationId xmlns="" xmlns:a16="http://schemas.microsoft.com/office/drawing/2014/main" xmlns:lc="http://schemas.openxmlformats.org/drawingml/2006/lockedCanvas" id="{0FFC0F84-7529-4C07-88EE-CFAA4120297D}"/>
+                <a16:creationId xmlns:lc="http://schemas.openxmlformats.org/drawingml/2006/lockedCanvas" xmlns:a16="http://schemas.microsoft.com/office/drawing/2014/main" xmlns="" id="{0FFC0F84-7529-4C07-88EE-CFAA4120297D}"/>
               </a:ext>
             </a:extLst>
           </p:cNvPr>
@@ -15585,7 +15600,7 @@
           <p:cNvPr id="39" name="TextBox 2">
             <a:extLst>
               <a:ext uri="{FF2B5EF4-FFF2-40B4-BE49-F238E27FC236}">
-                <a16:creationId xmlns="" xmlns:a16="http://schemas.microsoft.com/office/drawing/2014/main" xmlns:lc="http://schemas.openxmlformats.org/drawingml/2006/lockedCanvas" id="{0D872DD5-0F01-4E78-8D4F-A7666652FBC9}"/>
+                <a16:creationId xmlns:lc="http://schemas.openxmlformats.org/drawingml/2006/lockedCanvas" xmlns:a16="http://schemas.microsoft.com/office/drawing/2014/main" xmlns="" id="{0D872DD5-0F01-4E78-8D4F-A7666652FBC9}"/>
               </a:ext>
             </a:extLst>
           </p:cNvPr>
@@ -15752,10 +15767,10 @@
           <p:cNvPr id="21" name="Rectangle 20">
             <a:extLst>
               <a:ext uri="{FF2B5EF4-FFF2-40B4-BE49-F238E27FC236}">
-                <a16:creationId xmlns:a16="http://schemas.microsoft.com/office/drawing/2014/main" xmlns="" id="{99CAC3B1-4879-424D-8F15-206277196159}"/>
+                <a16:creationId xmlns="" xmlns:a16="http://schemas.microsoft.com/office/drawing/2014/main" id="{99CAC3B1-4879-424D-8F15-206277196159}"/>
               </a:ext>
               <a:ext uri="{C183D7F6-B498-43B3-948B-1728B52AA6E4}">
-                <adec:decorative xmlns:adec="http://schemas.microsoft.com/office/drawing/2017/decorative" xmlns="" val="1"/>
+                <adec:decorative xmlns="" xmlns:adec="http://schemas.microsoft.com/office/drawing/2017/decorative" val="1"/>
               </a:ext>
             </a:extLst>
           </p:cNvPr>
@@ -15765,7 +15780,7 @@
           <p:nvPr>
             <p:extLst>
               <p:ext uri="{386F3935-93C4-4BCD-93E2-E3B085C9AB24}">
-                <p16:designElem xmlns:p16="http://schemas.microsoft.com/office/powerpoint/2015/main" xmlns="" val="1"/>
+                <p16:designElem xmlns="" xmlns:p16="http://schemas.microsoft.com/office/powerpoint/2015/main" val="1"/>
               </p:ext>
             </p:extLst>
           </p:nvPr>
@@ -15812,10 +15827,10 @@
           <p:cNvPr id="23" name="Group 22">
             <a:extLst>
               <a:ext uri="{FF2B5EF4-FFF2-40B4-BE49-F238E27FC236}">
-                <a16:creationId xmlns:a16="http://schemas.microsoft.com/office/drawing/2014/main" xmlns="" id="{4B8492CB-DFBA-4A82-9778-F21493DA36C1}"/>
+                <a16:creationId xmlns="" xmlns:a16="http://schemas.microsoft.com/office/drawing/2014/main" id="{4B8492CB-DFBA-4A82-9778-F21493DA36C1}"/>
               </a:ext>
               <a:ext uri="{C183D7F6-B498-43B3-948B-1728B52AA6E4}">
-                <adec:decorative xmlns:adec="http://schemas.microsoft.com/office/drawing/2017/decorative" xmlns="" val="1"/>
+                <adec:decorative xmlns="" xmlns:adec="http://schemas.microsoft.com/office/drawing/2017/decorative" val="1"/>
               </a:ext>
             </a:extLst>
           </p:cNvPr>
@@ -15825,7 +15840,7 @@
           <p:nvPr>
             <p:extLst>
               <p:ext uri="{386F3935-93C4-4BCD-93E2-E3B085C9AB24}">
-                <p16:designElem xmlns:p16="http://schemas.microsoft.com/office/powerpoint/2015/main" xmlns="" val="1"/>
+                <p16:designElem xmlns="" xmlns:p16="http://schemas.microsoft.com/office/powerpoint/2015/main" val="1"/>
               </p:ext>
             </p:extLst>
           </p:nvPr>
@@ -15843,10 +15858,10 @@
             <p:cNvPr id="24" name="Freeform 6">
               <a:extLst>
                 <a:ext uri="{FF2B5EF4-FFF2-40B4-BE49-F238E27FC236}">
-                  <a16:creationId xmlns:a16="http://schemas.microsoft.com/office/drawing/2014/main" xmlns="" id="{E34CC1C8-EBDD-4AEA-83E6-B27575B62E2E}"/>
+                  <a16:creationId xmlns="" xmlns:a16="http://schemas.microsoft.com/office/drawing/2014/main" id="{E34CC1C8-EBDD-4AEA-83E6-B27575B62E2E}"/>
                 </a:ext>
                 <a:ext uri="{C183D7F6-B498-43B3-948B-1728B52AA6E4}">
-                  <adec:decorative xmlns:adec="http://schemas.microsoft.com/office/drawing/2017/decorative" xmlns="" val="1"/>
+                  <adec:decorative xmlns="" xmlns:adec="http://schemas.microsoft.com/office/drawing/2017/decorative" val="1"/>
                 </a:ext>
               </a:extLst>
             </p:cNvPr>
@@ -15854,7 +15869,7 @@
             <p:nvPr>
               <p:extLst>
                 <p:ext uri="{386F3935-93C4-4BCD-93E2-E3B085C9AB24}">
-                  <p16:designElem xmlns:p16="http://schemas.microsoft.com/office/powerpoint/2015/main" xmlns="" val="1"/>
+                  <p16:designElem xmlns="" xmlns:p16="http://schemas.microsoft.com/office/powerpoint/2015/main" val="1"/>
                 </p:ext>
               </p:extLst>
             </p:nvPr>
@@ -15904,10 +15919,10 @@
             <p:cNvPr id="25" name="Freeform 7">
               <a:extLst>
                 <a:ext uri="{FF2B5EF4-FFF2-40B4-BE49-F238E27FC236}">
-                  <a16:creationId xmlns:a16="http://schemas.microsoft.com/office/drawing/2014/main" xmlns="" id="{D6B38644-B85D-4211-9526-5B4C2A662BF7}"/>
+                  <a16:creationId xmlns="" xmlns:a16="http://schemas.microsoft.com/office/drawing/2014/main" id="{D6B38644-B85D-4211-9526-5B4C2A662BF7}"/>
                 </a:ext>
                 <a:ext uri="{C183D7F6-B498-43B3-948B-1728B52AA6E4}">
-                  <adec:decorative xmlns:adec="http://schemas.microsoft.com/office/drawing/2017/decorative" xmlns="" val="1"/>
+                  <adec:decorative xmlns="" xmlns:adec="http://schemas.microsoft.com/office/drawing/2017/decorative" val="1"/>
                 </a:ext>
               </a:extLst>
             </p:cNvPr>
@@ -15915,7 +15930,7 @@
             <p:nvPr>
               <p:extLst>
                 <p:ext uri="{386F3935-93C4-4BCD-93E2-E3B085C9AB24}">
-                  <p16:designElem xmlns:p16="http://schemas.microsoft.com/office/powerpoint/2015/main" xmlns="" val="1"/>
+                  <p16:designElem xmlns="" xmlns:p16="http://schemas.microsoft.com/office/powerpoint/2015/main" val="1"/>
                 </p:ext>
               </p:extLst>
             </p:nvPr>
@@ -15968,10 +15983,10 @@
             <p:cNvPr id="26" name="Freeform 12">
               <a:extLst>
                 <a:ext uri="{FF2B5EF4-FFF2-40B4-BE49-F238E27FC236}">
-                  <a16:creationId xmlns:a16="http://schemas.microsoft.com/office/drawing/2014/main" xmlns="" id="{8A8B2820-6B8F-4C19-BFC5-D28EE44E54CB}"/>
+                  <a16:creationId xmlns="" xmlns:a16="http://schemas.microsoft.com/office/drawing/2014/main" id="{8A8B2820-6B8F-4C19-BFC5-D28EE44E54CB}"/>
                 </a:ext>
                 <a:ext uri="{C183D7F6-B498-43B3-948B-1728B52AA6E4}">
-                  <adec:decorative xmlns:adec="http://schemas.microsoft.com/office/drawing/2017/decorative" xmlns="" val="1"/>
+                  <adec:decorative xmlns="" xmlns:adec="http://schemas.microsoft.com/office/drawing/2017/decorative" val="1"/>
                 </a:ext>
               </a:extLst>
             </p:cNvPr>
@@ -15979,7 +15994,7 @@
             <p:nvPr>
               <p:extLst>
                 <p:ext uri="{386F3935-93C4-4BCD-93E2-E3B085C9AB24}">
-                  <p16:designElem xmlns:p16="http://schemas.microsoft.com/office/powerpoint/2015/main" xmlns="" val="1"/>
+                  <p16:designElem xmlns="" xmlns:p16="http://schemas.microsoft.com/office/powerpoint/2015/main" val="1"/>
                 </p:ext>
               </p:extLst>
             </p:nvPr>
@@ -16026,10 +16041,10 @@
             <p:cNvPr id="27" name="Freeform 13">
               <a:extLst>
                 <a:ext uri="{FF2B5EF4-FFF2-40B4-BE49-F238E27FC236}">
-                  <a16:creationId xmlns:a16="http://schemas.microsoft.com/office/drawing/2014/main" xmlns="" id="{773528ED-4D37-4A77-A8CA-86B6221C5E82}"/>
+                  <a16:creationId xmlns="" xmlns:a16="http://schemas.microsoft.com/office/drawing/2014/main" id="{773528ED-4D37-4A77-A8CA-86B6221C5E82}"/>
                 </a:ext>
                 <a:ext uri="{C183D7F6-B498-43B3-948B-1728B52AA6E4}">
-                  <adec:decorative xmlns:adec="http://schemas.microsoft.com/office/drawing/2017/decorative" xmlns="" val="1"/>
+                  <adec:decorative xmlns="" xmlns:adec="http://schemas.microsoft.com/office/drawing/2017/decorative" val="1"/>
                 </a:ext>
               </a:extLst>
             </p:cNvPr>
@@ -16037,7 +16052,7 @@
             <p:nvPr>
               <p:extLst>
                 <p:ext uri="{386F3935-93C4-4BCD-93E2-E3B085C9AB24}">
-                  <p16:designElem xmlns:p16="http://schemas.microsoft.com/office/powerpoint/2015/main" xmlns="" val="1"/>
+                  <p16:designElem xmlns="" xmlns:p16="http://schemas.microsoft.com/office/powerpoint/2015/main" val="1"/>
                 </p:ext>
               </p:extLst>
             </p:nvPr>
@@ -16086,10 +16101,10 @@
             <p:cNvPr id="28" name="Freeform 14">
               <a:extLst>
                 <a:ext uri="{FF2B5EF4-FFF2-40B4-BE49-F238E27FC236}">
-                  <a16:creationId xmlns:a16="http://schemas.microsoft.com/office/drawing/2014/main" xmlns="" id="{8A58A902-E944-4399-9A93-A91A6A82B166}"/>
+                  <a16:creationId xmlns="" xmlns:a16="http://schemas.microsoft.com/office/drawing/2014/main" id="{8A58A902-E944-4399-9A93-A91A6A82B166}"/>
                 </a:ext>
                 <a:ext uri="{C183D7F6-B498-43B3-948B-1728B52AA6E4}">
-                  <adec:decorative xmlns:adec="http://schemas.microsoft.com/office/drawing/2017/decorative" xmlns="" val="1"/>
+                  <adec:decorative xmlns="" xmlns:adec="http://schemas.microsoft.com/office/drawing/2017/decorative" val="1"/>
                 </a:ext>
               </a:extLst>
             </p:cNvPr>
@@ -16097,7 +16112,7 @@
             <p:nvPr>
               <p:extLst>
                 <p:ext uri="{386F3935-93C4-4BCD-93E2-E3B085C9AB24}">
-                  <p16:designElem xmlns:p16="http://schemas.microsoft.com/office/powerpoint/2015/main" xmlns="" val="1"/>
+                  <p16:designElem xmlns="" xmlns:p16="http://schemas.microsoft.com/office/powerpoint/2015/main" val="1"/>
                 </p:ext>
               </p:extLst>
             </p:nvPr>
@@ -16152,10 +16167,10 @@
             <p:cNvPr id="29" name="Freeform 15">
               <a:extLst>
                 <a:ext uri="{FF2B5EF4-FFF2-40B4-BE49-F238E27FC236}">
-                  <a16:creationId xmlns:a16="http://schemas.microsoft.com/office/drawing/2014/main" xmlns="" id="{4EDB1155-2E8E-4FB8-AD42-101FE4383231}"/>
+                  <a16:creationId xmlns="" xmlns:a16="http://schemas.microsoft.com/office/drawing/2014/main" id="{4EDB1155-2E8E-4FB8-AD42-101FE4383231}"/>
                 </a:ext>
                 <a:ext uri="{C183D7F6-B498-43B3-948B-1728B52AA6E4}">
-                  <adec:decorative xmlns:adec="http://schemas.microsoft.com/office/drawing/2017/decorative" xmlns="" val="1"/>
+                  <adec:decorative xmlns="" xmlns:adec="http://schemas.microsoft.com/office/drawing/2017/decorative" val="1"/>
                 </a:ext>
               </a:extLst>
             </p:cNvPr>
@@ -16163,7 +16178,7 @@
             <p:nvPr>
               <p:extLst>
                 <p:ext uri="{386F3935-93C4-4BCD-93E2-E3B085C9AB24}">
-                  <p16:designElem xmlns:p16="http://schemas.microsoft.com/office/powerpoint/2015/main" xmlns="" val="1"/>
+                  <p16:designElem xmlns="" xmlns:p16="http://schemas.microsoft.com/office/powerpoint/2015/main" val="1"/>
                 </p:ext>
               </p:extLst>
             </p:nvPr>
@@ -16223,7 +16238,7 @@
           <p:cNvPr id="2" name="Title 1">
             <a:extLst>
               <a:ext uri="{FF2B5EF4-FFF2-40B4-BE49-F238E27FC236}">
-                <a16:creationId xmlns:a16="http://schemas.microsoft.com/office/drawing/2014/main" xmlns="" id="{C7492CCE-C435-464E-A19A-D4C606FDBE3D}"/>
+                <a16:creationId xmlns="" xmlns:a16="http://schemas.microsoft.com/office/drawing/2014/main" id="{C7492CCE-C435-464E-A19A-D4C606FDBE3D}"/>
               </a:ext>
             </a:extLst>
           </p:cNvPr>
@@ -16259,7 +16274,7 @@
           <p:cNvPr id="3" name="Content Placeholder 2">
             <a:extLst>
               <a:ext uri="{FF2B5EF4-FFF2-40B4-BE49-F238E27FC236}">
-                <a16:creationId xmlns:a16="http://schemas.microsoft.com/office/drawing/2014/main" xmlns="" id="{60DFF4FA-F598-4962-B6AB-31A8BE724E52}"/>
+                <a16:creationId xmlns="" xmlns:a16="http://schemas.microsoft.com/office/drawing/2014/main" id="{60DFF4FA-F598-4962-B6AB-31A8BE724E52}"/>
               </a:ext>
             </a:extLst>
           </p:cNvPr>
@@ -16363,10 +16378,10 @@
           <p:cNvPr id="21" name="Rectangle 20">
             <a:extLst>
               <a:ext uri="{FF2B5EF4-FFF2-40B4-BE49-F238E27FC236}">
-                <a16:creationId xmlns:a16="http://schemas.microsoft.com/office/drawing/2014/main" xmlns="" id="{99CAC3B1-4879-424D-8F15-206277196159}"/>
+                <a16:creationId xmlns="" xmlns:a16="http://schemas.microsoft.com/office/drawing/2014/main" id="{99CAC3B1-4879-424D-8F15-206277196159}"/>
               </a:ext>
               <a:ext uri="{C183D7F6-B498-43B3-948B-1728B52AA6E4}">
-                <adec:decorative xmlns:adec="http://schemas.microsoft.com/office/drawing/2017/decorative" xmlns="" val="1"/>
+                <adec:decorative xmlns="" xmlns:adec="http://schemas.microsoft.com/office/drawing/2017/decorative" val="1"/>
               </a:ext>
             </a:extLst>
           </p:cNvPr>
@@ -16376,7 +16391,7 @@
           <p:nvPr>
             <p:extLst>
               <p:ext uri="{386F3935-93C4-4BCD-93E2-E3B085C9AB24}">
-                <p16:designElem xmlns:p16="http://schemas.microsoft.com/office/powerpoint/2015/main" xmlns="" val="1"/>
+                <p16:designElem xmlns="" xmlns:p16="http://schemas.microsoft.com/office/powerpoint/2015/main" val="1"/>
               </p:ext>
             </p:extLst>
           </p:nvPr>
@@ -16423,10 +16438,10 @@
           <p:cNvPr id="23" name="Group 22">
             <a:extLst>
               <a:ext uri="{FF2B5EF4-FFF2-40B4-BE49-F238E27FC236}">
-                <a16:creationId xmlns:a16="http://schemas.microsoft.com/office/drawing/2014/main" xmlns="" id="{4B8492CB-DFBA-4A82-9778-F21493DA36C1}"/>
+                <a16:creationId xmlns="" xmlns:a16="http://schemas.microsoft.com/office/drawing/2014/main" id="{4B8492CB-DFBA-4A82-9778-F21493DA36C1}"/>
               </a:ext>
               <a:ext uri="{C183D7F6-B498-43B3-948B-1728B52AA6E4}">
-                <adec:decorative xmlns:adec="http://schemas.microsoft.com/office/drawing/2017/decorative" xmlns="" val="1"/>
+                <adec:decorative xmlns="" xmlns:adec="http://schemas.microsoft.com/office/drawing/2017/decorative" val="1"/>
               </a:ext>
             </a:extLst>
           </p:cNvPr>
@@ -16436,7 +16451,7 @@
           <p:nvPr>
             <p:extLst>
               <p:ext uri="{386F3935-93C4-4BCD-93E2-E3B085C9AB24}">
-                <p16:designElem xmlns:p16="http://schemas.microsoft.com/office/powerpoint/2015/main" xmlns="" val="1"/>
+                <p16:designElem xmlns="" xmlns:p16="http://schemas.microsoft.com/office/powerpoint/2015/main" val="1"/>
               </p:ext>
             </p:extLst>
           </p:nvPr>
@@ -16454,10 +16469,10 @@
             <p:cNvPr id="24" name="Freeform 6">
               <a:extLst>
                 <a:ext uri="{FF2B5EF4-FFF2-40B4-BE49-F238E27FC236}">
-                  <a16:creationId xmlns:a16="http://schemas.microsoft.com/office/drawing/2014/main" xmlns="" id="{E34CC1C8-EBDD-4AEA-83E6-B27575B62E2E}"/>
+                  <a16:creationId xmlns="" xmlns:a16="http://schemas.microsoft.com/office/drawing/2014/main" id="{E34CC1C8-EBDD-4AEA-83E6-B27575B62E2E}"/>
                 </a:ext>
                 <a:ext uri="{C183D7F6-B498-43B3-948B-1728B52AA6E4}">
-                  <adec:decorative xmlns:adec="http://schemas.microsoft.com/office/drawing/2017/decorative" xmlns="" val="1"/>
+                  <adec:decorative xmlns="" xmlns:adec="http://schemas.microsoft.com/office/drawing/2017/decorative" val="1"/>
                 </a:ext>
               </a:extLst>
             </p:cNvPr>
@@ -16465,7 +16480,7 @@
             <p:nvPr>
               <p:extLst>
                 <p:ext uri="{386F3935-93C4-4BCD-93E2-E3B085C9AB24}">
-                  <p16:designElem xmlns:p16="http://schemas.microsoft.com/office/powerpoint/2015/main" xmlns="" val="1"/>
+                  <p16:designElem xmlns="" xmlns:p16="http://schemas.microsoft.com/office/powerpoint/2015/main" val="1"/>
                 </p:ext>
               </p:extLst>
             </p:nvPr>
@@ -16515,10 +16530,10 @@
             <p:cNvPr id="25" name="Freeform 7">
               <a:extLst>
                 <a:ext uri="{FF2B5EF4-FFF2-40B4-BE49-F238E27FC236}">
-                  <a16:creationId xmlns:a16="http://schemas.microsoft.com/office/drawing/2014/main" xmlns="" id="{D6B38644-B85D-4211-9526-5B4C2A662BF7}"/>
+                  <a16:creationId xmlns="" xmlns:a16="http://schemas.microsoft.com/office/drawing/2014/main" id="{D6B38644-B85D-4211-9526-5B4C2A662BF7}"/>
                 </a:ext>
                 <a:ext uri="{C183D7F6-B498-43B3-948B-1728B52AA6E4}">
-                  <adec:decorative xmlns:adec="http://schemas.microsoft.com/office/drawing/2017/decorative" xmlns="" val="1"/>
+                  <adec:decorative xmlns="" xmlns:adec="http://schemas.microsoft.com/office/drawing/2017/decorative" val="1"/>
                 </a:ext>
               </a:extLst>
             </p:cNvPr>
@@ -16526,7 +16541,7 @@
             <p:nvPr>
               <p:extLst>
                 <p:ext uri="{386F3935-93C4-4BCD-93E2-E3B085C9AB24}">
-                  <p16:designElem xmlns:p16="http://schemas.microsoft.com/office/powerpoint/2015/main" xmlns="" val="1"/>
+                  <p16:designElem xmlns="" xmlns:p16="http://schemas.microsoft.com/office/powerpoint/2015/main" val="1"/>
                 </p:ext>
               </p:extLst>
             </p:nvPr>
@@ -16579,10 +16594,10 @@
             <p:cNvPr id="26" name="Freeform 12">
               <a:extLst>
                 <a:ext uri="{FF2B5EF4-FFF2-40B4-BE49-F238E27FC236}">
-                  <a16:creationId xmlns:a16="http://schemas.microsoft.com/office/drawing/2014/main" xmlns="" id="{8A8B2820-6B8F-4C19-BFC5-D28EE44E54CB}"/>
+                  <a16:creationId xmlns="" xmlns:a16="http://schemas.microsoft.com/office/drawing/2014/main" id="{8A8B2820-6B8F-4C19-BFC5-D28EE44E54CB}"/>
                 </a:ext>
                 <a:ext uri="{C183D7F6-B498-43B3-948B-1728B52AA6E4}">
-                  <adec:decorative xmlns:adec="http://schemas.microsoft.com/office/drawing/2017/decorative" xmlns="" val="1"/>
+                  <adec:decorative xmlns="" xmlns:adec="http://schemas.microsoft.com/office/drawing/2017/decorative" val="1"/>
                 </a:ext>
               </a:extLst>
             </p:cNvPr>
@@ -16590,7 +16605,7 @@
             <p:nvPr>
               <p:extLst>
                 <p:ext uri="{386F3935-93C4-4BCD-93E2-E3B085C9AB24}">
-                  <p16:designElem xmlns:p16="http://schemas.microsoft.com/office/powerpoint/2015/main" xmlns="" val="1"/>
+                  <p16:designElem xmlns="" xmlns:p16="http://schemas.microsoft.com/office/powerpoint/2015/main" val="1"/>
                 </p:ext>
               </p:extLst>
             </p:nvPr>
@@ -16637,10 +16652,10 @@
             <p:cNvPr id="27" name="Freeform 13">
               <a:extLst>
                 <a:ext uri="{FF2B5EF4-FFF2-40B4-BE49-F238E27FC236}">
-                  <a16:creationId xmlns:a16="http://schemas.microsoft.com/office/drawing/2014/main" xmlns="" id="{773528ED-4D37-4A77-A8CA-86B6221C5E82}"/>
+                  <a16:creationId xmlns="" xmlns:a16="http://schemas.microsoft.com/office/drawing/2014/main" id="{773528ED-4D37-4A77-A8CA-86B6221C5E82}"/>
                 </a:ext>
                 <a:ext uri="{C183D7F6-B498-43B3-948B-1728B52AA6E4}">
-                  <adec:decorative xmlns:adec="http://schemas.microsoft.com/office/drawing/2017/decorative" xmlns="" val="1"/>
+                  <adec:decorative xmlns="" xmlns:adec="http://schemas.microsoft.com/office/drawing/2017/decorative" val="1"/>
                 </a:ext>
               </a:extLst>
             </p:cNvPr>
@@ -16648,7 +16663,7 @@
             <p:nvPr>
               <p:extLst>
                 <p:ext uri="{386F3935-93C4-4BCD-93E2-E3B085C9AB24}">
-                  <p16:designElem xmlns:p16="http://schemas.microsoft.com/office/powerpoint/2015/main" xmlns="" val="1"/>
+                  <p16:designElem xmlns="" xmlns:p16="http://schemas.microsoft.com/office/powerpoint/2015/main" val="1"/>
                 </p:ext>
               </p:extLst>
             </p:nvPr>
@@ -16697,10 +16712,10 @@
             <p:cNvPr id="28" name="Freeform 14">
               <a:extLst>
                 <a:ext uri="{FF2B5EF4-FFF2-40B4-BE49-F238E27FC236}">
-                  <a16:creationId xmlns:a16="http://schemas.microsoft.com/office/drawing/2014/main" xmlns="" id="{8A58A902-E944-4399-9A93-A91A6A82B166}"/>
+                  <a16:creationId xmlns="" xmlns:a16="http://schemas.microsoft.com/office/drawing/2014/main" id="{8A58A902-E944-4399-9A93-A91A6A82B166}"/>
                 </a:ext>
                 <a:ext uri="{C183D7F6-B498-43B3-948B-1728B52AA6E4}">
-                  <adec:decorative xmlns:adec="http://schemas.microsoft.com/office/drawing/2017/decorative" xmlns="" val="1"/>
+                  <adec:decorative xmlns="" xmlns:adec="http://schemas.microsoft.com/office/drawing/2017/decorative" val="1"/>
                 </a:ext>
               </a:extLst>
             </p:cNvPr>
@@ -16708,7 +16723,7 @@
             <p:nvPr>
               <p:extLst>
                 <p:ext uri="{386F3935-93C4-4BCD-93E2-E3B085C9AB24}">
-                  <p16:designElem xmlns:p16="http://schemas.microsoft.com/office/powerpoint/2015/main" xmlns="" val="1"/>
+                  <p16:designElem xmlns="" xmlns:p16="http://schemas.microsoft.com/office/powerpoint/2015/main" val="1"/>
                 </p:ext>
               </p:extLst>
             </p:nvPr>
@@ -16763,10 +16778,10 @@
             <p:cNvPr id="29" name="Freeform 15">
               <a:extLst>
                 <a:ext uri="{FF2B5EF4-FFF2-40B4-BE49-F238E27FC236}">
-                  <a16:creationId xmlns:a16="http://schemas.microsoft.com/office/drawing/2014/main" xmlns="" id="{4EDB1155-2E8E-4FB8-AD42-101FE4383231}"/>
+                  <a16:creationId xmlns="" xmlns:a16="http://schemas.microsoft.com/office/drawing/2014/main" id="{4EDB1155-2E8E-4FB8-AD42-101FE4383231}"/>
                 </a:ext>
                 <a:ext uri="{C183D7F6-B498-43B3-948B-1728B52AA6E4}">
-                  <adec:decorative xmlns:adec="http://schemas.microsoft.com/office/drawing/2017/decorative" xmlns="" val="1"/>
+                  <adec:decorative xmlns="" xmlns:adec="http://schemas.microsoft.com/office/drawing/2017/decorative" val="1"/>
                 </a:ext>
               </a:extLst>
             </p:cNvPr>
@@ -16774,7 +16789,7 @@
             <p:nvPr>
               <p:extLst>
                 <p:ext uri="{386F3935-93C4-4BCD-93E2-E3B085C9AB24}">
-                  <p16:designElem xmlns:p16="http://schemas.microsoft.com/office/powerpoint/2015/main" xmlns="" val="1"/>
+                  <p16:designElem xmlns="" xmlns:p16="http://schemas.microsoft.com/office/powerpoint/2015/main" val="1"/>
                 </p:ext>
               </p:extLst>
             </p:nvPr>
@@ -16834,7 +16849,7 @@
           <p:cNvPr id="2" name="Title 1">
             <a:extLst>
               <a:ext uri="{FF2B5EF4-FFF2-40B4-BE49-F238E27FC236}">
-                <a16:creationId xmlns:a16="http://schemas.microsoft.com/office/drawing/2014/main" xmlns="" id="{C7492CCE-C435-464E-A19A-D4C606FDBE3D}"/>
+                <a16:creationId xmlns="" xmlns:a16="http://schemas.microsoft.com/office/drawing/2014/main" id="{C7492CCE-C435-464E-A19A-D4C606FDBE3D}"/>
               </a:ext>
             </a:extLst>
           </p:cNvPr>
@@ -16897,7 +16912,7 @@
           <p:cNvPr id="5" name="TextBox 4">
             <a:extLst>
               <a:ext uri="{FF2B5EF4-FFF2-40B4-BE49-F238E27FC236}">
-                <a16:creationId xmlns:a16="http://schemas.microsoft.com/office/drawing/2014/main" xmlns="" id="{466A409B-90E2-4ACB-8A16-0329B5CEE6DF}"/>
+                <a16:creationId xmlns="" xmlns:a16="http://schemas.microsoft.com/office/drawing/2014/main" id="{466A409B-90E2-4ACB-8A16-0329B5CEE6DF}"/>
               </a:ext>
             </a:extLst>
           </p:cNvPr>
@@ -16948,7 +16963,7 @@
           <p:cNvPr id="7" name="Straight Arrow Connector 6">
             <a:extLst>
               <a:ext uri="{FF2B5EF4-FFF2-40B4-BE49-F238E27FC236}">
-                <a16:creationId xmlns:a16="http://schemas.microsoft.com/office/drawing/2014/main" xmlns="" id="{6C986E87-252D-4CDD-90A3-050A5080DF44}"/>
+                <a16:creationId xmlns="" xmlns:a16="http://schemas.microsoft.com/office/drawing/2014/main" id="{6C986E87-252D-4CDD-90A3-050A5080DF44}"/>
               </a:ext>
             </a:extLst>
           </p:cNvPr>
@@ -16989,7 +17004,7 @@
           <p:cNvPr id="17" name="Straight Arrow Connector 16">
             <a:extLst>
               <a:ext uri="{FF2B5EF4-FFF2-40B4-BE49-F238E27FC236}">
-                <a16:creationId xmlns:a16="http://schemas.microsoft.com/office/drawing/2014/main" xmlns="" id="{8B32EEAB-6F30-4731-8D76-02708A63C23C}"/>
+                <a16:creationId xmlns="" xmlns:a16="http://schemas.microsoft.com/office/drawing/2014/main" id="{8B32EEAB-6F30-4731-8D76-02708A63C23C}"/>
               </a:ext>
             </a:extLst>
           </p:cNvPr>
@@ -17030,7 +17045,7 @@
           <p:cNvPr id="18" name="Straight Arrow Connector 17">
             <a:extLst>
               <a:ext uri="{FF2B5EF4-FFF2-40B4-BE49-F238E27FC236}">
-                <a16:creationId xmlns:a16="http://schemas.microsoft.com/office/drawing/2014/main" xmlns="" id="{E930BBA9-7BA1-48A0-A9E1-F9545CD11BAA}"/>
+                <a16:creationId xmlns="" xmlns:a16="http://schemas.microsoft.com/office/drawing/2014/main" id="{E930BBA9-7BA1-48A0-A9E1-F9545CD11BAA}"/>
               </a:ext>
             </a:extLst>
           </p:cNvPr>
@@ -17071,7 +17086,7 @@
           <p:cNvPr id="19" name="Straight Arrow Connector 18">
             <a:extLst>
               <a:ext uri="{FF2B5EF4-FFF2-40B4-BE49-F238E27FC236}">
-                <a16:creationId xmlns:a16="http://schemas.microsoft.com/office/drawing/2014/main" xmlns="" id="{72D8D5ED-08A2-4E59-AA33-3E70202E855D}"/>
+                <a16:creationId xmlns="" xmlns:a16="http://schemas.microsoft.com/office/drawing/2014/main" id="{72D8D5ED-08A2-4E59-AA33-3E70202E855D}"/>
               </a:ext>
             </a:extLst>
           </p:cNvPr>
@@ -17136,7 +17151,7 @@
           <p:cNvPr id="20" name="TextBox 11">
             <a:extLst>
               <a:ext uri="{FF2B5EF4-FFF2-40B4-BE49-F238E27FC236}">
-                <a16:creationId xmlns="" xmlns:a16="http://schemas.microsoft.com/office/drawing/2014/main" xmlns:lc="http://schemas.openxmlformats.org/drawingml/2006/lockedCanvas" id="{3ED8D828-23F6-4F62-895A-0C04DE02C6A7}"/>
+                <a16:creationId xmlns:lc="http://schemas.openxmlformats.org/drawingml/2006/lockedCanvas" xmlns:a16="http://schemas.microsoft.com/office/drawing/2014/main" xmlns="" id="{3ED8D828-23F6-4F62-895A-0C04DE02C6A7}"/>
               </a:ext>
             </a:extLst>
           </p:cNvPr>
@@ -17270,7 +17285,7 @@
           <p:cNvPr id="22" name="TextBox 11">
             <a:extLst>
               <a:ext uri="{FF2B5EF4-FFF2-40B4-BE49-F238E27FC236}">
-                <a16:creationId xmlns="" xmlns:a16="http://schemas.microsoft.com/office/drawing/2014/main" xmlns:lc="http://schemas.openxmlformats.org/drawingml/2006/lockedCanvas" id="{3ED8D828-23F6-4F62-895A-0C04DE02C6A7}"/>
+                <a16:creationId xmlns:lc="http://schemas.openxmlformats.org/drawingml/2006/lockedCanvas" xmlns:a16="http://schemas.microsoft.com/office/drawing/2014/main" xmlns="" id="{3ED8D828-23F6-4F62-895A-0C04DE02C6A7}"/>
               </a:ext>
             </a:extLst>
           </p:cNvPr>
@@ -17442,10 +17457,10 @@
           <p:cNvPr id="21" name="Rectangle 20">
             <a:extLst>
               <a:ext uri="{FF2B5EF4-FFF2-40B4-BE49-F238E27FC236}">
-                <a16:creationId xmlns:a16="http://schemas.microsoft.com/office/drawing/2014/main" xmlns="" id="{99CAC3B1-4879-424D-8F15-206277196159}"/>
+                <a16:creationId xmlns="" xmlns:a16="http://schemas.microsoft.com/office/drawing/2014/main" id="{99CAC3B1-4879-424D-8F15-206277196159}"/>
               </a:ext>
               <a:ext uri="{C183D7F6-B498-43B3-948B-1728B52AA6E4}">
-                <adec:decorative xmlns:adec="http://schemas.microsoft.com/office/drawing/2017/decorative" xmlns="" val="1"/>
+                <adec:decorative xmlns="" xmlns:adec="http://schemas.microsoft.com/office/drawing/2017/decorative" val="1"/>
               </a:ext>
             </a:extLst>
           </p:cNvPr>
@@ -17455,7 +17470,7 @@
           <p:nvPr>
             <p:extLst>
               <p:ext uri="{386F3935-93C4-4BCD-93E2-E3B085C9AB24}">
-                <p16:designElem xmlns:p16="http://schemas.microsoft.com/office/powerpoint/2015/main" xmlns="" val="1"/>
+                <p16:designElem xmlns="" xmlns:p16="http://schemas.microsoft.com/office/powerpoint/2015/main" val="1"/>
               </p:ext>
             </p:extLst>
           </p:nvPr>
@@ -17502,10 +17517,10 @@
           <p:cNvPr id="23" name="Group 22">
             <a:extLst>
               <a:ext uri="{FF2B5EF4-FFF2-40B4-BE49-F238E27FC236}">
-                <a16:creationId xmlns:a16="http://schemas.microsoft.com/office/drawing/2014/main" xmlns="" id="{4B8492CB-DFBA-4A82-9778-F21493DA36C1}"/>
+                <a16:creationId xmlns="" xmlns:a16="http://schemas.microsoft.com/office/drawing/2014/main" id="{4B8492CB-DFBA-4A82-9778-F21493DA36C1}"/>
               </a:ext>
               <a:ext uri="{C183D7F6-B498-43B3-948B-1728B52AA6E4}">
-                <adec:decorative xmlns:adec="http://schemas.microsoft.com/office/drawing/2017/decorative" xmlns="" val="1"/>
+                <adec:decorative xmlns="" xmlns:adec="http://schemas.microsoft.com/office/drawing/2017/decorative" val="1"/>
               </a:ext>
             </a:extLst>
           </p:cNvPr>
@@ -17515,7 +17530,7 @@
           <p:nvPr>
             <p:extLst>
               <p:ext uri="{386F3935-93C4-4BCD-93E2-E3B085C9AB24}">
-                <p16:designElem xmlns:p16="http://schemas.microsoft.com/office/powerpoint/2015/main" xmlns="" val="1"/>
+                <p16:designElem xmlns="" xmlns:p16="http://schemas.microsoft.com/office/powerpoint/2015/main" val="1"/>
               </p:ext>
             </p:extLst>
           </p:nvPr>
@@ -17533,10 +17548,10 @@
             <p:cNvPr id="24" name="Freeform 6">
               <a:extLst>
                 <a:ext uri="{FF2B5EF4-FFF2-40B4-BE49-F238E27FC236}">
-                  <a16:creationId xmlns:a16="http://schemas.microsoft.com/office/drawing/2014/main" xmlns="" id="{E34CC1C8-EBDD-4AEA-83E6-B27575B62E2E}"/>
+                  <a16:creationId xmlns="" xmlns:a16="http://schemas.microsoft.com/office/drawing/2014/main" id="{E34CC1C8-EBDD-4AEA-83E6-B27575B62E2E}"/>
                 </a:ext>
                 <a:ext uri="{C183D7F6-B498-43B3-948B-1728B52AA6E4}">
-                  <adec:decorative xmlns:adec="http://schemas.microsoft.com/office/drawing/2017/decorative" xmlns="" val="1"/>
+                  <adec:decorative xmlns="" xmlns:adec="http://schemas.microsoft.com/office/drawing/2017/decorative" val="1"/>
                 </a:ext>
               </a:extLst>
             </p:cNvPr>
@@ -17544,7 +17559,7 @@
             <p:nvPr>
               <p:extLst>
                 <p:ext uri="{386F3935-93C4-4BCD-93E2-E3B085C9AB24}">
-                  <p16:designElem xmlns:p16="http://schemas.microsoft.com/office/powerpoint/2015/main" xmlns="" val="1"/>
+                  <p16:designElem xmlns="" xmlns:p16="http://schemas.microsoft.com/office/powerpoint/2015/main" val="1"/>
                 </p:ext>
               </p:extLst>
             </p:nvPr>
@@ -17594,10 +17609,10 @@
             <p:cNvPr id="25" name="Freeform 7">
               <a:extLst>
                 <a:ext uri="{FF2B5EF4-FFF2-40B4-BE49-F238E27FC236}">
-                  <a16:creationId xmlns:a16="http://schemas.microsoft.com/office/drawing/2014/main" xmlns="" id="{D6B38644-B85D-4211-9526-5B4C2A662BF7}"/>
+                  <a16:creationId xmlns="" xmlns:a16="http://schemas.microsoft.com/office/drawing/2014/main" id="{D6B38644-B85D-4211-9526-5B4C2A662BF7}"/>
                 </a:ext>
                 <a:ext uri="{C183D7F6-B498-43B3-948B-1728B52AA6E4}">
-                  <adec:decorative xmlns:adec="http://schemas.microsoft.com/office/drawing/2017/decorative" xmlns="" val="1"/>
+                  <adec:decorative xmlns="" xmlns:adec="http://schemas.microsoft.com/office/drawing/2017/decorative" val="1"/>
                 </a:ext>
               </a:extLst>
             </p:cNvPr>
@@ -17605,7 +17620,7 @@
             <p:nvPr>
               <p:extLst>
                 <p:ext uri="{386F3935-93C4-4BCD-93E2-E3B085C9AB24}">
-                  <p16:designElem xmlns:p16="http://schemas.microsoft.com/office/powerpoint/2015/main" xmlns="" val="1"/>
+                  <p16:designElem xmlns="" xmlns:p16="http://schemas.microsoft.com/office/powerpoint/2015/main" val="1"/>
                 </p:ext>
               </p:extLst>
             </p:nvPr>
@@ -17658,10 +17673,10 @@
             <p:cNvPr id="26" name="Freeform 12">
               <a:extLst>
                 <a:ext uri="{FF2B5EF4-FFF2-40B4-BE49-F238E27FC236}">
-                  <a16:creationId xmlns:a16="http://schemas.microsoft.com/office/drawing/2014/main" xmlns="" id="{8A8B2820-6B8F-4C19-BFC5-D28EE44E54CB}"/>
+                  <a16:creationId xmlns="" xmlns:a16="http://schemas.microsoft.com/office/drawing/2014/main" id="{8A8B2820-6B8F-4C19-BFC5-D28EE44E54CB}"/>
                 </a:ext>
                 <a:ext uri="{C183D7F6-B498-43B3-948B-1728B52AA6E4}">
-                  <adec:decorative xmlns:adec="http://schemas.microsoft.com/office/drawing/2017/decorative" xmlns="" val="1"/>
+                  <adec:decorative xmlns="" xmlns:adec="http://schemas.microsoft.com/office/drawing/2017/decorative" val="1"/>
                 </a:ext>
               </a:extLst>
             </p:cNvPr>
@@ -17669,7 +17684,7 @@
             <p:nvPr>
               <p:extLst>
                 <p:ext uri="{386F3935-93C4-4BCD-93E2-E3B085C9AB24}">
-                  <p16:designElem xmlns:p16="http://schemas.microsoft.com/office/powerpoint/2015/main" xmlns="" val="1"/>
+                  <p16:designElem xmlns="" xmlns:p16="http://schemas.microsoft.com/office/powerpoint/2015/main" val="1"/>
                 </p:ext>
               </p:extLst>
             </p:nvPr>
@@ -17716,10 +17731,10 @@
             <p:cNvPr id="27" name="Freeform 13">
               <a:extLst>
                 <a:ext uri="{FF2B5EF4-FFF2-40B4-BE49-F238E27FC236}">
-                  <a16:creationId xmlns:a16="http://schemas.microsoft.com/office/drawing/2014/main" xmlns="" id="{773528ED-4D37-4A77-A8CA-86B6221C5E82}"/>
+                  <a16:creationId xmlns="" xmlns:a16="http://schemas.microsoft.com/office/drawing/2014/main" id="{773528ED-4D37-4A77-A8CA-86B6221C5E82}"/>
                 </a:ext>
                 <a:ext uri="{C183D7F6-B498-43B3-948B-1728B52AA6E4}">
-                  <adec:decorative xmlns:adec="http://schemas.microsoft.com/office/drawing/2017/decorative" xmlns="" val="1"/>
+                  <adec:decorative xmlns="" xmlns:adec="http://schemas.microsoft.com/office/drawing/2017/decorative" val="1"/>
                 </a:ext>
               </a:extLst>
             </p:cNvPr>
@@ -17727,7 +17742,7 @@
             <p:nvPr>
               <p:extLst>
                 <p:ext uri="{386F3935-93C4-4BCD-93E2-E3B085C9AB24}">
-                  <p16:designElem xmlns:p16="http://schemas.microsoft.com/office/powerpoint/2015/main" xmlns="" val="1"/>
+                  <p16:designElem xmlns="" xmlns:p16="http://schemas.microsoft.com/office/powerpoint/2015/main" val="1"/>
                 </p:ext>
               </p:extLst>
             </p:nvPr>
@@ -17776,10 +17791,10 @@
             <p:cNvPr id="28" name="Freeform 14">
               <a:extLst>
                 <a:ext uri="{FF2B5EF4-FFF2-40B4-BE49-F238E27FC236}">
-                  <a16:creationId xmlns:a16="http://schemas.microsoft.com/office/drawing/2014/main" xmlns="" id="{8A58A902-E944-4399-9A93-A91A6A82B166}"/>
+                  <a16:creationId xmlns="" xmlns:a16="http://schemas.microsoft.com/office/drawing/2014/main" id="{8A58A902-E944-4399-9A93-A91A6A82B166}"/>
                 </a:ext>
                 <a:ext uri="{C183D7F6-B498-43B3-948B-1728B52AA6E4}">
-                  <adec:decorative xmlns:adec="http://schemas.microsoft.com/office/drawing/2017/decorative" xmlns="" val="1"/>
+                  <adec:decorative xmlns="" xmlns:adec="http://schemas.microsoft.com/office/drawing/2017/decorative" val="1"/>
                 </a:ext>
               </a:extLst>
             </p:cNvPr>
@@ -17787,7 +17802,7 @@
             <p:nvPr>
               <p:extLst>
                 <p:ext uri="{386F3935-93C4-4BCD-93E2-E3B085C9AB24}">
-                  <p16:designElem xmlns:p16="http://schemas.microsoft.com/office/powerpoint/2015/main" xmlns="" val="1"/>
+                  <p16:designElem xmlns="" xmlns:p16="http://schemas.microsoft.com/office/powerpoint/2015/main" val="1"/>
                 </p:ext>
               </p:extLst>
             </p:nvPr>
@@ -17842,10 +17857,10 @@
             <p:cNvPr id="29" name="Freeform 15">
               <a:extLst>
                 <a:ext uri="{FF2B5EF4-FFF2-40B4-BE49-F238E27FC236}">
-                  <a16:creationId xmlns:a16="http://schemas.microsoft.com/office/drawing/2014/main" xmlns="" id="{4EDB1155-2E8E-4FB8-AD42-101FE4383231}"/>
+                  <a16:creationId xmlns="" xmlns:a16="http://schemas.microsoft.com/office/drawing/2014/main" id="{4EDB1155-2E8E-4FB8-AD42-101FE4383231}"/>
                 </a:ext>
                 <a:ext uri="{C183D7F6-B498-43B3-948B-1728B52AA6E4}">
-                  <adec:decorative xmlns:adec="http://schemas.microsoft.com/office/drawing/2017/decorative" xmlns="" val="1"/>
+                  <adec:decorative xmlns="" xmlns:adec="http://schemas.microsoft.com/office/drawing/2017/decorative" val="1"/>
                 </a:ext>
               </a:extLst>
             </p:cNvPr>
@@ -17853,7 +17868,7 @@
             <p:nvPr>
               <p:extLst>
                 <p:ext uri="{386F3935-93C4-4BCD-93E2-E3B085C9AB24}">
-                  <p16:designElem xmlns:p16="http://schemas.microsoft.com/office/powerpoint/2015/main" xmlns="" val="1"/>
+                  <p16:designElem xmlns="" xmlns:p16="http://schemas.microsoft.com/office/powerpoint/2015/main" val="1"/>
                 </p:ext>
               </p:extLst>
             </p:nvPr>
@@ -17913,7 +17928,7 @@
           <p:cNvPr id="2" name="Title 1">
             <a:extLst>
               <a:ext uri="{FF2B5EF4-FFF2-40B4-BE49-F238E27FC236}">
-                <a16:creationId xmlns:a16="http://schemas.microsoft.com/office/drawing/2014/main" xmlns="" id="{C7492CCE-C435-464E-A19A-D4C606FDBE3D}"/>
+                <a16:creationId xmlns="" xmlns:a16="http://schemas.microsoft.com/office/drawing/2014/main" id="{C7492CCE-C435-464E-A19A-D4C606FDBE3D}"/>
               </a:ext>
             </a:extLst>
           </p:cNvPr>
@@ -17950,7 +17965,7 @@
           <p:cNvPr id="5" name="TextBox 4">
             <a:extLst>
               <a:ext uri="{FF2B5EF4-FFF2-40B4-BE49-F238E27FC236}">
-                <a16:creationId xmlns:a16="http://schemas.microsoft.com/office/drawing/2014/main" xmlns="" id="{466A409B-90E2-4ACB-8A16-0329B5CEE6DF}"/>
+                <a16:creationId xmlns="" xmlns:a16="http://schemas.microsoft.com/office/drawing/2014/main" id="{466A409B-90E2-4ACB-8A16-0329B5CEE6DF}"/>
               </a:ext>
             </a:extLst>
           </p:cNvPr>
@@ -18001,7 +18016,7 @@
           <p:cNvPr id="7" name="Straight Arrow Connector 6">
             <a:extLst>
               <a:ext uri="{FF2B5EF4-FFF2-40B4-BE49-F238E27FC236}">
-                <a16:creationId xmlns:a16="http://schemas.microsoft.com/office/drawing/2014/main" xmlns="" id="{6C986E87-252D-4CDD-90A3-050A5080DF44}"/>
+                <a16:creationId xmlns="" xmlns:a16="http://schemas.microsoft.com/office/drawing/2014/main" id="{6C986E87-252D-4CDD-90A3-050A5080DF44}"/>
               </a:ext>
             </a:extLst>
           </p:cNvPr>
@@ -18042,7 +18057,7 @@
           <p:cNvPr id="17" name="Straight Arrow Connector 16">
             <a:extLst>
               <a:ext uri="{FF2B5EF4-FFF2-40B4-BE49-F238E27FC236}">
-                <a16:creationId xmlns:a16="http://schemas.microsoft.com/office/drawing/2014/main" xmlns="" id="{8B32EEAB-6F30-4731-8D76-02708A63C23C}"/>
+                <a16:creationId xmlns="" xmlns:a16="http://schemas.microsoft.com/office/drawing/2014/main" id="{8B32EEAB-6F30-4731-8D76-02708A63C23C}"/>
               </a:ext>
             </a:extLst>
           </p:cNvPr>
@@ -18083,7 +18098,7 @@
           <p:cNvPr id="18" name="Straight Arrow Connector 17">
             <a:extLst>
               <a:ext uri="{FF2B5EF4-FFF2-40B4-BE49-F238E27FC236}">
-                <a16:creationId xmlns:a16="http://schemas.microsoft.com/office/drawing/2014/main" xmlns="" id="{E930BBA9-7BA1-48A0-A9E1-F9545CD11BAA}"/>
+                <a16:creationId xmlns="" xmlns:a16="http://schemas.microsoft.com/office/drawing/2014/main" id="{E930BBA9-7BA1-48A0-A9E1-F9545CD11BAA}"/>
               </a:ext>
             </a:extLst>
           </p:cNvPr>
@@ -18124,7 +18139,7 @@
           <p:cNvPr id="19" name="Straight Arrow Connector 18">
             <a:extLst>
               <a:ext uri="{FF2B5EF4-FFF2-40B4-BE49-F238E27FC236}">
-                <a16:creationId xmlns:a16="http://schemas.microsoft.com/office/drawing/2014/main" xmlns="" id="{72D8D5ED-08A2-4E59-AA33-3E70202E855D}"/>
+                <a16:creationId xmlns="" xmlns:a16="http://schemas.microsoft.com/office/drawing/2014/main" id="{72D8D5ED-08A2-4E59-AA33-3E70202E855D}"/>
               </a:ext>
             </a:extLst>
           </p:cNvPr>
@@ -18215,7 +18230,7 @@
           <p:cNvPr id="30" name="TextBox 11">
             <a:extLst>
               <a:ext uri="{FF2B5EF4-FFF2-40B4-BE49-F238E27FC236}">
-                <a16:creationId xmlns="" xmlns:a16="http://schemas.microsoft.com/office/drawing/2014/main" xmlns:lc="http://schemas.openxmlformats.org/drawingml/2006/lockedCanvas" id="{3ED8D828-23F6-4F62-895A-0C04DE02C6A7}"/>
+                <a16:creationId xmlns:lc="http://schemas.openxmlformats.org/drawingml/2006/lockedCanvas" xmlns:a16="http://schemas.microsoft.com/office/drawing/2014/main" xmlns="" id="{3ED8D828-23F6-4F62-895A-0C04DE02C6A7}"/>
               </a:ext>
             </a:extLst>
           </p:cNvPr>
@@ -18334,11 +18349,7 @@
           <a:p>
             <a:r>
               <a:rPr lang="en-US" sz="1000" dirty="0"/>
-              <a:t>Figure </a:t>
-            </a:r>
-            <a:r>
-              <a:rPr lang="en-US" sz="1000" dirty="0"/>
-              <a:t>6</a:t>
+              <a:t>Figure 6</a:t>
             </a:r>
             <a:r>
               <a:rPr lang="en-US" sz="1000" dirty="0" smtClean="0"/>
@@ -18353,7 +18364,7 @@
           <p:cNvPr id="31" name="TextBox 11">
             <a:extLst>
               <a:ext uri="{FF2B5EF4-FFF2-40B4-BE49-F238E27FC236}">
-                <a16:creationId xmlns="" xmlns:a16="http://schemas.microsoft.com/office/drawing/2014/main" xmlns:lc="http://schemas.openxmlformats.org/drawingml/2006/lockedCanvas" id="{3ED8D828-23F6-4F62-895A-0C04DE02C6A7}"/>
+                <a16:creationId xmlns:lc="http://schemas.openxmlformats.org/drawingml/2006/lockedCanvas" xmlns:a16="http://schemas.microsoft.com/office/drawing/2014/main" xmlns="" id="{3ED8D828-23F6-4F62-895A-0C04DE02C6A7}"/>
               </a:ext>
             </a:extLst>
           </p:cNvPr>
@@ -18472,11 +18483,7 @@
           <a:p>
             <a:r>
               <a:rPr lang="en-US" sz="1000" dirty="0"/>
-              <a:t>Figure </a:t>
-            </a:r>
-            <a:r>
-              <a:rPr lang="en-US" sz="1000" dirty="0"/>
-              <a:t>7</a:t>
+              <a:t>Figure 7</a:t>
             </a:r>
             <a:r>
               <a:rPr lang="en-US" sz="1000" dirty="0" smtClean="0"/>
@@ -18529,10 +18536,10 @@
           <p:cNvPr id="21" name="Rectangle 20">
             <a:extLst>
               <a:ext uri="{FF2B5EF4-FFF2-40B4-BE49-F238E27FC236}">
-                <a16:creationId xmlns:a16="http://schemas.microsoft.com/office/drawing/2014/main" xmlns="" id="{99CAC3B1-4879-424D-8F15-206277196159}"/>
+                <a16:creationId xmlns="" xmlns:a16="http://schemas.microsoft.com/office/drawing/2014/main" id="{99CAC3B1-4879-424D-8F15-206277196159}"/>
               </a:ext>
               <a:ext uri="{C183D7F6-B498-43B3-948B-1728B52AA6E4}">
-                <adec:decorative xmlns:adec="http://schemas.microsoft.com/office/drawing/2017/decorative" xmlns="" val="1"/>
+                <adec:decorative xmlns="" xmlns:adec="http://schemas.microsoft.com/office/drawing/2017/decorative" val="1"/>
               </a:ext>
             </a:extLst>
           </p:cNvPr>
@@ -18542,7 +18549,7 @@
           <p:nvPr>
             <p:extLst>
               <p:ext uri="{386F3935-93C4-4BCD-93E2-E3B085C9AB24}">
-                <p16:designElem xmlns:p16="http://schemas.microsoft.com/office/powerpoint/2015/main" xmlns="" val="1"/>
+                <p16:designElem xmlns="" xmlns:p16="http://schemas.microsoft.com/office/powerpoint/2015/main" val="1"/>
               </p:ext>
             </p:extLst>
           </p:nvPr>
@@ -18589,10 +18596,10 @@
           <p:cNvPr id="23" name="Group 22">
             <a:extLst>
               <a:ext uri="{FF2B5EF4-FFF2-40B4-BE49-F238E27FC236}">
-                <a16:creationId xmlns:a16="http://schemas.microsoft.com/office/drawing/2014/main" xmlns="" id="{4B8492CB-DFBA-4A82-9778-F21493DA36C1}"/>
+                <a16:creationId xmlns="" xmlns:a16="http://schemas.microsoft.com/office/drawing/2014/main" id="{4B8492CB-DFBA-4A82-9778-F21493DA36C1}"/>
               </a:ext>
               <a:ext uri="{C183D7F6-B498-43B3-948B-1728B52AA6E4}">
-                <adec:decorative xmlns:adec="http://schemas.microsoft.com/office/drawing/2017/decorative" xmlns="" val="1"/>
+                <adec:decorative xmlns="" xmlns:adec="http://schemas.microsoft.com/office/drawing/2017/decorative" val="1"/>
               </a:ext>
             </a:extLst>
           </p:cNvPr>
@@ -18602,7 +18609,7 @@
           <p:nvPr>
             <p:extLst>
               <p:ext uri="{386F3935-93C4-4BCD-93E2-E3B085C9AB24}">
-                <p16:designElem xmlns:p16="http://schemas.microsoft.com/office/powerpoint/2015/main" xmlns="" val="1"/>
+                <p16:designElem xmlns="" xmlns:p16="http://schemas.microsoft.com/office/powerpoint/2015/main" val="1"/>
               </p:ext>
             </p:extLst>
           </p:nvPr>
@@ -18620,10 +18627,10 @@
             <p:cNvPr id="24" name="Freeform 6">
               <a:extLst>
                 <a:ext uri="{FF2B5EF4-FFF2-40B4-BE49-F238E27FC236}">
-                  <a16:creationId xmlns:a16="http://schemas.microsoft.com/office/drawing/2014/main" xmlns="" id="{E34CC1C8-EBDD-4AEA-83E6-B27575B62E2E}"/>
+                  <a16:creationId xmlns="" xmlns:a16="http://schemas.microsoft.com/office/drawing/2014/main" id="{E34CC1C8-EBDD-4AEA-83E6-B27575B62E2E}"/>
                 </a:ext>
                 <a:ext uri="{C183D7F6-B498-43B3-948B-1728B52AA6E4}">
-                  <adec:decorative xmlns:adec="http://schemas.microsoft.com/office/drawing/2017/decorative" xmlns="" val="1"/>
+                  <adec:decorative xmlns="" xmlns:adec="http://schemas.microsoft.com/office/drawing/2017/decorative" val="1"/>
                 </a:ext>
               </a:extLst>
             </p:cNvPr>
@@ -18631,7 +18638,7 @@
             <p:nvPr>
               <p:extLst>
                 <p:ext uri="{386F3935-93C4-4BCD-93E2-E3B085C9AB24}">
-                  <p16:designElem xmlns:p16="http://schemas.microsoft.com/office/powerpoint/2015/main" xmlns="" val="1"/>
+                  <p16:designElem xmlns="" xmlns:p16="http://schemas.microsoft.com/office/powerpoint/2015/main" val="1"/>
                 </p:ext>
               </p:extLst>
             </p:nvPr>
@@ -18681,10 +18688,10 @@
             <p:cNvPr id="25" name="Freeform 7">
               <a:extLst>
                 <a:ext uri="{FF2B5EF4-FFF2-40B4-BE49-F238E27FC236}">
-                  <a16:creationId xmlns:a16="http://schemas.microsoft.com/office/drawing/2014/main" xmlns="" id="{D6B38644-B85D-4211-9526-5B4C2A662BF7}"/>
+                  <a16:creationId xmlns="" xmlns:a16="http://schemas.microsoft.com/office/drawing/2014/main" id="{D6B38644-B85D-4211-9526-5B4C2A662BF7}"/>
                 </a:ext>
                 <a:ext uri="{C183D7F6-B498-43B3-948B-1728B52AA6E4}">
-                  <adec:decorative xmlns:adec="http://schemas.microsoft.com/office/drawing/2017/decorative" xmlns="" val="1"/>
+                  <adec:decorative xmlns="" xmlns:adec="http://schemas.microsoft.com/office/drawing/2017/decorative" val="1"/>
                 </a:ext>
               </a:extLst>
             </p:cNvPr>
@@ -18692,7 +18699,7 @@
             <p:nvPr>
               <p:extLst>
                 <p:ext uri="{386F3935-93C4-4BCD-93E2-E3B085C9AB24}">
-                  <p16:designElem xmlns:p16="http://schemas.microsoft.com/office/powerpoint/2015/main" xmlns="" val="1"/>
+                  <p16:designElem xmlns="" xmlns:p16="http://schemas.microsoft.com/office/powerpoint/2015/main" val="1"/>
                 </p:ext>
               </p:extLst>
             </p:nvPr>
@@ -18745,10 +18752,10 @@
             <p:cNvPr id="26" name="Freeform 12">
               <a:extLst>
                 <a:ext uri="{FF2B5EF4-FFF2-40B4-BE49-F238E27FC236}">
-                  <a16:creationId xmlns:a16="http://schemas.microsoft.com/office/drawing/2014/main" xmlns="" id="{8A8B2820-6B8F-4C19-BFC5-D28EE44E54CB}"/>
+                  <a16:creationId xmlns="" xmlns:a16="http://schemas.microsoft.com/office/drawing/2014/main" id="{8A8B2820-6B8F-4C19-BFC5-D28EE44E54CB}"/>
                 </a:ext>
                 <a:ext uri="{C183D7F6-B498-43B3-948B-1728B52AA6E4}">
-                  <adec:decorative xmlns:adec="http://schemas.microsoft.com/office/drawing/2017/decorative" xmlns="" val="1"/>
+                  <adec:decorative xmlns="" xmlns:adec="http://schemas.microsoft.com/office/drawing/2017/decorative" val="1"/>
                 </a:ext>
               </a:extLst>
             </p:cNvPr>
@@ -18756,7 +18763,7 @@
             <p:nvPr>
               <p:extLst>
                 <p:ext uri="{386F3935-93C4-4BCD-93E2-E3B085C9AB24}">
-                  <p16:designElem xmlns:p16="http://schemas.microsoft.com/office/powerpoint/2015/main" xmlns="" val="1"/>
+                  <p16:designElem xmlns="" xmlns:p16="http://schemas.microsoft.com/office/powerpoint/2015/main" val="1"/>
                 </p:ext>
               </p:extLst>
             </p:nvPr>
@@ -18803,10 +18810,10 @@
             <p:cNvPr id="27" name="Freeform 13">
               <a:extLst>
                 <a:ext uri="{FF2B5EF4-FFF2-40B4-BE49-F238E27FC236}">
-                  <a16:creationId xmlns:a16="http://schemas.microsoft.com/office/drawing/2014/main" xmlns="" id="{773528ED-4D37-4A77-A8CA-86B6221C5E82}"/>
+                  <a16:creationId xmlns="" xmlns:a16="http://schemas.microsoft.com/office/drawing/2014/main" id="{773528ED-4D37-4A77-A8CA-86B6221C5E82}"/>
                 </a:ext>
                 <a:ext uri="{C183D7F6-B498-43B3-948B-1728B52AA6E4}">
-                  <adec:decorative xmlns:adec="http://schemas.microsoft.com/office/drawing/2017/decorative" xmlns="" val="1"/>
+                  <adec:decorative xmlns="" xmlns:adec="http://schemas.microsoft.com/office/drawing/2017/decorative" val="1"/>
                 </a:ext>
               </a:extLst>
             </p:cNvPr>
@@ -18814,7 +18821,7 @@
             <p:nvPr>
               <p:extLst>
                 <p:ext uri="{386F3935-93C4-4BCD-93E2-E3B085C9AB24}">
-                  <p16:designElem xmlns:p16="http://schemas.microsoft.com/office/powerpoint/2015/main" xmlns="" val="1"/>
+                  <p16:designElem xmlns="" xmlns:p16="http://schemas.microsoft.com/office/powerpoint/2015/main" val="1"/>
                 </p:ext>
               </p:extLst>
             </p:nvPr>
@@ -18863,10 +18870,10 @@
             <p:cNvPr id="28" name="Freeform 14">
               <a:extLst>
                 <a:ext uri="{FF2B5EF4-FFF2-40B4-BE49-F238E27FC236}">
-                  <a16:creationId xmlns:a16="http://schemas.microsoft.com/office/drawing/2014/main" xmlns="" id="{8A58A902-E944-4399-9A93-A91A6A82B166}"/>
+                  <a16:creationId xmlns="" xmlns:a16="http://schemas.microsoft.com/office/drawing/2014/main" id="{8A58A902-E944-4399-9A93-A91A6A82B166}"/>
                 </a:ext>
                 <a:ext uri="{C183D7F6-B498-43B3-948B-1728B52AA6E4}">
-                  <adec:decorative xmlns:adec="http://schemas.microsoft.com/office/drawing/2017/decorative" xmlns="" val="1"/>
+                  <adec:decorative xmlns="" xmlns:adec="http://schemas.microsoft.com/office/drawing/2017/decorative" val="1"/>
                 </a:ext>
               </a:extLst>
             </p:cNvPr>
@@ -18874,7 +18881,7 @@
             <p:nvPr>
               <p:extLst>
                 <p:ext uri="{386F3935-93C4-4BCD-93E2-E3B085C9AB24}">
-                  <p16:designElem xmlns:p16="http://schemas.microsoft.com/office/powerpoint/2015/main" xmlns="" val="1"/>
+                  <p16:designElem xmlns="" xmlns:p16="http://schemas.microsoft.com/office/powerpoint/2015/main" val="1"/>
                 </p:ext>
               </p:extLst>
             </p:nvPr>
@@ -18929,10 +18936,10 @@
             <p:cNvPr id="29" name="Freeform 15">
               <a:extLst>
                 <a:ext uri="{FF2B5EF4-FFF2-40B4-BE49-F238E27FC236}">
-                  <a16:creationId xmlns:a16="http://schemas.microsoft.com/office/drawing/2014/main" xmlns="" id="{4EDB1155-2E8E-4FB8-AD42-101FE4383231}"/>
+                  <a16:creationId xmlns="" xmlns:a16="http://schemas.microsoft.com/office/drawing/2014/main" id="{4EDB1155-2E8E-4FB8-AD42-101FE4383231}"/>
                 </a:ext>
                 <a:ext uri="{C183D7F6-B498-43B3-948B-1728B52AA6E4}">
-                  <adec:decorative xmlns:adec="http://schemas.microsoft.com/office/drawing/2017/decorative" xmlns="" val="1"/>
+                  <adec:decorative xmlns="" xmlns:adec="http://schemas.microsoft.com/office/drawing/2017/decorative" val="1"/>
                 </a:ext>
               </a:extLst>
             </p:cNvPr>
@@ -18940,7 +18947,7 @@
             <p:nvPr>
               <p:extLst>
                 <p:ext uri="{386F3935-93C4-4BCD-93E2-E3B085C9AB24}">
-                  <p16:designElem xmlns:p16="http://schemas.microsoft.com/office/powerpoint/2015/main" xmlns="" val="1"/>
+                  <p16:designElem xmlns="" xmlns:p16="http://schemas.microsoft.com/office/powerpoint/2015/main" val="1"/>
                 </p:ext>
               </p:extLst>
             </p:nvPr>
@@ -19000,7 +19007,7 @@
           <p:cNvPr id="2" name="Title 1">
             <a:extLst>
               <a:ext uri="{FF2B5EF4-FFF2-40B4-BE49-F238E27FC236}">
-                <a16:creationId xmlns:a16="http://schemas.microsoft.com/office/drawing/2014/main" xmlns="" id="{C7492CCE-C435-464E-A19A-D4C606FDBE3D}"/>
+                <a16:creationId xmlns="" xmlns:a16="http://schemas.microsoft.com/office/drawing/2014/main" id="{C7492CCE-C435-464E-A19A-D4C606FDBE3D}"/>
               </a:ext>
             </a:extLst>
           </p:cNvPr>
@@ -19037,7 +19044,7 @@
           <p:cNvPr id="5" name="TextBox 4">
             <a:extLst>
               <a:ext uri="{FF2B5EF4-FFF2-40B4-BE49-F238E27FC236}">
-                <a16:creationId xmlns:a16="http://schemas.microsoft.com/office/drawing/2014/main" xmlns="" id="{466A409B-90E2-4ACB-8A16-0329B5CEE6DF}"/>
+                <a16:creationId xmlns="" xmlns:a16="http://schemas.microsoft.com/office/drawing/2014/main" id="{466A409B-90E2-4ACB-8A16-0329B5CEE6DF}"/>
               </a:ext>
             </a:extLst>
           </p:cNvPr>
@@ -19088,7 +19095,7 @@
           <p:cNvPr id="7" name="Straight Arrow Connector 6">
             <a:extLst>
               <a:ext uri="{FF2B5EF4-FFF2-40B4-BE49-F238E27FC236}">
-                <a16:creationId xmlns:a16="http://schemas.microsoft.com/office/drawing/2014/main" xmlns="" id="{6C986E87-252D-4CDD-90A3-050A5080DF44}"/>
+                <a16:creationId xmlns="" xmlns:a16="http://schemas.microsoft.com/office/drawing/2014/main" id="{6C986E87-252D-4CDD-90A3-050A5080DF44}"/>
               </a:ext>
             </a:extLst>
           </p:cNvPr>
@@ -19129,7 +19136,7 @@
           <p:cNvPr id="17" name="Straight Arrow Connector 16">
             <a:extLst>
               <a:ext uri="{FF2B5EF4-FFF2-40B4-BE49-F238E27FC236}">
-                <a16:creationId xmlns:a16="http://schemas.microsoft.com/office/drawing/2014/main" xmlns="" id="{8B32EEAB-6F30-4731-8D76-02708A63C23C}"/>
+                <a16:creationId xmlns="" xmlns:a16="http://schemas.microsoft.com/office/drawing/2014/main" id="{8B32EEAB-6F30-4731-8D76-02708A63C23C}"/>
               </a:ext>
             </a:extLst>
           </p:cNvPr>
@@ -19170,7 +19177,7 @@
           <p:cNvPr id="18" name="Straight Arrow Connector 17">
             <a:extLst>
               <a:ext uri="{FF2B5EF4-FFF2-40B4-BE49-F238E27FC236}">
-                <a16:creationId xmlns:a16="http://schemas.microsoft.com/office/drawing/2014/main" xmlns="" id="{E930BBA9-7BA1-48A0-A9E1-F9545CD11BAA}"/>
+                <a16:creationId xmlns="" xmlns:a16="http://schemas.microsoft.com/office/drawing/2014/main" id="{E930BBA9-7BA1-48A0-A9E1-F9545CD11BAA}"/>
               </a:ext>
             </a:extLst>
           </p:cNvPr>
@@ -19211,7 +19218,7 @@
           <p:cNvPr id="19" name="Straight Arrow Connector 18">
             <a:extLst>
               <a:ext uri="{FF2B5EF4-FFF2-40B4-BE49-F238E27FC236}">
-                <a16:creationId xmlns:a16="http://schemas.microsoft.com/office/drawing/2014/main" xmlns="" id="{72D8D5ED-08A2-4E59-AA33-3E70202E855D}"/>
+                <a16:creationId xmlns="" xmlns:a16="http://schemas.microsoft.com/office/drawing/2014/main" id="{72D8D5ED-08A2-4E59-AA33-3E70202E855D}"/>
               </a:ext>
             </a:extLst>
           </p:cNvPr>
@@ -19276,7 +19283,7 @@
           <p:cNvPr id="20" name="TextBox 11">
             <a:extLst>
               <a:ext uri="{FF2B5EF4-FFF2-40B4-BE49-F238E27FC236}">
-                <a16:creationId xmlns="" xmlns:a16="http://schemas.microsoft.com/office/drawing/2014/main" xmlns:lc="http://schemas.openxmlformats.org/drawingml/2006/lockedCanvas" id="{3ED8D828-23F6-4F62-895A-0C04DE02C6A7}"/>
+                <a16:creationId xmlns:lc="http://schemas.openxmlformats.org/drawingml/2006/lockedCanvas" xmlns:a16="http://schemas.microsoft.com/office/drawing/2014/main" xmlns="" id="{3ED8D828-23F6-4F62-895A-0C04DE02C6A7}"/>
               </a:ext>
             </a:extLst>
           </p:cNvPr>
@@ -19970,6 +19977,23 @@
 </file>
 
 <file path=customXml/item1.xml><?xml version="1.0" encoding="utf-8"?>
+<p:properties xmlns:p="http://schemas.microsoft.com/office/2006/metadata/properties" xmlns:xsi="http://www.w3.org/2001/XMLSchema-instance" xmlns:pc="http://schemas.microsoft.com/office/infopath/2007/PartnerControls">
+  <documentManagement>
+    <MediaServiceKeyPoints xmlns="71af3243-3dd4-4a8d-8c0d-dd76da1f02a5" xsi:nil="true"/>
+  </documentManagement>
+</p:properties>
+</file>
+
+<file path=customXml/item2.xml><?xml version="1.0" encoding="utf-8"?>
+<?mso-contentType ?>
+<FormTemplates xmlns="http://schemas.microsoft.com/sharepoint/v3/contenttype/forms">
+  <Display>DocumentLibraryForm</Display>
+  <Edit>DocumentLibraryForm</Edit>
+  <New>DocumentLibraryForm</New>
+</FormTemplates>
+</file>
+
+<file path=customXml/item3.xml><?xml version="1.0" encoding="utf-8"?>
 <ct:contentTypeSchema xmlns:ct="http://schemas.microsoft.com/office/2006/metadata/contentType" xmlns:ma="http://schemas.microsoft.com/office/2006/metadata/properties/metaAttributes" ct:_="" ma:_="" ma:contentTypeName="Document" ma:contentTypeID="0x01010079F111ED35F8CC479449609E8A0923A6" ma:contentTypeVersion="11" ma:contentTypeDescription="Create a new document." ma:contentTypeScope="" ma:versionID="9677210f24a1be23c92c90fd886aa0aa">
   <xsd:schema xmlns:xsd="http://www.w3.org/2001/XMLSchema" xmlns:xs="http://www.w3.org/2001/XMLSchema" xmlns:p="http://schemas.microsoft.com/office/2006/metadata/properties" xmlns:ns2="71af3243-3dd4-4a8d-8c0d-dd76da1f02a5" xmlns:ns3="16c05727-aa75-4e4a-9b5f-8a80a1165891" targetNamespace="http://schemas.microsoft.com/office/2006/metadata/properties" ma:root="true" ma:fieldsID="60e05723c5c1908df1a1a4ebf11d344e" ns2:_="" ns3:_="">
     <xsd:import namespace="71af3243-3dd4-4a8d-8c0d-dd76da1f02a5"/>
@@ -20180,24 +20204,25 @@
 </ct:contentTypeSchema>
 </file>
 
-<file path=customXml/item2.xml><?xml version="1.0" encoding="utf-8"?>
-<?mso-contentType ?>
-<FormTemplates xmlns="http://schemas.microsoft.com/sharepoint/v3/contenttype/forms">
-  <Display>DocumentLibraryForm</Display>
-  <Edit>DocumentLibraryForm</Edit>
-  <New>DocumentLibraryForm</New>
-</FormTemplates>
+<file path=customXml/itemProps1.xml><?xml version="1.0" encoding="utf-8"?>
+<ds:datastoreItem xmlns:ds="http://schemas.openxmlformats.org/officeDocument/2006/customXml" ds:itemID="{D7023227-530E-4024-91EF-312A851A758C}">
+  <ds:schemaRefs>
+    <ds:schemaRef ds:uri="http://schemas.microsoft.com/office/2006/metadata/properties"/>
+    <ds:schemaRef ds:uri="http://schemas.microsoft.com/office/infopath/2007/PartnerControls"/>
+    <ds:schemaRef ds:uri="71af3243-3dd4-4a8d-8c0d-dd76da1f02a5"/>
+  </ds:schemaRefs>
+</ds:datastoreItem>
 </file>
 
-<file path=customXml/item3.xml><?xml version="1.0" encoding="utf-8"?>
-<p:properties xmlns:p="http://schemas.microsoft.com/office/2006/metadata/properties" xmlns:xsi="http://www.w3.org/2001/XMLSchema-instance" xmlns:pc="http://schemas.microsoft.com/office/infopath/2007/PartnerControls">
-  <documentManagement>
-    <MediaServiceKeyPoints xmlns="71af3243-3dd4-4a8d-8c0d-dd76da1f02a5" xsi:nil="true"/>
-  </documentManagement>
-</p:properties>
+<file path=customXml/itemProps2.xml><?xml version="1.0" encoding="utf-8"?>
+<ds:datastoreItem xmlns:ds="http://schemas.openxmlformats.org/officeDocument/2006/customXml" ds:itemID="{33315AA3-EAE3-44ED-8368-BAC2FFFB4817}">
+  <ds:schemaRefs>
+    <ds:schemaRef ds:uri="http://schemas.microsoft.com/sharepoint/v3/contenttype/forms"/>
+  </ds:schemaRefs>
+</ds:datastoreItem>
 </file>
 
-<file path=customXml/itemProps1.xml><?xml version="1.0" encoding="utf-8"?>
+<file path=customXml/itemProps3.xml><?xml version="1.0" encoding="utf-8"?>
 <ds:datastoreItem xmlns:ds="http://schemas.openxmlformats.org/officeDocument/2006/customXml" ds:itemID="{627C19A7-3107-4CB2-BD0D-F7C79BE028CC}">
   <ds:schemaRefs>
     <ds:schemaRef ds:uri="http://schemas.microsoft.com/office/2006/metadata/contentType"/>
@@ -20214,22 +20239,4 @@
     <ds:schemaRef ds:uri="http://schemas.microsoft.com/internal/obd"/>
   </ds:schemaRefs>
 </ds:datastoreItem>
-</file>
-
-<file path=customXml/itemProps2.xml><?xml version="1.0" encoding="utf-8"?>
-<ds:datastoreItem xmlns:ds="http://schemas.openxmlformats.org/officeDocument/2006/customXml" ds:itemID="{33315AA3-EAE3-44ED-8368-BAC2FFFB4817}">
-  <ds:schemaRefs>
-    <ds:schemaRef ds:uri="http://schemas.microsoft.com/sharepoint/v3/contenttype/forms"/>
-  </ds:schemaRefs>
-</ds:datastoreItem>
-</file>
-
-<file path=customXml/itemProps3.xml><?xml version="1.0" encoding="utf-8"?>
-<ds:datastoreItem xmlns:ds="http://schemas.openxmlformats.org/officeDocument/2006/customXml" ds:itemID="{D7023227-530E-4024-91EF-312A851A758C}">
-  <ds:schemaRefs>
-    <ds:schemaRef ds:uri="http://schemas.microsoft.com/office/2006/metadata/properties"/>
-    <ds:schemaRef ds:uri="http://schemas.microsoft.com/office/infopath/2007/PartnerControls"/>
-    <ds:schemaRef ds:uri="71af3243-3dd4-4a8d-8c0d-dd76da1f02a5"/>
-  </ds:schemaRefs>
-</ds:datastoreItem>
 </file>
</xml_diff>